<commit_message>
Atualização do documento DPEAP_PGC_20111201.doc       *portugues Atualização do documento Gerencia de configuração e mudança de software.pptx       *mais informações
</commit_message>
<xml_diff>
--- a/Dot Project EAP/4. System Management/Gerência de configuração/Gerencia de configuração e mudança de software.pptx
+++ b/Dot Project EAP/4. System Management/Gerência de configuração/Gerencia de configuração e mudança de software.pptx
@@ -2,13 +2,19 @@
 <file path=ppt/presentation.xml><?xml version="1.0" encoding="utf-8"?>
 <p:presentation xmlns:a="http://schemas.openxmlformats.org/drawingml/2006/main" xmlns:r="http://schemas.openxmlformats.org/officeDocument/2006/relationships" xmlns:p="http://schemas.openxmlformats.org/presentationml/2006/main" saveSubsetFonts="1">
   <p:sldMasterIdLst>
-    <p:sldMasterId id="2147483648" r:id="rId1"/>
+    <p:sldMasterId id="2147483660" r:id="rId1"/>
   </p:sldMasterIdLst>
   <p:sldIdLst>
     <p:sldId id="256" r:id="rId2"/>
     <p:sldId id="257" r:id="rId3"/>
     <p:sldId id="258" r:id="rId4"/>
-    <p:sldId id="259" r:id="rId5"/>
+    <p:sldId id="262" r:id="rId5"/>
+    <p:sldId id="259" r:id="rId6"/>
+    <p:sldId id="260" r:id="rId7"/>
+    <p:sldId id="261" r:id="rId8"/>
+    <p:sldId id="263" r:id="rId9"/>
+    <p:sldId id="264" r:id="rId10"/>
+    <p:sldId id="265" r:id="rId11"/>
   </p:sldIdLst>
   <p:sldSz cx="9144000" cy="6858000" type="screen4x3"/>
   <p:notesSz cx="6858000" cy="9144000"/>
@@ -139,19 +145,30 @@
         </p:nvSpPr>
         <p:spPr>
           <a:xfrm>
-            <a:off x="685800" y="2130425"/>
-            <a:ext cx="7772400" cy="1470025"/>
+            <a:off x="685800" y="1905000"/>
+            <a:ext cx="7543800" cy="2593975"/>
           </a:xfrm>
         </p:spPr>
         <p:txBody>
-          <a:bodyPr/>
-          <a:lstStyle/>
+          <a:bodyPr anchor="b"/>
+          <a:lstStyle>
+            <a:lvl1pPr>
+              <a:defRPr sz="6600">
+                <a:ln>
+                  <a:noFill/>
+                </a:ln>
+                <a:solidFill>
+                  <a:schemeClr val="tx2"/>
+                </a:solidFill>
+              </a:defRPr>
+            </a:lvl1pPr>
+          </a:lstStyle>
           <a:p>
             <a:r>
               <a:rPr lang="en-US" smtClean="0"/>
               <a:t>Click to edit Master title style</a:t>
             </a:r>
-            <a:endParaRPr lang="pt-BR"/>
+            <a:endParaRPr lang="en-US" dirty="0"/>
           </a:p>
         </p:txBody>
       </p:sp>
@@ -167,16 +184,18 @@
         </p:nvSpPr>
         <p:spPr>
           <a:xfrm>
-            <a:off x="1371600" y="3886200"/>
-            <a:ext cx="6400800" cy="1752600"/>
+            <a:off x="685800" y="4572000"/>
+            <a:ext cx="6461760" cy="1066800"/>
           </a:xfrm>
         </p:spPr>
         <p:txBody>
-          <a:bodyPr/>
+          <a:bodyPr anchor="t">
+            <a:normAutofit/>
+          </a:bodyPr>
           <a:lstStyle>
-            <a:lvl1pPr marL="0" indent="0" algn="ctr">
-              <a:buNone/>
-              <a:defRPr>
+            <a:lvl1pPr marL="0" indent="0" algn="l">
+              <a:buNone/>
+              <a:defRPr sz="2000">
                 <a:solidFill>
                   <a:schemeClr val="tx1">
                     <a:tint val="75000"/>
@@ -270,7 +289,7 @@
               <a:rPr lang="en-US" smtClean="0"/>
               <a:t>Click to edit Master subtitle style</a:t>
             </a:r>
-            <a:endParaRPr lang="pt-BR"/>
+            <a:endParaRPr lang="en-US" dirty="0"/>
           </a:p>
         </p:txBody>
       </p:sp>
@@ -340,11 +359,6 @@
         </p:txBody>
       </p:sp>
     </p:spTree>
-    <p:extLst>
-      <p:ext uri="{BB962C8B-B14F-4D97-AF65-F5344CB8AC3E}">
-        <p14:creationId xmlns:p14="http://schemas.microsoft.com/office/powerpoint/2010/main" val="800704169"/>
-      </p:ext>
-    </p:extLst>
   </p:cSld>
   <p:clrMapOvr>
     <a:masterClrMapping/>
@@ -388,7 +402,7 @@
               <a:rPr lang="en-US" smtClean="0"/>
               <a:t>Click to edit Master title style</a:t>
             </a:r>
-            <a:endParaRPr lang="pt-BR"/>
+            <a:endParaRPr lang="en-US"/>
           </a:p>
         </p:txBody>
       </p:sp>
@@ -440,7 +454,7 @@
               <a:rPr lang="en-US" smtClean="0"/>
               <a:t>Fifth level</a:t>
             </a:r>
-            <a:endParaRPr lang="pt-BR"/>
+            <a:endParaRPr lang="en-US"/>
           </a:p>
         </p:txBody>
       </p:sp>
@@ -510,11 +524,6 @@
         </p:txBody>
       </p:sp>
     </p:spTree>
-    <p:extLst>
-      <p:ext uri="{BB962C8B-B14F-4D97-AF65-F5344CB8AC3E}">
-        <p14:creationId xmlns:p14="http://schemas.microsoft.com/office/powerpoint/2010/main" val="2139060860"/>
-      </p:ext>
-    </p:extLst>
   </p:cSld>
   <p:clrMapOvr>
     <a:masterClrMapping/>
@@ -552,18 +561,18 @@
         <p:spPr>
           <a:xfrm>
             <a:off x="6629400" y="274638"/>
-            <a:ext cx="2057400" cy="5851525"/>
+            <a:ext cx="1752600" cy="5851525"/>
           </a:xfrm>
         </p:spPr>
         <p:txBody>
-          <a:bodyPr vert="eaVert"/>
+          <a:bodyPr vert="eaVert" anchor="b" anchorCtr="0"/>
           <a:lstStyle/>
           <a:p>
             <a:r>
               <a:rPr lang="en-US" smtClean="0"/>
               <a:t>Click to edit Master title style</a:t>
             </a:r>
-            <a:endParaRPr lang="pt-BR"/>
+            <a:endParaRPr lang="en-US" dirty="0"/>
           </a:p>
         </p:txBody>
       </p:sp>
@@ -620,7 +629,7 @@
               <a:rPr lang="en-US" smtClean="0"/>
               <a:t>Fifth level</a:t>
             </a:r>
-            <a:endParaRPr lang="pt-BR"/>
+            <a:endParaRPr lang="en-US"/>
           </a:p>
         </p:txBody>
       </p:sp>
@@ -690,11 +699,6 @@
         </p:txBody>
       </p:sp>
     </p:spTree>
-    <p:extLst>
-      <p:ext uri="{BB962C8B-B14F-4D97-AF65-F5344CB8AC3E}">
-        <p14:creationId xmlns:p14="http://schemas.microsoft.com/office/powerpoint/2010/main" val="2975600105"/>
-      </p:ext>
-    </p:extLst>
   </p:cSld>
   <p:clrMapOvr>
     <a:masterClrMapping/>
@@ -738,7 +742,7 @@
               <a:rPr lang="en-US" smtClean="0"/>
               <a:t>Click to edit Master title style</a:t>
             </a:r>
-            <a:endParaRPr lang="pt-BR"/>
+            <a:endParaRPr lang="en-US"/>
           </a:p>
         </p:txBody>
       </p:sp>
@@ -790,7 +794,7 @@
               <a:rPr lang="en-US" smtClean="0"/>
               <a:t>Fifth level</a:t>
             </a:r>
-            <a:endParaRPr lang="pt-BR"/>
+            <a:endParaRPr lang="en-US"/>
           </a:p>
         </p:txBody>
       </p:sp>
@@ -860,11 +864,6 @@
         </p:txBody>
       </p:sp>
     </p:spTree>
-    <p:extLst>
-      <p:ext uri="{BB962C8B-B14F-4D97-AF65-F5344CB8AC3E}">
-        <p14:creationId xmlns:p14="http://schemas.microsoft.com/office/powerpoint/2010/main" val="3529959216"/>
-      </p:ext>
-    </p:extLst>
   </p:cSld>
   <p:clrMapOvr>
     <a:masterClrMapping/>
@@ -901,15 +900,15 @@
         </p:nvSpPr>
         <p:spPr>
           <a:xfrm>
-            <a:off x="722313" y="4406900"/>
-            <a:ext cx="7772400" cy="1362075"/>
+            <a:off x="722313" y="5486400"/>
+            <a:ext cx="7659687" cy="1168400"/>
           </a:xfrm>
         </p:spPr>
         <p:txBody>
           <a:bodyPr anchor="t"/>
           <a:lstStyle>
             <a:lvl1pPr algn="l">
-              <a:defRPr sz="4000" b="1" cap="all"/>
+              <a:defRPr sz="3600" b="0" cap="all"/>
             </a:lvl1pPr>
           </a:lstStyle>
           <a:p>
@@ -917,7 +916,7 @@
               <a:rPr lang="en-US" smtClean="0"/>
               <a:t>Click to edit Master title style</a:t>
             </a:r>
-            <a:endParaRPr lang="pt-BR"/>
+            <a:endParaRPr lang="en-US" dirty="0"/>
           </a:p>
         </p:txBody>
       </p:sp>
@@ -933,8 +932,8 @@
         </p:nvSpPr>
         <p:spPr>
           <a:xfrm>
-            <a:off x="722313" y="2906713"/>
-            <a:ext cx="7772400" cy="1500187"/>
+            <a:off x="722313" y="3852863"/>
+            <a:ext cx="6135687" cy="1633538"/>
           </a:xfrm>
         </p:spPr>
         <p:txBody>
@@ -1106,11 +1105,6 @@
         </p:txBody>
       </p:sp>
     </p:spTree>
-    <p:extLst>
-      <p:ext uri="{BB962C8B-B14F-4D97-AF65-F5344CB8AC3E}">
-        <p14:creationId xmlns:p14="http://schemas.microsoft.com/office/powerpoint/2010/main" val="215858835"/>
-      </p:ext>
-    </p:extLst>
   </p:cSld>
   <p:clrMapOvr>
     <a:masterClrMapping/>
@@ -1154,7 +1148,7 @@
               <a:rPr lang="en-US" smtClean="0"/>
               <a:t>Click to edit Master title style</a:t>
             </a:r>
-            <a:endParaRPr lang="pt-BR"/>
+            <a:endParaRPr lang="en-US"/>
           </a:p>
         </p:txBody>
       </p:sp>
@@ -1170,8 +1164,8 @@
         </p:nvSpPr>
         <p:spPr>
           <a:xfrm>
-            <a:off x="457200" y="1600200"/>
-            <a:ext cx="4038600" cy="4525963"/>
+            <a:off x="457200" y="1536192"/>
+            <a:ext cx="3657600" cy="4590288"/>
           </a:xfrm>
         </p:spPr>
         <p:txBody>
@@ -1239,7 +1233,7 @@
               <a:rPr lang="en-US" smtClean="0"/>
               <a:t>Fifth level</a:t>
             </a:r>
-            <a:endParaRPr lang="pt-BR"/>
+            <a:endParaRPr lang="en-US" dirty="0"/>
           </a:p>
         </p:txBody>
       </p:sp>
@@ -1255,8 +1249,8 @@
         </p:nvSpPr>
         <p:spPr>
           <a:xfrm>
-            <a:off x="4648200" y="1600200"/>
-            <a:ext cx="4038600" cy="4525963"/>
+            <a:off x="4419600" y="1536192"/>
+            <a:ext cx="3657600" cy="4590288"/>
           </a:xfrm>
         </p:spPr>
         <p:txBody>
@@ -1324,7 +1318,7 @@
               <a:rPr lang="en-US" smtClean="0"/>
               <a:t>Fifth level</a:t>
             </a:r>
-            <a:endParaRPr lang="pt-BR"/>
+            <a:endParaRPr lang="en-US" dirty="0"/>
           </a:p>
         </p:txBody>
       </p:sp>
@@ -1394,11 +1388,6 @@
         </p:txBody>
       </p:sp>
     </p:spTree>
-    <p:extLst>
-      <p:ext uri="{BB962C8B-B14F-4D97-AF65-F5344CB8AC3E}">
-        <p14:creationId xmlns:p14="http://schemas.microsoft.com/office/powerpoint/2010/main" val="3442843169"/>
-      </p:ext>
-    </p:extLst>
   </p:cSld>
   <p:clrMapOvr>
     <a:masterClrMapping/>
@@ -1446,7 +1435,7 @@
               <a:rPr lang="en-US" smtClean="0"/>
               <a:t>Click to edit Master title style</a:t>
             </a:r>
-            <a:endParaRPr lang="pt-BR"/>
+            <a:endParaRPr lang="en-US"/>
           </a:p>
         </p:txBody>
       </p:sp>
@@ -1463,15 +1452,21 @@
         <p:spPr>
           <a:xfrm>
             <a:off x="457200" y="1535113"/>
-            <a:ext cx="4040188" cy="639762"/>
+            <a:ext cx="3657600" cy="639762"/>
           </a:xfrm>
         </p:spPr>
         <p:txBody>
-          <a:bodyPr anchor="b"/>
+          <a:bodyPr anchor="b">
+            <a:noAutofit/>
+          </a:bodyPr>
           <a:lstStyle>
-            <a:lvl1pPr marL="0" indent="0">
-              <a:buNone/>
-              <a:defRPr sz="2400" b="1"/>
+            <a:lvl1pPr marL="0" indent="0" algn="ctr">
+              <a:buNone/>
+              <a:defRPr sz="2000" b="1">
+                <a:solidFill>
+                  <a:schemeClr val="tx2"/>
+                </a:solidFill>
+              </a:defRPr>
             </a:lvl1pPr>
             <a:lvl2pPr marL="457200" indent="0">
               <a:buNone/>
@@ -1528,7 +1523,7 @@
         <p:spPr>
           <a:xfrm>
             <a:off x="457200" y="2174875"/>
-            <a:ext cx="4040188" cy="3951288"/>
+            <a:ext cx="3657600" cy="3951288"/>
           </a:xfrm>
         </p:spPr>
         <p:txBody>
@@ -1596,7 +1591,7 @@
               <a:rPr lang="en-US" smtClean="0"/>
               <a:t>Fifth level</a:t>
             </a:r>
-            <a:endParaRPr lang="pt-BR"/>
+            <a:endParaRPr lang="en-US" dirty="0"/>
           </a:p>
         </p:txBody>
       </p:sp>
@@ -1612,16 +1607,22 @@
         </p:nvSpPr>
         <p:spPr>
           <a:xfrm>
-            <a:off x="4645025" y="1535113"/>
-            <a:ext cx="4041775" cy="639762"/>
+            <a:off x="4419600" y="1535113"/>
+            <a:ext cx="3657600" cy="639762"/>
           </a:xfrm>
         </p:spPr>
         <p:txBody>
-          <a:bodyPr anchor="b"/>
+          <a:bodyPr anchor="b">
+            <a:noAutofit/>
+          </a:bodyPr>
           <a:lstStyle>
-            <a:lvl1pPr marL="0" indent="0">
-              <a:buNone/>
-              <a:defRPr sz="2400" b="1"/>
+            <a:lvl1pPr marL="0" indent="0" algn="ctr">
+              <a:buNone/>
+              <a:defRPr sz="2000" b="1">
+                <a:solidFill>
+                  <a:schemeClr val="tx2"/>
+                </a:solidFill>
+              </a:defRPr>
             </a:lvl1pPr>
             <a:lvl2pPr marL="457200" indent="0">
               <a:buNone/>
@@ -1677,8 +1678,8 @@
         </p:nvSpPr>
         <p:spPr>
           <a:xfrm>
-            <a:off x="4645025" y="2174875"/>
-            <a:ext cx="4041775" cy="3951288"/>
+            <a:off x="4419600" y="2174875"/>
+            <a:ext cx="3657600" cy="3951288"/>
           </a:xfrm>
         </p:spPr>
         <p:txBody>
@@ -1746,7 +1747,7 @@
               <a:rPr lang="en-US" smtClean="0"/>
               <a:t>Fifth level</a:t>
             </a:r>
-            <a:endParaRPr lang="pt-BR"/>
+            <a:endParaRPr lang="en-US"/>
           </a:p>
         </p:txBody>
       </p:sp>
@@ -1816,11 +1817,6 @@
         </p:txBody>
       </p:sp>
     </p:spTree>
-    <p:extLst>
-      <p:ext uri="{BB962C8B-B14F-4D97-AF65-F5344CB8AC3E}">
-        <p14:creationId xmlns:p14="http://schemas.microsoft.com/office/powerpoint/2010/main" val="1070159796"/>
-      </p:ext>
-    </p:extLst>
   </p:cSld>
   <p:clrMapOvr>
     <a:masterClrMapping/>
@@ -1864,7 +1860,7 @@
               <a:rPr lang="en-US" smtClean="0"/>
               <a:t>Click to edit Master title style</a:t>
             </a:r>
-            <a:endParaRPr lang="pt-BR"/>
+            <a:endParaRPr lang="en-US"/>
           </a:p>
         </p:txBody>
       </p:sp>
@@ -1934,11 +1930,6 @@
         </p:txBody>
       </p:sp>
     </p:spTree>
-    <p:extLst>
-      <p:ext uri="{BB962C8B-B14F-4D97-AF65-F5344CB8AC3E}">
-        <p14:creationId xmlns:p14="http://schemas.microsoft.com/office/powerpoint/2010/main" val="1266953729"/>
-      </p:ext>
-    </p:extLst>
   </p:cSld>
   <p:clrMapOvr>
     <a:masterClrMapping/>
@@ -2029,11 +2020,6 @@
         </p:txBody>
       </p:sp>
     </p:spTree>
-    <p:extLst>
-      <p:ext uri="{BB962C8B-B14F-4D97-AF65-F5344CB8AC3E}">
-        <p14:creationId xmlns:p14="http://schemas.microsoft.com/office/powerpoint/2010/main" val="3552321971"/>
-      </p:ext>
-    </p:extLst>
   </p:cSld>
   <p:clrMapOvr>
     <a:masterClrMapping/>
@@ -2070,15 +2056,15 @@
         </p:nvSpPr>
         <p:spPr>
           <a:xfrm>
-            <a:off x="457200" y="273050"/>
-            <a:ext cx="3008313" cy="1162050"/>
+            <a:off x="304801" y="5495544"/>
+            <a:ext cx="7772400" cy="594360"/>
           </a:xfrm>
         </p:spPr>
         <p:txBody>
           <a:bodyPr anchor="b"/>
           <a:lstStyle>
-            <a:lvl1pPr algn="l">
-              <a:defRPr sz="2000" b="1"/>
+            <a:lvl1pPr algn="ctr">
+              <a:defRPr sz="2200" b="1"/>
             </a:lvl1pPr>
           </a:lstStyle>
           <a:p>
@@ -2086,117 +2072,34 @@
               <a:rPr lang="en-US" smtClean="0"/>
               <a:t>Click to edit Master title style</a:t>
             </a:r>
-            <a:endParaRPr lang="pt-BR"/>
-          </a:p>
-        </p:txBody>
-      </p:sp>
-      <p:sp>
-        <p:nvSpPr>
-          <p:cNvPr id="3" name="Content Placeholder 2"/>
-          <p:cNvSpPr>
-            <a:spLocks noGrp="1"/>
-          </p:cNvSpPr>
-          <p:nvPr>
-            <p:ph idx="1"/>
+            <a:endParaRPr lang="en-US" dirty="0"/>
+          </a:p>
+        </p:txBody>
+      </p:sp>
+      <p:sp>
+        <p:nvSpPr>
+          <p:cNvPr id="4" name="Text Placeholder 3"/>
+          <p:cNvSpPr>
+            <a:spLocks noGrp="1"/>
+          </p:cNvSpPr>
+          <p:nvPr>
+            <p:ph type="body" sz="half" idx="2"/>
           </p:nvPr>
         </p:nvSpPr>
         <p:spPr>
           <a:xfrm>
-            <a:off x="3575050" y="273050"/>
-            <a:ext cx="5111750" cy="5853113"/>
+            <a:off x="304799" y="6096000"/>
+            <a:ext cx="7772401" cy="609600"/>
           </a:xfrm>
         </p:spPr>
         <p:txBody>
-          <a:bodyPr/>
+          <a:bodyPr>
+            <a:normAutofit/>
+          </a:bodyPr>
           <a:lstStyle>
-            <a:lvl1pPr>
-              <a:defRPr sz="3200"/>
-            </a:lvl1pPr>
-            <a:lvl2pPr>
-              <a:defRPr sz="2800"/>
-            </a:lvl2pPr>
-            <a:lvl3pPr>
-              <a:defRPr sz="2400"/>
-            </a:lvl3pPr>
-            <a:lvl4pPr>
-              <a:defRPr sz="2000"/>
-            </a:lvl4pPr>
-            <a:lvl5pPr>
-              <a:defRPr sz="2000"/>
-            </a:lvl5pPr>
-            <a:lvl6pPr>
-              <a:defRPr sz="2000"/>
-            </a:lvl6pPr>
-            <a:lvl7pPr>
-              <a:defRPr sz="2000"/>
-            </a:lvl7pPr>
-            <a:lvl8pPr>
-              <a:defRPr sz="2000"/>
-            </a:lvl8pPr>
-            <a:lvl9pPr>
-              <a:defRPr sz="2000"/>
-            </a:lvl9pPr>
-          </a:lstStyle>
-          <a:p>
-            <a:pPr lvl="0"/>
-            <a:r>
-              <a:rPr lang="en-US" smtClean="0"/>
-              <a:t>Click to edit Master text styles</a:t>
-            </a:r>
-          </a:p>
-          <a:p>
-            <a:pPr lvl="1"/>
-            <a:r>
-              <a:rPr lang="en-US" smtClean="0"/>
-              <a:t>Second level</a:t>
-            </a:r>
-          </a:p>
-          <a:p>
-            <a:pPr lvl="2"/>
-            <a:r>
-              <a:rPr lang="en-US" smtClean="0"/>
-              <a:t>Third level</a:t>
-            </a:r>
-          </a:p>
-          <a:p>
-            <a:pPr lvl="3"/>
-            <a:r>
-              <a:rPr lang="en-US" smtClean="0"/>
-              <a:t>Fourth level</a:t>
-            </a:r>
-          </a:p>
-          <a:p>
-            <a:pPr lvl="4"/>
-            <a:r>
-              <a:rPr lang="en-US" smtClean="0"/>
-              <a:t>Fifth level</a:t>
-            </a:r>
-            <a:endParaRPr lang="pt-BR"/>
-          </a:p>
-        </p:txBody>
-      </p:sp>
-      <p:sp>
-        <p:nvSpPr>
-          <p:cNvPr id="4" name="Text Placeholder 3"/>
-          <p:cNvSpPr>
-            <a:spLocks noGrp="1"/>
-          </p:cNvSpPr>
-          <p:nvPr>
-            <p:ph type="body" sz="half" idx="2"/>
-          </p:nvPr>
-        </p:nvSpPr>
-        <p:spPr>
-          <a:xfrm>
-            <a:off x="457200" y="1435100"/>
-            <a:ext cx="3008313" cy="4691063"/>
-          </a:xfrm>
-        </p:spPr>
-        <p:txBody>
-          <a:bodyPr/>
-          <a:lstStyle>
-            <a:lvl1pPr marL="0" indent="0">
-              <a:buNone/>
-              <a:defRPr sz="1400"/>
+            <a:lvl1pPr marL="0" indent="0" algn="ctr">
+              <a:buNone/>
+              <a:defRPr sz="1600"/>
             </a:lvl1pPr>
             <a:lvl2pPr marL="457200" indent="0">
               <a:buNone/>
@@ -2305,12 +2208,64 @@
           </a:p>
         </p:txBody>
       </p:sp>
+      <p:sp>
+        <p:nvSpPr>
+          <p:cNvPr id="9" name="Content Placeholder 8"/>
+          <p:cNvSpPr>
+            <a:spLocks noGrp="1"/>
+          </p:cNvSpPr>
+          <p:nvPr>
+            <p:ph sz="quarter" idx="13"/>
+          </p:nvPr>
+        </p:nvSpPr>
+        <p:spPr>
+          <a:xfrm>
+            <a:off x="304800" y="381000"/>
+            <a:ext cx="7772400" cy="4942840"/>
+          </a:xfrm>
+        </p:spPr>
+        <p:txBody>
+          <a:bodyPr/>
+          <a:lstStyle/>
+          <a:p>
+            <a:pPr lvl="0"/>
+            <a:r>
+              <a:rPr lang="en-US" smtClean="0"/>
+              <a:t>Click to edit Master text styles</a:t>
+            </a:r>
+          </a:p>
+          <a:p>
+            <a:pPr lvl="1"/>
+            <a:r>
+              <a:rPr lang="en-US" smtClean="0"/>
+              <a:t>Second level</a:t>
+            </a:r>
+          </a:p>
+          <a:p>
+            <a:pPr lvl="2"/>
+            <a:r>
+              <a:rPr lang="en-US" smtClean="0"/>
+              <a:t>Third level</a:t>
+            </a:r>
+          </a:p>
+          <a:p>
+            <a:pPr lvl="3"/>
+            <a:r>
+              <a:rPr lang="en-US" smtClean="0"/>
+              <a:t>Fourth level</a:t>
+            </a:r>
+          </a:p>
+          <a:p>
+            <a:pPr lvl="4"/>
+            <a:r>
+              <a:rPr lang="en-US" smtClean="0"/>
+              <a:t>Fifth level</a:t>
+            </a:r>
+            <a:endParaRPr lang="en-US"/>
+          </a:p>
+        </p:txBody>
+      </p:sp>
     </p:spTree>
-    <p:extLst>
-      <p:ext uri="{BB962C8B-B14F-4D97-AF65-F5344CB8AC3E}">
-        <p14:creationId xmlns:p14="http://schemas.microsoft.com/office/powerpoint/2010/main" val="1744598552"/>
-      </p:ext>
-    </p:extLst>
   </p:cSld>
   <p:clrMapOvr>
     <a:masterClrMapping/>
@@ -2347,15 +2302,22 @@
         </p:nvSpPr>
         <p:spPr>
           <a:xfrm>
-            <a:off x="1792288" y="4800600"/>
-            <a:ext cx="5486400" cy="566738"/>
+            <a:off x="301752" y="5495278"/>
+            <a:ext cx="7772400" cy="594626"/>
           </a:xfrm>
         </p:spPr>
         <p:txBody>
           <a:bodyPr anchor="b"/>
           <a:lstStyle>
-            <a:lvl1pPr algn="l">
-              <a:defRPr sz="2000" b="1"/>
+            <a:lvl1pPr algn="ctr">
+              <a:defRPr sz="2200" b="1">
+                <a:ln>
+                  <a:noFill/>
+                </a:ln>
+                <a:solidFill>
+                  <a:schemeClr val="tx2"/>
+                </a:solidFill>
+              </a:defRPr>
             </a:lvl1pPr>
           </a:lstStyle>
           <a:p>
@@ -2363,7 +2325,7 @@
               <a:rPr lang="en-US" smtClean="0"/>
               <a:t>Click to edit Master title style</a:t>
             </a:r>
-            <a:endParaRPr lang="pt-BR"/>
+            <a:endParaRPr lang="en-US" dirty="0"/>
           </a:p>
         </p:txBody>
       </p:sp>
@@ -2379,8 +2341,8 @@
         </p:nvSpPr>
         <p:spPr>
           <a:xfrm>
-            <a:off x="1792288" y="612775"/>
-            <a:ext cx="5486400" cy="4114800"/>
+            <a:off x="0" y="0"/>
+            <a:ext cx="8458200" cy="5486400"/>
           </a:xfrm>
         </p:spPr>
         <p:txBody>
@@ -2424,7 +2386,11 @@
             </a:lvl9pPr>
           </a:lstStyle>
           <a:p>
-            <a:endParaRPr lang="pt-BR"/>
+            <a:r>
+              <a:rPr lang="en-US" smtClean="0"/>
+              <a:t>Click icon to add picture</a:t>
+            </a:r>
+            <a:endParaRPr lang="en-US" dirty="0"/>
           </a:p>
         </p:txBody>
       </p:sp>
@@ -2440,16 +2406,18 @@
         </p:nvSpPr>
         <p:spPr>
           <a:xfrm>
-            <a:off x="1792288" y="5367338"/>
-            <a:ext cx="5486400" cy="804862"/>
+            <a:off x="301752" y="6096000"/>
+            <a:ext cx="7772400" cy="612648"/>
           </a:xfrm>
         </p:spPr>
         <p:txBody>
-          <a:bodyPr/>
+          <a:bodyPr>
+            <a:normAutofit/>
+          </a:bodyPr>
           <a:lstStyle>
-            <a:lvl1pPr marL="0" indent="0">
-              <a:buNone/>
-              <a:defRPr sz="1400"/>
+            <a:lvl1pPr marL="0" indent="0" algn="ctr">
+              <a:buNone/>
+              <a:defRPr sz="1600"/>
             </a:lvl1pPr>
             <a:lvl2pPr marL="457200" indent="0">
               <a:buNone/>
@@ -2495,7 +2463,7 @@
       </p:sp>
       <p:sp>
         <p:nvSpPr>
-          <p:cNvPr id="5" name="Date Placeholder 4"/>
+          <p:cNvPr id="8" name="Date Placeholder 7"/>
           <p:cNvSpPr>
             <a:spLocks noGrp="1"/>
           </p:cNvSpPr>
@@ -2518,31 +2486,12 @@
       </p:sp>
       <p:sp>
         <p:nvSpPr>
-          <p:cNvPr id="6" name="Footer Placeholder 5"/>
-          <p:cNvSpPr>
-            <a:spLocks noGrp="1"/>
-          </p:cNvSpPr>
-          <p:nvPr>
-            <p:ph type="ftr" sz="quarter" idx="11"/>
-          </p:nvPr>
-        </p:nvSpPr>
-        <p:spPr/>
-        <p:txBody>
-          <a:bodyPr/>
-          <a:lstStyle/>
-          <a:p>
-            <a:endParaRPr lang="pt-BR"/>
-          </a:p>
-        </p:txBody>
-      </p:sp>
-      <p:sp>
-        <p:nvSpPr>
-          <p:cNvPr id="7" name="Slide Number Placeholder 6"/>
-          <p:cNvSpPr>
-            <a:spLocks noGrp="1"/>
-          </p:cNvSpPr>
-          <p:nvPr>
-            <p:ph type="sldNum" sz="quarter" idx="12"/>
+          <p:cNvPr id="9" name="Slide Number Placeholder 8"/>
+          <p:cNvSpPr>
+            <a:spLocks noGrp="1"/>
+          </p:cNvSpPr>
+          <p:nvPr>
+            <p:ph type="sldNum" sz="quarter" idx="11"/>
           </p:nvPr>
         </p:nvSpPr>
         <p:spPr/>
@@ -2558,12 +2507,26 @@
           </a:p>
         </p:txBody>
       </p:sp>
+      <p:sp>
+        <p:nvSpPr>
+          <p:cNvPr id="10" name="Footer Placeholder 9"/>
+          <p:cNvSpPr>
+            <a:spLocks noGrp="1"/>
+          </p:cNvSpPr>
+          <p:nvPr>
+            <p:ph type="ftr" sz="quarter" idx="12"/>
+          </p:nvPr>
+        </p:nvSpPr>
+        <p:spPr/>
+        <p:txBody>
+          <a:bodyPr/>
+          <a:lstStyle/>
+          <a:p>
+            <a:endParaRPr lang="pt-BR"/>
+          </a:p>
+        </p:txBody>
+      </p:sp>
     </p:spTree>
-    <p:extLst>
-      <p:ext uri="{BB962C8B-B14F-4D97-AF65-F5344CB8AC3E}">
-        <p14:creationId xmlns:p14="http://schemas.microsoft.com/office/powerpoint/2010/main" val="1515185360"/>
-      </p:ext>
-    </p:extLst>
   </p:cSld>
   <p:clrMapOvr>
     <a:masterClrMapping/>
@@ -2575,7 +2538,7 @@
 <p:sldMaster xmlns:a="http://schemas.openxmlformats.org/drawingml/2006/main" xmlns:r="http://schemas.openxmlformats.org/officeDocument/2006/relationships" xmlns:p="http://schemas.openxmlformats.org/presentationml/2006/main">
   <p:cSld>
     <p:bg>
-      <p:bgRef idx="1001">
+      <p:bgRef idx="1002">
         <a:schemeClr val="bg1"/>
       </p:bgRef>
     </p:bg>
@@ -2606,7 +2569,7 @@
         <p:spPr>
           <a:xfrm>
             <a:off x="457200" y="274638"/>
-            <a:ext cx="8229600" cy="1143000"/>
+            <a:ext cx="7620000" cy="1143000"/>
           </a:xfrm>
           <a:prstGeom prst="rect">
             <a:avLst/>
@@ -2614,7 +2577,7 @@
         </p:spPr>
         <p:txBody>
           <a:bodyPr vert="horz" lIns="91440" tIns="45720" rIns="91440" bIns="45720" rtlCol="0" anchor="ctr">
-            <a:normAutofit/>
+            <a:noAutofit/>
           </a:bodyPr>
           <a:lstStyle/>
           <a:p>
@@ -2622,7 +2585,7 @@
               <a:rPr lang="en-US" smtClean="0"/>
               <a:t>Click to edit Master title style</a:t>
             </a:r>
-            <a:endParaRPr lang="pt-BR"/>
+            <a:endParaRPr lang="en-US" dirty="0"/>
           </a:p>
         </p:txBody>
       </p:sp>
@@ -2639,7 +2602,7 @@
         <p:spPr>
           <a:xfrm>
             <a:off x="457200" y="1600200"/>
-            <a:ext cx="8229600" cy="4525963"/>
+            <a:ext cx="7620000" cy="4800600"/>
           </a:xfrm>
           <a:prstGeom prst="rect">
             <a:avLst/>
@@ -2684,24 +2647,162 @@
               <a:rPr lang="en-US" smtClean="0"/>
               <a:t>Fifth level</a:t>
             </a:r>
-            <a:endParaRPr lang="pt-BR"/>
-          </a:p>
-        </p:txBody>
-      </p:sp>
-      <p:sp>
-        <p:nvSpPr>
-          <p:cNvPr id="4" name="Date Placeholder 3"/>
-          <p:cNvSpPr>
-            <a:spLocks noGrp="1"/>
-          </p:cNvSpPr>
-          <p:nvPr>
-            <p:ph type="dt" sz="half" idx="2"/>
-          </p:nvPr>
+            <a:endParaRPr lang="en-US" dirty="0"/>
+          </a:p>
+        </p:txBody>
+      </p:sp>
+      <p:sp>
+        <p:nvSpPr>
+          <p:cNvPr id="7" name="Rectangle 6"/>
+          <p:cNvSpPr/>
+          <p:nvPr/>
         </p:nvSpPr>
         <p:spPr>
           <a:xfrm>
-            <a:off x="457200" y="6356350"/>
-            <a:ext cx="2133600" cy="365125"/>
+            <a:off x="8458200" y="0"/>
+            <a:ext cx="685800" cy="6858000"/>
+          </a:xfrm>
+          <a:prstGeom prst="rect">
+            <a:avLst/>
+          </a:prstGeom>
+          <a:solidFill>
+            <a:schemeClr val="tx2"/>
+          </a:solidFill>
+          <a:ln>
+            <a:noFill/>
+          </a:ln>
+        </p:spPr>
+        <p:style>
+          <a:lnRef idx="2">
+            <a:schemeClr val="accent1">
+              <a:shade val="50000"/>
+            </a:schemeClr>
+          </a:lnRef>
+          <a:fillRef idx="1">
+            <a:schemeClr val="accent1"/>
+          </a:fillRef>
+          <a:effectRef idx="0">
+            <a:schemeClr val="accent1"/>
+          </a:effectRef>
+          <a:fontRef idx="minor">
+            <a:schemeClr val="lt1"/>
+          </a:fontRef>
+        </p:style>
+        <p:txBody>
+          <a:bodyPr rtlCol="0" anchor="ctr"/>
+          <a:lstStyle/>
+          <a:p>
+            <a:pPr algn="ctr"/>
+            <a:endParaRPr lang="en-US"/>
+          </a:p>
+        </p:txBody>
+      </p:sp>
+      <p:sp>
+        <p:nvSpPr>
+          <p:cNvPr id="8" name="Rectangle 7"/>
+          <p:cNvSpPr/>
+          <p:nvPr/>
+        </p:nvSpPr>
+        <p:spPr>
+          <a:xfrm>
+            <a:off x="8458200" y="5486400"/>
+            <a:ext cx="685800" cy="685800"/>
+          </a:xfrm>
+          <a:prstGeom prst="rect">
+            <a:avLst/>
+          </a:prstGeom>
+          <a:solidFill>
+            <a:schemeClr val="accent1"/>
+          </a:solidFill>
+          <a:ln>
+            <a:noFill/>
+          </a:ln>
+        </p:spPr>
+        <p:style>
+          <a:lnRef idx="2">
+            <a:schemeClr val="accent1">
+              <a:shade val="50000"/>
+            </a:schemeClr>
+          </a:lnRef>
+          <a:fillRef idx="1">
+            <a:schemeClr val="accent1"/>
+          </a:fillRef>
+          <a:effectRef idx="0">
+            <a:schemeClr val="accent1"/>
+          </a:effectRef>
+          <a:fontRef idx="minor">
+            <a:schemeClr val="lt1"/>
+          </a:fontRef>
+        </p:style>
+        <p:txBody>
+          <a:bodyPr rtlCol="0" anchor="ctr"/>
+          <a:lstStyle/>
+          <a:p>
+            <a:pPr algn="ctr"/>
+            <a:endParaRPr lang="en-US"/>
+          </a:p>
+        </p:txBody>
+      </p:sp>
+      <p:sp>
+        <p:nvSpPr>
+          <p:cNvPr id="6" name="Slide Number Placeholder 5"/>
+          <p:cNvSpPr>
+            <a:spLocks noGrp="1"/>
+          </p:cNvSpPr>
+          <p:nvPr>
+            <p:ph type="sldNum" sz="quarter" idx="4"/>
+          </p:nvPr>
+        </p:nvSpPr>
+        <p:spPr>
+          <a:xfrm>
+            <a:off x="8531788" y="5648960"/>
+            <a:ext cx="548640" cy="396240"/>
+          </a:xfrm>
+          <a:prstGeom prst="bracketPair">
+            <a:avLst>
+              <a:gd name="adj" fmla="val 17949"/>
+            </a:avLst>
+          </a:prstGeom>
+          <a:ln w="19050">
+            <a:solidFill>
+              <a:srgbClr val="FFFFFF"/>
+            </a:solidFill>
+          </a:ln>
+        </p:spPr>
+        <p:txBody>
+          <a:bodyPr vert="horz" lIns="0" tIns="0" rIns="0" bIns="0" rtlCol="0" anchor="ctr"/>
+          <a:lstStyle>
+            <a:lvl1pPr algn="ctr">
+              <a:defRPr sz="1800">
+                <a:solidFill>
+                  <a:srgbClr val="FFFFFF"/>
+                </a:solidFill>
+              </a:defRPr>
+            </a:lvl1pPr>
+          </a:lstStyle>
+          <a:p>
+            <a:fld id="{ACFF54AC-543E-40E0-B39A-9CBF6A6A60D2}" type="slidenum">
+              <a:rPr lang="pt-BR" smtClean="0"/>
+              <a:t>‹#›</a:t>
+            </a:fld>
+            <a:endParaRPr lang="pt-BR"/>
+          </a:p>
+        </p:txBody>
+      </p:sp>
+      <p:sp>
+        <p:nvSpPr>
+          <p:cNvPr id="5" name="Footer Placeholder 4"/>
+          <p:cNvSpPr>
+            <a:spLocks noGrp="1"/>
+          </p:cNvSpPr>
+          <p:nvPr>
+            <p:ph type="ftr" sz="quarter" idx="3"/>
+          </p:nvPr>
+        </p:nvSpPr>
+        <p:spPr>
+          <a:xfrm rot="16200000">
+            <a:off x="7586910" y="4048760"/>
+            <a:ext cx="2367281" cy="365760"/>
           </a:xfrm>
           <a:prstGeom prst="rect">
             <a:avLst/>
@@ -2710,12 +2811,45 @@
         <p:txBody>
           <a:bodyPr vert="horz" lIns="91440" tIns="45720" rIns="91440" bIns="45720" rtlCol="0" anchor="ctr"/>
           <a:lstStyle>
+            <a:lvl1pPr algn="r">
+              <a:defRPr sz="1200">
+                <a:solidFill>
+                  <a:schemeClr val="bg2"/>
+                </a:solidFill>
+              </a:defRPr>
+            </a:lvl1pPr>
+          </a:lstStyle>
+          <a:p>
+            <a:endParaRPr lang="pt-BR"/>
+          </a:p>
+        </p:txBody>
+      </p:sp>
+      <p:sp>
+        <p:nvSpPr>
+          <p:cNvPr id="4" name="Date Placeholder 3"/>
+          <p:cNvSpPr>
+            <a:spLocks noGrp="1"/>
+          </p:cNvSpPr>
+          <p:nvPr>
+            <p:ph type="dt" sz="half" idx="2"/>
+          </p:nvPr>
+        </p:nvSpPr>
+        <p:spPr>
+          <a:xfrm rot="16200000">
+            <a:off x="7551351" y="1645920"/>
+            <a:ext cx="2438399" cy="365760"/>
+          </a:xfrm>
+          <a:prstGeom prst="rect">
+            <a:avLst/>
+          </a:prstGeom>
+        </p:spPr>
+        <p:txBody>
+          <a:bodyPr vert="horz" lIns="91440" tIns="45720" rIns="91440" bIns="45720" rtlCol="0" anchor="ctr"/>
+          <a:lstStyle>
             <a:lvl1pPr algn="l">
               <a:defRPr sz="1200">
                 <a:solidFill>
-                  <a:schemeClr val="tx1">
-                    <a:tint val="75000"/>
-                  </a:schemeClr>
+                  <a:schemeClr val="bg2"/>
                 </a:solidFill>
               </a:defRPr>
             </a:lvl1pPr>
@@ -2729,116 +2863,37 @@
           </a:p>
         </p:txBody>
       </p:sp>
-      <p:sp>
-        <p:nvSpPr>
-          <p:cNvPr id="5" name="Footer Placeholder 4"/>
-          <p:cNvSpPr>
-            <a:spLocks noGrp="1"/>
-          </p:cNvSpPr>
-          <p:nvPr>
-            <p:ph type="ftr" sz="quarter" idx="3"/>
-          </p:nvPr>
-        </p:nvSpPr>
-        <p:spPr>
-          <a:xfrm>
-            <a:off x="3124200" y="6356350"/>
-            <a:ext cx="2895600" cy="365125"/>
-          </a:xfrm>
-          <a:prstGeom prst="rect">
-            <a:avLst/>
-          </a:prstGeom>
-        </p:spPr>
-        <p:txBody>
-          <a:bodyPr vert="horz" lIns="91440" tIns="45720" rIns="91440" bIns="45720" rtlCol="0" anchor="ctr"/>
-          <a:lstStyle>
-            <a:lvl1pPr algn="ctr">
-              <a:defRPr sz="1200">
-                <a:solidFill>
-                  <a:schemeClr val="tx1">
-                    <a:tint val="75000"/>
-                  </a:schemeClr>
-                </a:solidFill>
-              </a:defRPr>
-            </a:lvl1pPr>
-          </a:lstStyle>
-          <a:p>
-            <a:endParaRPr lang="pt-BR"/>
-          </a:p>
-        </p:txBody>
-      </p:sp>
-      <p:sp>
-        <p:nvSpPr>
-          <p:cNvPr id="6" name="Slide Number Placeholder 5"/>
-          <p:cNvSpPr>
-            <a:spLocks noGrp="1"/>
-          </p:cNvSpPr>
-          <p:nvPr>
-            <p:ph type="sldNum" sz="quarter" idx="4"/>
-          </p:nvPr>
-        </p:nvSpPr>
-        <p:spPr>
-          <a:xfrm>
-            <a:off x="6553200" y="6356350"/>
-            <a:ext cx="2133600" cy="365125"/>
-          </a:xfrm>
-          <a:prstGeom prst="rect">
-            <a:avLst/>
-          </a:prstGeom>
-        </p:spPr>
-        <p:txBody>
-          <a:bodyPr vert="horz" lIns="91440" tIns="45720" rIns="91440" bIns="45720" rtlCol="0" anchor="ctr"/>
-          <a:lstStyle>
-            <a:lvl1pPr algn="r">
-              <a:defRPr sz="1200">
-                <a:solidFill>
-                  <a:schemeClr val="tx1">
-                    <a:tint val="75000"/>
-                  </a:schemeClr>
-                </a:solidFill>
-              </a:defRPr>
-            </a:lvl1pPr>
-          </a:lstStyle>
-          <a:p>
-            <a:fld id="{ACFF54AC-543E-40E0-B39A-9CBF6A6A60D2}" type="slidenum">
-              <a:rPr lang="pt-BR" smtClean="0"/>
-              <a:t>‹#›</a:t>
-            </a:fld>
-            <a:endParaRPr lang="pt-BR"/>
-          </a:p>
-        </p:txBody>
-      </p:sp>
     </p:spTree>
-    <p:extLst>
-      <p:ext uri="{BB962C8B-B14F-4D97-AF65-F5344CB8AC3E}">
-        <p14:creationId xmlns:p14="http://schemas.microsoft.com/office/powerpoint/2010/main" val="750559978"/>
-      </p:ext>
-    </p:extLst>
   </p:cSld>
   <p:clrMap bg1="lt1" tx1="dk1" bg2="lt2" tx2="dk2" accent1="accent1" accent2="accent2" accent3="accent3" accent4="accent4" accent5="accent5" accent6="accent6" hlink="hlink" folHlink="folHlink"/>
   <p:sldLayoutIdLst>
-    <p:sldLayoutId id="2147483649" r:id="rId1"/>
-    <p:sldLayoutId id="2147483650" r:id="rId2"/>
-    <p:sldLayoutId id="2147483651" r:id="rId3"/>
-    <p:sldLayoutId id="2147483652" r:id="rId4"/>
-    <p:sldLayoutId id="2147483653" r:id="rId5"/>
-    <p:sldLayoutId id="2147483654" r:id="rId6"/>
-    <p:sldLayoutId id="2147483655" r:id="rId7"/>
-    <p:sldLayoutId id="2147483656" r:id="rId8"/>
-    <p:sldLayoutId id="2147483657" r:id="rId9"/>
-    <p:sldLayoutId id="2147483658" r:id="rId10"/>
-    <p:sldLayoutId id="2147483659" r:id="rId11"/>
+    <p:sldLayoutId id="2147483661" r:id="rId1"/>
+    <p:sldLayoutId id="2147483662" r:id="rId2"/>
+    <p:sldLayoutId id="2147483663" r:id="rId3"/>
+    <p:sldLayoutId id="2147483664" r:id="rId4"/>
+    <p:sldLayoutId id="2147483665" r:id="rId5"/>
+    <p:sldLayoutId id="2147483666" r:id="rId6"/>
+    <p:sldLayoutId id="2147483667" r:id="rId7"/>
+    <p:sldLayoutId id="2147483668" r:id="rId8"/>
+    <p:sldLayoutId id="2147483669" r:id="rId9"/>
+    <p:sldLayoutId id="2147483670" r:id="rId10"/>
+    <p:sldLayoutId id="2147483671" r:id="rId11"/>
   </p:sldLayoutIdLst>
   <p:txStyles>
     <p:titleStyle>
-      <a:lvl1pPr algn="ctr" defTabSz="914400" rtl="0" eaLnBrk="1" latinLnBrk="0" hangingPunct="1">
+      <a:lvl1pPr algn="l" defTabSz="914400" rtl="0" eaLnBrk="1" latinLnBrk="0" hangingPunct="1">
         <a:spcBef>
           <a:spcPct val="0"/>
         </a:spcBef>
         <a:buNone/>
-        <a:defRPr sz="4400" kern="1200">
+        <a:defRPr sz="4600" kern="1200" cap="none" spc="-100" baseline="0">
+          <a:ln>
+            <a:noFill/>
+          </a:ln>
           <a:solidFill>
-            <a:schemeClr val="tx1"/>
+            <a:schemeClr val="tx2"/>
           </a:solidFill>
+          <a:effectLst/>
           <a:latin typeface="+mj-lt"/>
           <a:ea typeface="+mj-ea"/>
           <a:cs typeface="+mj-cs"/>
@@ -2846,13 +2901,16 @@
       </a:lvl1pPr>
     </p:titleStyle>
     <p:bodyStyle>
-      <a:lvl1pPr marL="342900" indent="-342900" algn="l" defTabSz="914400" rtl="0" eaLnBrk="1" latinLnBrk="0" hangingPunct="1">
+      <a:lvl1pPr marL="342900" indent="-228600" algn="l" defTabSz="914400" rtl="0" eaLnBrk="1" latinLnBrk="0" hangingPunct="1">
         <a:spcBef>
           <a:spcPct val="20000"/>
         </a:spcBef>
+        <a:buClr>
+          <a:schemeClr val="accent1"/>
+        </a:buClr>
         <a:buFont typeface="Arial" pitchFamily="34" charset="0"/>
         <a:buChar char="•"/>
-        <a:defRPr sz="3200" kern="1200">
+        <a:defRPr sz="2200" kern="1200">
           <a:solidFill>
             <a:schemeClr val="tx1"/>
           </a:solidFill>
@@ -2861,70 +2919,13 @@
           <a:cs typeface="+mn-cs"/>
         </a:defRPr>
       </a:lvl1pPr>
-      <a:lvl2pPr marL="742950" indent="-285750" algn="l" defTabSz="914400" rtl="0" eaLnBrk="1" latinLnBrk="0" hangingPunct="1">
+      <a:lvl2pPr marL="640080" indent="-228600" algn="l" defTabSz="914400" rtl="0" eaLnBrk="1" latinLnBrk="0" hangingPunct="1">
         <a:spcBef>
           <a:spcPct val="20000"/>
         </a:spcBef>
-        <a:buFont typeface="Arial" pitchFamily="34" charset="0"/>
-        <a:buChar char="–"/>
-        <a:defRPr sz="2800" kern="1200">
-          <a:solidFill>
-            <a:schemeClr val="tx1"/>
-          </a:solidFill>
-          <a:latin typeface="+mn-lt"/>
-          <a:ea typeface="+mn-ea"/>
-          <a:cs typeface="+mn-cs"/>
-        </a:defRPr>
-      </a:lvl2pPr>
-      <a:lvl3pPr marL="1143000" indent="-228600" algn="l" defTabSz="914400" rtl="0" eaLnBrk="1" latinLnBrk="0" hangingPunct="1">
-        <a:spcBef>
-          <a:spcPct val="20000"/>
-        </a:spcBef>
-        <a:buFont typeface="Arial" pitchFamily="34" charset="0"/>
-        <a:buChar char="•"/>
-        <a:defRPr sz="2400" kern="1200">
-          <a:solidFill>
-            <a:schemeClr val="tx1"/>
-          </a:solidFill>
-          <a:latin typeface="+mn-lt"/>
-          <a:ea typeface="+mn-ea"/>
-          <a:cs typeface="+mn-cs"/>
-        </a:defRPr>
-      </a:lvl3pPr>
-      <a:lvl4pPr marL="1600200" indent="-228600" algn="l" defTabSz="914400" rtl="0" eaLnBrk="1" latinLnBrk="0" hangingPunct="1">
-        <a:spcBef>
-          <a:spcPct val="20000"/>
-        </a:spcBef>
-        <a:buFont typeface="Arial" pitchFamily="34" charset="0"/>
-        <a:buChar char="–"/>
-        <a:defRPr sz="2000" kern="1200">
-          <a:solidFill>
-            <a:schemeClr val="tx1"/>
-          </a:solidFill>
-          <a:latin typeface="+mn-lt"/>
-          <a:ea typeface="+mn-ea"/>
-          <a:cs typeface="+mn-cs"/>
-        </a:defRPr>
-      </a:lvl4pPr>
-      <a:lvl5pPr marL="2057400" indent="-228600" algn="l" defTabSz="914400" rtl="0" eaLnBrk="1" latinLnBrk="0" hangingPunct="1">
-        <a:spcBef>
-          <a:spcPct val="20000"/>
-        </a:spcBef>
-        <a:buFont typeface="Arial" pitchFamily="34" charset="0"/>
-        <a:buChar char="»"/>
-        <a:defRPr sz="2000" kern="1200">
-          <a:solidFill>
-            <a:schemeClr val="tx1"/>
-          </a:solidFill>
-          <a:latin typeface="+mn-lt"/>
-          <a:ea typeface="+mn-ea"/>
-          <a:cs typeface="+mn-cs"/>
-        </a:defRPr>
-      </a:lvl5pPr>
-      <a:lvl6pPr marL="2514600" indent="-228600" algn="l" defTabSz="914400" rtl="0" eaLnBrk="1" latinLnBrk="0" hangingPunct="1">
-        <a:spcBef>
-          <a:spcPct val="20000"/>
-        </a:spcBef>
+        <a:buClr>
+          <a:schemeClr val="accent2"/>
+        </a:buClr>
         <a:buFont typeface="Arial" pitchFamily="34" charset="0"/>
         <a:buChar char="•"/>
         <a:defRPr sz="2000" kern="1200">
@@ -2935,14 +2936,89 @@
           <a:ea typeface="+mn-ea"/>
           <a:cs typeface="+mn-cs"/>
         </a:defRPr>
-      </a:lvl6pPr>
-      <a:lvl7pPr marL="2971800" indent="-228600" algn="l" defTabSz="914400" rtl="0" eaLnBrk="1" latinLnBrk="0" hangingPunct="1">
+      </a:lvl2pPr>
+      <a:lvl3pPr marL="1005840" indent="-228600" algn="l" defTabSz="914400" rtl="0" eaLnBrk="1" latinLnBrk="0" hangingPunct="1">
         <a:spcBef>
           <a:spcPct val="20000"/>
         </a:spcBef>
+        <a:buClr>
+          <a:schemeClr val="accent3"/>
+        </a:buClr>
         <a:buFont typeface="Arial" pitchFamily="34" charset="0"/>
         <a:buChar char="•"/>
-        <a:defRPr sz="2000" kern="1200">
+        <a:defRPr sz="1800" kern="1200">
+          <a:solidFill>
+            <a:schemeClr val="tx1"/>
+          </a:solidFill>
+          <a:latin typeface="+mn-lt"/>
+          <a:ea typeface="+mn-ea"/>
+          <a:cs typeface="+mn-cs"/>
+        </a:defRPr>
+      </a:lvl3pPr>
+      <a:lvl4pPr marL="1280160" indent="-228600" algn="l" defTabSz="914400" rtl="0" eaLnBrk="1" latinLnBrk="0" hangingPunct="1">
+        <a:spcBef>
+          <a:spcPct val="20000"/>
+        </a:spcBef>
+        <a:buClr>
+          <a:schemeClr val="accent4"/>
+        </a:buClr>
+        <a:buFont typeface="Arial" pitchFamily="34" charset="0"/>
+        <a:buChar char="•"/>
+        <a:defRPr sz="1600" kern="1200">
+          <a:solidFill>
+            <a:schemeClr val="tx1"/>
+          </a:solidFill>
+          <a:latin typeface="+mn-lt"/>
+          <a:ea typeface="+mn-ea"/>
+          <a:cs typeface="+mn-cs"/>
+        </a:defRPr>
+      </a:lvl4pPr>
+      <a:lvl5pPr marL="1554480" indent="-228600" algn="l" defTabSz="914400" rtl="0" eaLnBrk="1" latinLnBrk="0" hangingPunct="1">
+        <a:spcBef>
+          <a:spcPct val="20000"/>
+        </a:spcBef>
+        <a:buClr>
+          <a:schemeClr val="accent5"/>
+        </a:buClr>
+        <a:buFont typeface="Arial" pitchFamily="34" charset="0"/>
+        <a:buChar char="•"/>
+        <a:defRPr sz="1400" kern="1200" baseline="0">
+          <a:solidFill>
+            <a:schemeClr val="tx1"/>
+          </a:solidFill>
+          <a:latin typeface="+mn-lt"/>
+          <a:ea typeface="+mn-ea"/>
+          <a:cs typeface="+mn-cs"/>
+        </a:defRPr>
+      </a:lvl5pPr>
+      <a:lvl6pPr marL="1737360" indent="-182880" algn="l" defTabSz="914400" rtl="0" eaLnBrk="1" latinLnBrk="0" hangingPunct="1">
+        <a:spcBef>
+          <a:spcPct val="20000"/>
+        </a:spcBef>
+        <a:buClr>
+          <a:schemeClr val="accent1"/>
+        </a:buClr>
+        <a:buFont typeface="Arial" pitchFamily="34" charset="0"/>
+        <a:buChar char="•"/>
+        <a:defRPr sz="1400" kern="1200" baseline="0">
+          <a:solidFill>
+            <a:schemeClr val="tx1"/>
+          </a:solidFill>
+          <a:latin typeface="+mn-lt"/>
+          <a:ea typeface="+mn-ea"/>
+          <a:cs typeface="+mn-cs"/>
+        </a:defRPr>
+      </a:lvl6pPr>
+      <a:lvl7pPr marL="1920240" indent="-182880" algn="l" defTabSz="914400" rtl="0" eaLnBrk="1" latinLnBrk="0" hangingPunct="1">
+        <a:spcBef>
+          <a:spcPct val="20000"/>
+        </a:spcBef>
+        <a:buClr>
+          <a:schemeClr val="accent2"/>
+        </a:buClr>
+        <a:buFont typeface="Arial" pitchFamily="34" charset="0"/>
+        <a:buChar char="•"/>
+        <a:defRPr sz="1400" kern="1200">
           <a:solidFill>
             <a:schemeClr val="tx1"/>
           </a:solidFill>
@@ -2951,13 +3027,16 @@
           <a:cs typeface="+mn-cs"/>
         </a:defRPr>
       </a:lvl7pPr>
-      <a:lvl8pPr marL="3429000" indent="-228600" algn="l" defTabSz="914400" rtl="0" eaLnBrk="1" latinLnBrk="0" hangingPunct="1">
+      <a:lvl8pPr marL="2103120" indent="-182880" algn="l" defTabSz="914400" rtl="0" eaLnBrk="1" latinLnBrk="0" hangingPunct="1">
         <a:spcBef>
           <a:spcPct val="20000"/>
         </a:spcBef>
+        <a:buClr>
+          <a:schemeClr val="accent3"/>
+        </a:buClr>
         <a:buFont typeface="Arial" pitchFamily="34" charset="0"/>
         <a:buChar char="•"/>
-        <a:defRPr sz="2000" kern="1200">
+        <a:defRPr sz="1400" kern="1200">
           <a:solidFill>
             <a:schemeClr val="tx1"/>
           </a:solidFill>
@@ -2966,13 +3045,16 @@
           <a:cs typeface="+mn-cs"/>
         </a:defRPr>
       </a:lvl8pPr>
-      <a:lvl9pPr marL="3886200" indent="-228600" algn="l" defTabSz="914400" rtl="0" eaLnBrk="1" latinLnBrk="0" hangingPunct="1">
+      <a:lvl9pPr marL="2286000" indent="-182880" algn="l" defTabSz="914400" rtl="0" eaLnBrk="1" latinLnBrk="0" hangingPunct="1">
         <a:spcBef>
           <a:spcPct val="20000"/>
         </a:spcBef>
+        <a:buClr>
+          <a:schemeClr val="accent4"/>
+        </a:buClr>
         <a:buFont typeface="Arial" pitchFamily="34" charset="0"/>
         <a:buChar char="•"/>
-        <a:defRPr sz="2000" kern="1200">
+        <a:defRPr sz="1400" kern="1200">
           <a:solidFill>
             <a:schemeClr val="tx1"/>
           </a:solidFill>
@@ -2984,7 +3066,7 @@
     </p:bodyStyle>
     <p:otherStyle>
       <a:defPPr>
-        <a:defRPr lang="pt-BR"/>
+        <a:defRPr lang="en-US"/>
       </a:defPPr>
       <a:lvl1pPr marL="0" algn="l" defTabSz="914400" rtl="0" eaLnBrk="1" latinLnBrk="0" hangingPunct="1">
         <a:defRPr sz="1800" kern="1200">
@@ -3134,7 +3216,7 @@
         <p:spPr/>
         <p:txBody>
           <a:bodyPr>
-            <a:normAutofit fontScale="92500" lnSpcReduction="20000"/>
+            <a:normAutofit fontScale="55000" lnSpcReduction="20000"/>
           </a:bodyPr>
           <a:lstStyle/>
           <a:p>
@@ -3170,6 +3252,59 @@
     <p:extLst>
       <p:ext uri="{BB962C8B-B14F-4D97-AF65-F5344CB8AC3E}">
         <p14:creationId xmlns:p14="http://schemas.microsoft.com/office/powerpoint/2010/main" val="3477128048"/>
+      </p:ext>
+    </p:extLst>
+  </p:cSld>
+  <p:clrMapOvr>
+    <a:masterClrMapping/>
+  </p:clrMapOvr>
+</p:sld>
+</file>
+
+<file path=ppt/slides/slide10.xml><?xml version="1.0" encoding="utf-8"?>
+<p:sld xmlns:a="http://schemas.openxmlformats.org/drawingml/2006/main" xmlns:r="http://schemas.openxmlformats.org/officeDocument/2006/relationships" xmlns:p="http://schemas.openxmlformats.org/presentationml/2006/main">
+  <p:cSld>
+    <p:spTree>
+      <p:nvGrpSpPr>
+        <p:cNvPr id="1" name=""/>
+        <p:cNvGrpSpPr/>
+        <p:nvPr/>
+      </p:nvGrpSpPr>
+      <p:grpSpPr>
+        <a:xfrm>
+          <a:off x="0" y="0"/>
+          <a:ext cx="0" cy="0"/>
+          <a:chOff x="0" y="0"/>
+          <a:chExt cx="0" cy="0"/>
+        </a:xfrm>
+      </p:grpSpPr>
+      <p:sp>
+        <p:nvSpPr>
+          <p:cNvPr id="2" name="Title 1"/>
+          <p:cNvSpPr>
+            <a:spLocks noGrp="1"/>
+          </p:cNvSpPr>
+          <p:nvPr>
+            <p:ph type="title"/>
+          </p:nvPr>
+        </p:nvSpPr>
+        <p:spPr/>
+        <p:txBody>
+          <a:bodyPr/>
+          <a:lstStyle/>
+          <a:p>
+            <a:r>
+              <a:rPr lang="pt-BR" dirty="0" smtClean="0"/>
+              <a:t>Relatório</a:t>
+            </a:r>
+            <a:endParaRPr lang="pt-BR" dirty="0"/>
+          </a:p>
+        </p:txBody>
+      </p:sp>
+    </p:spTree>
+    <p:extLst>
+      <p:ext uri="{BB962C8B-B14F-4D97-AF65-F5344CB8AC3E}">
+        <p14:creationId xmlns:p14="http://schemas.microsoft.com/office/powerpoint/2010/main" val="3053914023"/>
       </p:ext>
     </p:extLst>
   </p:cSld>
@@ -3252,8 +3387,26 @@
             </a:r>
             <a:r>
               <a:rPr lang="pt-BR" dirty="0" smtClean="0"/>
-              <a:t>, que é um software para relatos desde tipo.</a:t>
-            </a:r>
+              <a:t>, que é um software para relatos desde tipo</a:t>
+            </a:r>
+            <a:r>
+              <a:rPr lang="pt-BR" dirty="0" smtClean="0"/>
+              <a:t>.</a:t>
+            </a:r>
+          </a:p>
+          <a:p>
+            <a:endParaRPr lang="pt-BR" dirty="0"/>
+          </a:p>
+          <a:p>
+            <a:r>
+              <a:rPr lang="pt-BR" dirty="0" smtClean="0"/>
+              <a:t>Para podermos instalar nós hospedamos no site </a:t>
+            </a:r>
+            <a:r>
+              <a:rPr lang="pt-BR" i="1" dirty="0" smtClean="0"/>
+              <a:t>www.mantisunb.comli.com</a:t>
+            </a:r>
+            <a:endParaRPr lang="pt-BR" i="1" dirty="0" smtClean="0"/>
           </a:p>
         </p:txBody>
       </p:sp>
@@ -3396,6 +3549,115 @@
           </a:p>
         </p:txBody>
       </p:sp>
+      <p:pic>
+        <p:nvPicPr>
+          <p:cNvPr id="3074" name="Picture 2" descr="Statemachine Diagram0"/>
+          <p:cNvPicPr>
+            <a:picLocks noChangeAspect="1" noChangeArrowheads="1"/>
+          </p:cNvPicPr>
+          <p:nvPr/>
+        </p:nvPicPr>
+        <p:blipFill>
+          <a:blip r:embed="rId2">
+            <a:extLst>
+              <a:ext uri="{28A0092B-C50C-407E-A947-70E740481C1C}">
+                <a14:useLocalDpi xmlns:a14="http://schemas.microsoft.com/office/drawing/2010/main" val="0"/>
+              </a:ext>
+            </a:extLst>
+          </a:blip>
+          <a:srcRect/>
+          <a:stretch>
+            <a:fillRect/>
+          </a:stretch>
+        </p:blipFill>
+        <p:spPr bwMode="auto">
+          <a:xfrm>
+            <a:off x="20929" y="1412776"/>
+            <a:ext cx="9055872" cy="5412788"/>
+          </a:xfrm>
+          <a:prstGeom prst="rect">
+            <a:avLst/>
+          </a:prstGeom>
+          <a:noFill/>
+          <a:ln>
+            <a:noFill/>
+          </a:ln>
+          <a:extLst>
+            <a:ext uri="{909E8E84-426E-40DD-AFC4-6F175D3DCCD1}">
+              <a14:hiddenFill xmlns:a14="http://schemas.microsoft.com/office/drawing/2010/main">
+                <a:solidFill>
+                  <a:srgbClr val="FFFFFF"/>
+                </a:solidFill>
+              </a14:hiddenFill>
+            </a:ext>
+            <a:ext uri="{91240B29-F687-4F45-9708-019B960494DF}">
+              <a14:hiddenLine xmlns:a14="http://schemas.microsoft.com/office/drawing/2010/main" w="9525">
+                <a:solidFill>
+                  <a:srgbClr val="000000"/>
+                </a:solidFill>
+                <a:miter lim="800000"/>
+                <a:headEnd/>
+                <a:tailEnd/>
+              </a14:hiddenLine>
+            </a:ext>
+          </a:extLst>
+        </p:spPr>
+      </p:pic>
+    </p:spTree>
+    <p:extLst>
+      <p:ext uri="{BB962C8B-B14F-4D97-AF65-F5344CB8AC3E}">
+        <p14:creationId xmlns:p14="http://schemas.microsoft.com/office/powerpoint/2010/main" val="2491245257"/>
+      </p:ext>
+    </p:extLst>
+  </p:cSld>
+  <p:clrMapOvr>
+    <a:masterClrMapping/>
+  </p:clrMapOvr>
+</p:sld>
+</file>
+
+<file path=ppt/slides/slide5.xml><?xml version="1.0" encoding="utf-8"?>
+<p:sld xmlns:a="http://schemas.openxmlformats.org/drawingml/2006/main" xmlns:r="http://schemas.openxmlformats.org/officeDocument/2006/relationships" xmlns:p="http://schemas.openxmlformats.org/presentationml/2006/main">
+  <p:cSld>
+    <p:spTree>
+      <p:nvGrpSpPr>
+        <p:cNvPr id="1" name=""/>
+        <p:cNvGrpSpPr/>
+        <p:nvPr/>
+      </p:nvGrpSpPr>
+      <p:grpSpPr>
+        <a:xfrm>
+          <a:off x="0" y="0"/>
+          <a:ext cx="0" cy="0"/>
+          <a:chOff x="0" y="0"/>
+          <a:chExt cx="0" cy="0"/>
+        </a:xfrm>
+      </p:grpSpPr>
+      <p:sp>
+        <p:nvSpPr>
+          <p:cNvPr id="2" name="Title 1"/>
+          <p:cNvSpPr>
+            <a:spLocks noGrp="1"/>
+          </p:cNvSpPr>
+          <p:nvPr>
+            <p:ph type="title"/>
+          </p:nvPr>
+        </p:nvSpPr>
+        <p:spPr/>
+        <p:txBody>
+          <a:bodyPr>
+            <a:normAutofit fontScale="90000"/>
+          </a:bodyPr>
+          <a:lstStyle/>
+          <a:p>
+            <a:pPr lvl="0"/>
+            <a:r>
+              <a:rPr lang="pt-BR" b="1" dirty="0"/>
+              <a:t>Gerenciamento de Controle de Mudanças</a:t>
+            </a:r>
+          </a:p>
+        </p:txBody>
+      </p:sp>
       <p:sp>
         <p:nvSpPr>
           <p:cNvPr id="3" name="Content Placeholder 2"/>
@@ -3408,20 +3670,56 @@
         </p:nvSpPr>
         <p:spPr/>
         <p:txBody>
-          <a:bodyPr/>
+          <a:bodyPr>
+            <a:normAutofit/>
+          </a:bodyPr>
           <a:lstStyle/>
           <a:p>
             <a:r>
               <a:rPr lang="pt-BR" dirty="0" smtClean="0"/>
-              <a:t>Maquina de estados</a:t>
-            </a:r>
+              <a:t>Preenchimento dos campos:</a:t>
+            </a:r>
+            <a:endParaRPr lang="pt-BR" dirty="0" smtClean="0"/>
           </a:p>
           <a:p>
             <a:pPr lvl="1"/>
             <a:r>
+              <a:rPr lang="pt-BR" dirty="0"/>
+              <a:t>O preenchimento dos campos deve ser feito seguindo as orientações descritas a seguir. Devem ser aprovadas pelos administradores responsáveis</a:t>
+            </a:r>
+            <a:r>
               <a:rPr lang="pt-BR" dirty="0" smtClean="0"/>
-              <a:t>Para que o vai e vem da codificação e testes seja mais efetiva nós devemos criar uma maquina de estados. Esta maquina serve para criarmos um fluxo inteligente em que essas solicitações devem passar.</a:t>
-            </a:r>
+              <a:t>.</a:t>
+            </a:r>
+            <a:endParaRPr lang="pt-BR" sz="2000" dirty="0"/>
+          </a:p>
+          <a:p>
+            <a:pPr lvl="2"/>
+            <a:r>
+              <a:rPr lang="pt-BR" dirty="0"/>
+              <a:t>Ao clicar em Relatar caso você </a:t>
+            </a:r>
+            <a:r>
+              <a:rPr lang="pt-BR" dirty="0" smtClean="0"/>
+              <a:t>deverá  </a:t>
+            </a:r>
+            <a:r>
+              <a:rPr lang="pt-BR" dirty="0"/>
+              <a:t>responder ao seguintes </a:t>
+            </a:r>
+            <a:r>
+              <a:rPr lang="pt-BR" dirty="0" smtClean="0"/>
+              <a:t>itens:</a:t>
+            </a:r>
+            <a:endParaRPr lang="pt-BR" sz="1200" dirty="0"/>
+          </a:p>
+          <a:p>
+            <a:pPr lvl="3"/>
+            <a:r>
+              <a:rPr lang="pt-BR" dirty="0"/>
+              <a:t>*os campos com “ * ” são obrigatórios</a:t>
+            </a:r>
+            <a:endParaRPr lang="pt-BR" sz="800" dirty="0"/>
           </a:p>
         </p:txBody>
       </p:sp>
@@ -3438,53 +3736,2204 @@
 </p:sld>
 </file>
 
+<file path=ppt/slides/slide6.xml><?xml version="1.0" encoding="utf-8"?>
+<p:sld xmlns:a="http://schemas.openxmlformats.org/drawingml/2006/main" xmlns:r="http://schemas.openxmlformats.org/officeDocument/2006/relationships" xmlns:p="http://schemas.openxmlformats.org/presentationml/2006/main">
+  <p:cSld>
+    <p:spTree>
+      <p:nvGrpSpPr>
+        <p:cNvPr id="1" name=""/>
+        <p:cNvGrpSpPr/>
+        <p:nvPr/>
+      </p:nvGrpSpPr>
+      <p:grpSpPr>
+        <a:xfrm>
+          <a:off x="0" y="0"/>
+          <a:ext cx="0" cy="0"/>
+          <a:chOff x="0" y="0"/>
+          <a:chExt cx="0" cy="0"/>
+        </a:xfrm>
+      </p:grpSpPr>
+      <p:sp>
+        <p:nvSpPr>
+          <p:cNvPr id="2" name="Title 1"/>
+          <p:cNvSpPr>
+            <a:spLocks noGrp="1"/>
+          </p:cNvSpPr>
+          <p:nvPr>
+            <p:ph type="title"/>
+          </p:nvPr>
+        </p:nvSpPr>
+        <p:spPr/>
+        <p:txBody>
+          <a:bodyPr>
+            <a:normAutofit fontScale="90000"/>
+          </a:bodyPr>
+          <a:lstStyle/>
+          <a:p>
+            <a:pPr lvl="0"/>
+            <a:r>
+              <a:rPr lang="pt-BR" b="1" dirty="0"/>
+              <a:t>Gerenciamento de Controle de Mudanças</a:t>
+            </a:r>
+          </a:p>
+        </p:txBody>
+      </p:sp>
+      <p:graphicFrame>
+        <p:nvGraphicFramePr>
+          <p:cNvPr id="5" name="Table 4"/>
+          <p:cNvGraphicFramePr>
+            <a:graphicFrameLocks noGrp="1"/>
+          </p:cNvGraphicFramePr>
+          <p:nvPr>
+            <p:extLst>
+              <p:ext uri="{D42A27DB-BD31-4B8C-83A1-F6EECF244321}">
+                <p14:modId xmlns:p14="http://schemas.microsoft.com/office/powerpoint/2010/main" val="1547183391"/>
+              </p:ext>
+            </p:extLst>
+          </p:nvPr>
+        </p:nvGraphicFramePr>
+        <p:xfrm>
+          <a:off x="0" y="1556792"/>
+          <a:ext cx="9144000" cy="5472716"/>
+        </p:xfrm>
+        <a:graphic>
+          <a:graphicData uri="http://schemas.openxmlformats.org/drawingml/2006/table">
+            <a:tbl>
+              <a:tblPr firstRow="1" firstCol="1" bandRow="1">
+                <a:tableStyleId>{5C22544A-7EE6-4342-B048-85BDC9FD1C3A}</a:tableStyleId>
+              </a:tblPr>
+              <a:tblGrid>
+                <a:gridCol w="1619672"/>
+                <a:gridCol w="7524328"/>
+              </a:tblGrid>
+              <a:tr h="170887">
+                <a:tc>
+                  <a:txBody>
+                    <a:bodyPr/>
+                    <a:lstStyle/>
+                    <a:p>
+                      <a:pPr algn="l">
+                        <a:lnSpc>
+                          <a:spcPts val="1200"/>
+                        </a:lnSpc>
+                        <a:spcAft>
+                          <a:spcPts val="0"/>
+                        </a:spcAft>
+                      </a:pPr>
+                      <a:r>
+                        <a:rPr lang="pt-BR" sz="1100" dirty="0">
+                          <a:effectLst/>
+                        </a:rPr>
+                        <a:t>Nome do campo</a:t>
+                      </a:r>
+                      <a:endParaRPr lang="pt-BR" sz="1000" dirty="0">
+                        <a:effectLst/>
+                        <a:latin typeface="Times New Roman"/>
+                        <a:ea typeface="Times New Roman"/>
+                      </a:endParaRPr>
+                    </a:p>
+                  </a:txBody>
+                  <a:tcPr marL="69205" marR="69205" marT="0" marB="0"/>
+                </a:tc>
+                <a:tc>
+                  <a:txBody>
+                    <a:bodyPr/>
+                    <a:lstStyle/>
+                    <a:p>
+                      <a:pPr>
+                        <a:lnSpc>
+                          <a:spcPts val="1200"/>
+                        </a:lnSpc>
+                        <a:spcAft>
+                          <a:spcPts val="0"/>
+                        </a:spcAft>
+                      </a:pPr>
+                      <a:r>
+                        <a:rPr lang="pt-BR" sz="1100">
+                          <a:effectLst/>
+                        </a:rPr>
+                        <a:t>O que escrever</a:t>
+                      </a:r>
+                      <a:endParaRPr lang="pt-BR" sz="1000">
+                        <a:effectLst/>
+                        <a:latin typeface="Times New Roman"/>
+                        <a:ea typeface="Times New Roman"/>
+                      </a:endParaRPr>
+                    </a:p>
+                  </a:txBody>
+                  <a:tcPr marL="69205" marR="69205" marT="0" marB="0"/>
+                </a:tc>
+              </a:tr>
+              <a:tr h="670876">
+                <a:tc>
+                  <a:txBody>
+                    <a:bodyPr/>
+                    <a:lstStyle/>
+                    <a:p>
+                      <a:pPr indent="457200" algn="l">
+                        <a:lnSpc>
+                          <a:spcPts val="1200"/>
+                        </a:lnSpc>
+                        <a:spcAft>
+                          <a:spcPts val="0"/>
+                        </a:spcAft>
+                      </a:pPr>
+                      <a:r>
+                        <a:rPr lang="pt-BR" sz="1100" dirty="0">
+                          <a:effectLst/>
+                        </a:rPr>
+                        <a:t>Categoria</a:t>
+                      </a:r>
+                      <a:endParaRPr lang="pt-BR" sz="1000" dirty="0">
+                        <a:effectLst/>
+                        <a:latin typeface="Times New Roman"/>
+                        <a:ea typeface="Times New Roman"/>
+                      </a:endParaRPr>
+                    </a:p>
+                  </a:txBody>
+                  <a:tcPr marL="69205" marR="69205" marT="0" marB="0"/>
+                </a:tc>
+                <a:tc>
+                  <a:txBody>
+                    <a:bodyPr/>
+                    <a:lstStyle/>
+                    <a:p>
+                      <a:pPr>
+                        <a:lnSpc>
+                          <a:spcPts val="1200"/>
+                        </a:lnSpc>
+                        <a:spcAft>
+                          <a:spcPts val="0"/>
+                        </a:spcAft>
+                      </a:pPr>
+                      <a:r>
+                        <a:rPr lang="pt-BR" sz="1800" dirty="0">
+                          <a:effectLst/>
+                        </a:rPr>
+                        <a:t>Selecionar entre:</a:t>
+                      </a:r>
+                      <a:endParaRPr lang="pt-BR" sz="1400" dirty="0">
+                        <a:effectLst/>
+                      </a:endParaRPr>
+                    </a:p>
+                    <a:p>
+                      <a:pPr marL="342900" lvl="0" indent="-342900">
+                        <a:lnSpc>
+                          <a:spcPts val="1200"/>
+                        </a:lnSpc>
+                        <a:spcAft>
+                          <a:spcPts val="0"/>
+                        </a:spcAft>
+                        <a:buFont typeface="Symbol"/>
+                        <a:buChar char=""/>
+                      </a:pPr>
+                      <a:r>
+                        <a:rPr lang="pt-BR" sz="1800" dirty="0">
+                          <a:effectLst/>
+                        </a:rPr>
+                        <a:t>Bugfix</a:t>
+                      </a:r>
+                      <a:endParaRPr lang="pt-BR" sz="1400" dirty="0">
+                        <a:effectLst/>
+                      </a:endParaRPr>
+                    </a:p>
+                    <a:p>
+                      <a:pPr marL="342900" lvl="0" indent="-342900">
+                        <a:lnSpc>
+                          <a:spcPts val="1200"/>
+                        </a:lnSpc>
+                        <a:spcAft>
+                          <a:spcPts val="0"/>
+                        </a:spcAft>
+                        <a:buFont typeface="Symbol"/>
+                        <a:buChar char=""/>
+                      </a:pPr>
+                      <a:r>
+                        <a:rPr lang="pt-BR" sz="1800" dirty="0">
+                          <a:effectLst/>
+                        </a:rPr>
+                        <a:t>Mudança de escopo</a:t>
+                      </a:r>
+                      <a:br>
+                        <a:rPr lang="pt-BR" sz="1800" dirty="0">
+                          <a:effectLst/>
+                        </a:rPr>
+                      </a:br>
+                      <a:endParaRPr lang="pt-BR" sz="1400" dirty="0">
+                        <a:effectLst/>
+                        <a:latin typeface="Times New Roman"/>
+                        <a:ea typeface="Times New Roman"/>
+                      </a:endParaRPr>
+                    </a:p>
+                  </a:txBody>
+                  <a:tcPr marL="69205" marR="69205" marT="0" marB="0"/>
+                </a:tc>
+              </a:tr>
+              <a:tr h="1384091">
+                <a:tc>
+                  <a:txBody>
+                    <a:bodyPr/>
+                    <a:lstStyle/>
+                    <a:p>
+                      <a:pPr indent="457200" algn="l">
+                        <a:lnSpc>
+                          <a:spcPts val="1200"/>
+                        </a:lnSpc>
+                        <a:spcAft>
+                          <a:spcPts val="0"/>
+                        </a:spcAft>
+                      </a:pPr>
+                      <a:r>
+                        <a:rPr lang="pt-BR" sz="1100" dirty="0">
+                          <a:effectLst/>
+                        </a:rPr>
+                        <a:t>Frequência</a:t>
+                      </a:r>
+                      <a:endParaRPr lang="pt-BR" sz="1000" dirty="0">
+                        <a:effectLst/>
+                        <a:latin typeface="Times New Roman"/>
+                        <a:ea typeface="Times New Roman"/>
+                      </a:endParaRPr>
+                    </a:p>
+                  </a:txBody>
+                  <a:tcPr marL="69205" marR="69205" marT="0" marB="0"/>
+                </a:tc>
+                <a:tc>
+                  <a:txBody>
+                    <a:bodyPr/>
+                    <a:lstStyle/>
+                    <a:p>
+                      <a:pPr>
+                        <a:lnSpc>
+                          <a:spcPts val="1200"/>
+                        </a:lnSpc>
+                        <a:spcAft>
+                          <a:spcPts val="0"/>
+                        </a:spcAft>
+                      </a:pPr>
+                      <a:r>
+                        <a:rPr lang="pt-BR" sz="1800" dirty="0">
+                          <a:effectLst/>
+                        </a:rPr>
+                        <a:t>Deve-se colocar com que frequencia este relato acontece:</a:t>
+                      </a:r>
+                      <a:endParaRPr lang="pt-BR" sz="1400" dirty="0">
+                        <a:effectLst/>
+                      </a:endParaRPr>
+                    </a:p>
+                    <a:p>
+                      <a:pPr>
+                        <a:lnSpc>
+                          <a:spcPts val="1200"/>
+                        </a:lnSpc>
+                        <a:spcAft>
+                          <a:spcPts val="0"/>
+                        </a:spcAft>
+                      </a:pPr>
+                      <a:r>
+                        <a:rPr lang="pt-BR" sz="1800" dirty="0">
+                          <a:effectLst/>
+                        </a:rPr>
+                        <a:t> </a:t>
+                      </a:r>
+                      <a:endParaRPr lang="pt-BR" sz="1400" dirty="0">
+                        <a:effectLst/>
+                      </a:endParaRPr>
+                    </a:p>
+                    <a:p>
+                      <a:pPr marL="342900" lvl="0" indent="-342900">
+                        <a:lnSpc>
+                          <a:spcPts val="1200"/>
+                        </a:lnSpc>
+                        <a:spcAft>
+                          <a:spcPts val="0"/>
+                        </a:spcAft>
+                        <a:buFont typeface="Symbol"/>
+                        <a:buChar char=""/>
+                      </a:pPr>
+                      <a:r>
+                        <a:rPr lang="pt-BR" sz="1800" dirty="0">
+                          <a:effectLst/>
+                        </a:rPr>
+                        <a:t>Sempre</a:t>
+                      </a:r>
+                      <a:endParaRPr lang="pt-BR" sz="1400" dirty="0">
+                        <a:effectLst/>
+                      </a:endParaRPr>
+                    </a:p>
+                    <a:p>
+                      <a:pPr marL="342900" lvl="0" indent="-342900">
+                        <a:lnSpc>
+                          <a:spcPts val="1200"/>
+                        </a:lnSpc>
+                        <a:spcAft>
+                          <a:spcPts val="0"/>
+                        </a:spcAft>
+                        <a:buFont typeface="Symbol"/>
+                        <a:buChar char=""/>
+                      </a:pPr>
+                      <a:r>
+                        <a:rPr lang="pt-BR" sz="1800" dirty="0">
+                          <a:effectLst/>
+                        </a:rPr>
+                        <a:t>As veses</a:t>
+                      </a:r>
+                      <a:endParaRPr lang="pt-BR" sz="1400" dirty="0">
+                        <a:effectLst/>
+                      </a:endParaRPr>
+                    </a:p>
+                    <a:p>
+                      <a:pPr marL="342900" lvl="0" indent="-342900">
+                        <a:lnSpc>
+                          <a:spcPts val="1200"/>
+                        </a:lnSpc>
+                        <a:spcAft>
+                          <a:spcPts val="0"/>
+                        </a:spcAft>
+                        <a:buFont typeface="Symbol"/>
+                        <a:buChar char=""/>
+                      </a:pPr>
+                      <a:r>
+                        <a:rPr lang="pt-BR" sz="1800" dirty="0">
+                          <a:effectLst/>
+                        </a:rPr>
+                        <a:t>Aleatório</a:t>
+                      </a:r>
+                      <a:endParaRPr lang="pt-BR" sz="1400" dirty="0">
+                        <a:effectLst/>
+                      </a:endParaRPr>
+                    </a:p>
+                    <a:p>
+                      <a:pPr marL="342900" lvl="0" indent="-342900">
+                        <a:lnSpc>
+                          <a:spcPts val="1200"/>
+                        </a:lnSpc>
+                        <a:spcAft>
+                          <a:spcPts val="0"/>
+                        </a:spcAft>
+                        <a:buFont typeface="Symbol"/>
+                        <a:buChar char=""/>
+                      </a:pPr>
+                      <a:r>
+                        <a:rPr lang="pt-BR" sz="1800" dirty="0">
+                          <a:effectLst/>
+                        </a:rPr>
+                        <a:t>Não se tentou</a:t>
+                      </a:r>
+                      <a:endParaRPr lang="pt-BR" sz="1400" dirty="0">
+                        <a:effectLst/>
+                      </a:endParaRPr>
+                    </a:p>
+                    <a:p>
+                      <a:pPr marL="342900" lvl="0" indent="-342900">
+                        <a:lnSpc>
+                          <a:spcPts val="1200"/>
+                        </a:lnSpc>
+                        <a:spcAft>
+                          <a:spcPts val="0"/>
+                        </a:spcAft>
+                        <a:buFont typeface="Symbol"/>
+                        <a:buChar char=""/>
+                      </a:pPr>
+                      <a:r>
+                        <a:rPr lang="pt-BR" sz="1800" dirty="0">
+                          <a:effectLst/>
+                        </a:rPr>
+                        <a:t>Incapaz de se reproduzir</a:t>
+                      </a:r>
+                      <a:endParaRPr lang="pt-BR" sz="1400" dirty="0">
+                        <a:effectLst/>
+                      </a:endParaRPr>
+                    </a:p>
+                    <a:p>
+                      <a:pPr marL="342900" lvl="0" indent="-342900">
+                        <a:lnSpc>
+                          <a:spcPts val="1200"/>
+                        </a:lnSpc>
+                        <a:spcAft>
+                          <a:spcPts val="0"/>
+                        </a:spcAft>
+                        <a:buFont typeface="Symbol"/>
+                        <a:buChar char=""/>
+                      </a:pPr>
+                      <a:r>
+                        <a:rPr lang="pt-BR" sz="1800" dirty="0">
+                          <a:effectLst/>
+                        </a:rPr>
+                        <a:t>N/D</a:t>
+                      </a:r>
+                      <a:endParaRPr lang="pt-BR" sz="1400" dirty="0">
+                        <a:effectLst/>
+                        <a:latin typeface="Times New Roman"/>
+                        <a:ea typeface="Times New Roman"/>
+                      </a:endParaRPr>
+                    </a:p>
+                  </a:txBody>
+                  <a:tcPr marL="69205" marR="69205" marT="0" marB="0"/>
+                </a:tc>
+              </a:tr>
+              <a:tr h="1879762">
+                <a:tc>
+                  <a:txBody>
+                    <a:bodyPr/>
+                    <a:lstStyle/>
+                    <a:p>
+                      <a:pPr algn="l">
+                        <a:lnSpc>
+                          <a:spcPts val="1200"/>
+                        </a:lnSpc>
+                        <a:spcAft>
+                          <a:spcPts val="0"/>
+                        </a:spcAft>
+                      </a:pPr>
+                      <a:r>
+                        <a:rPr lang="pt-BR" sz="1100" dirty="0">
+                          <a:effectLst/>
+                        </a:rPr>
+                        <a:t>Gravidade</a:t>
+                      </a:r>
+                      <a:endParaRPr lang="pt-BR" sz="1000" dirty="0">
+                        <a:effectLst/>
+                        <a:latin typeface="Times New Roman"/>
+                        <a:ea typeface="Times New Roman"/>
+                      </a:endParaRPr>
+                    </a:p>
+                  </a:txBody>
+                  <a:tcPr marL="69205" marR="69205" marT="0" marB="0"/>
+                </a:tc>
+                <a:tc>
+                  <a:txBody>
+                    <a:bodyPr/>
+                    <a:lstStyle/>
+                    <a:p>
+                      <a:pPr>
+                        <a:lnSpc>
+                          <a:spcPts val="1200"/>
+                        </a:lnSpc>
+                        <a:spcAft>
+                          <a:spcPts val="0"/>
+                        </a:spcAft>
+                      </a:pPr>
+                      <a:r>
+                        <a:rPr lang="pt-BR" sz="1800" dirty="0">
+                          <a:effectLst/>
+                        </a:rPr>
+                        <a:t>Deve-se relatar a grevidade do relato:</a:t>
+                      </a:r>
+                      <a:endParaRPr lang="pt-BR" sz="1400" dirty="0">
+                        <a:effectLst/>
+                      </a:endParaRPr>
+                    </a:p>
+                    <a:p>
+                      <a:pPr>
+                        <a:lnSpc>
+                          <a:spcPts val="1200"/>
+                        </a:lnSpc>
+                        <a:spcAft>
+                          <a:spcPts val="0"/>
+                        </a:spcAft>
+                      </a:pPr>
+                      <a:r>
+                        <a:rPr lang="pt-BR" sz="1800" dirty="0">
+                          <a:effectLst/>
+                        </a:rPr>
+                        <a:t> </a:t>
+                      </a:r>
+                      <a:endParaRPr lang="pt-BR" sz="1400" dirty="0">
+                        <a:effectLst/>
+                      </a:endParaRPr>
+                    </a:p>
+                    <a:p>
+                      <a:pPr marL="342900" lvl="0" indent="-342900">
+                        <a:lnSpc>
+                          <a:spcPts val="1200"/>
+                        </a:lnSpc>
+                        <a:spcAft>
+                          <a:spcPts val="0"/>
+                        </a:spcAft>
+                        <a:buFont typeface="Symbol"/>
+                        <a:buChar char=""/>
+                      </a:pPr>
+                      <a:r>
+                        <a:rPr lang="pt-BR" sz="1800" dirty="0">
+                          <a:effectLst/>
+                        </a:rPr>
+                        <a:t>Recursivo</a:t>
+                      </a:r>
+                      <a:endParaRPr lang="pt-BR" sz="1400" dirty="0">
+                        <a:effectLst/>
+                      </a:endParaRPr>
+                    </a:p>
+                    <a:p>
+                      <a:pPr marL="342900" lvl="0" indent="-342900">
+                        <a:lnSpc>
+                          <a:spcPts val="1200"/>
+                        </a:lnSpc>
+                        <a:spcAft>
+                          <a:spcPts val="0"/>
+                        </a:spcAft>
+                        <a:buFont typeface="Symbol"/>
+                        <a:buChar char=""/>
+                      </a:pPr>
+                      <a:r>
+                        <a:rPr lang="pt-BR" sz="1800" dirty="0">
+                          <a:effectLst/>
+                        </a:rPr>
+                        <a:t>Trivial</a:t>
+                      </a:r>
+                      <a:endParaRPr lang="pt-BR" sz="1400" dirty="0">
+                        <a:effectLst/>
+                      </a:endParaRPr>
+                    </a:p>
+                    <a:p>
+                      <a:pPr marL="342900" lvl="0" indent="-342900">
+                        <a:lnSpc>
+                          <a:spcPts val="1200"/>
+                        </a:lnSpc>
+                        <a:spcAft>
+                          <a:spcPts val="0"/>
+                        </a:spcAft>
+                        <a:buFont typeface="Symbol"/>
+                        <a:buChar char=""/>
+                      </a:pPr>
+                      <a:r>
+                        <a:rPr lang="pt-BR" sz="1800" dirty="0">
+                          <a:effectLst/>
+                        </a:rPr>
+                        <a:t>Texto</a:t>
+                      </a:r>
+                      <a:endParaRPr lang="pt-BR" sz="1400" dirty="0">
+                        <a:effectLst/>
+                      </a:endParaRPr>
+                    </a:p>
+                    <a:p>
+                      <a:pPr marL="342900" lvl="0" indent="-342900">
+                        <a:lnSpc>
+                          <a:spcPts val="1200"/>
+                        </a:lnSpc>
+                        <a:spcAft>
+                          <a:spcPts val="0"/>
+                        </a:spcAft>
+                        <a:buFont typeface="Symbol"/>
+                        <a:buChar char=""/>
+                      </a:pPr>
+                      <a:r>
+                        <a:rPr lang="pt-BR" sz="1800" dirty="0">
+                          <a:effectLst/>
+                        </a:rPr>
+                        <a:t>Mínimo</a:t>
+                      </a:r>
+                      <a:endParaRPr lang="pt-BR" sz="1400" dirty="0">
+                        <a:effectLst/>
+                      </a:endParaRPr>
+                    </a:p>
+                    <a:p>
+                      <a:pPr marL="342900" lvl="0" indent="-342900">
+                        <a:lnSpc>
+                          <a:spcPts val="1200"/>
+                        </a:lnSpc>
+                        <a:spcAft>
+                          <a:spcPts val="0"/>
+                        </a:spcAft>
+                        <a:buFont typeface="Symbol"/>
+                        <a:buChar char=""/>
+                      </a:pPr>
+                      <a:r>
+                        <a:rPr lang="pt-BR" sz="1800" dirty="0">
+                          <a:effectLst/>
+                        </a:rPr>
+                        <a:t>Pequeno</a:t>
+                      </a:r>
+                      <a:endParaRPr lang="pt-BR" sz="1400" dirty="0">
+                        <a:effectLst/>
+                      </a:endParaRPr>
+                    </a:p>
+                    <a:p>
+                      <a:pPr marL="342900" lvl="0" indent="-342900">
+                        <a:lnSpc>
+                          <a:spcPts val="1200"/>
+                        </a:lnSpc>
+                        <a:spcAft>
+                          <a:spcPts val="0"/>
+                        </a:spcAft>
+                        <a:buFont typeface="Symbol"/>
+                        <a:buChar char=""/>
+                      </a:pPr>
+                      <a:r>
+                        <a:rPr lang="pt-BR" sz="1800" dirty="0">
+                          <a:effectLst/>
+                        </a:rPr>
+                        <a:t>Grande</a:t>
+                      </a:r>
+                      <a:endParaRPr lang="pt-BR" sz="1400" dirty="0">
+                        <a:effectLst/>
+                      </a:endParaRPr>
+                    </a:p>
+                    <a:p>
+                      <a:pPr marL="342900" lvl="0" indent="-342900">
+                        <a:lnSpc>
+                          <a:spcPts val="1200"/>
+                        </a:lnSpc>
+                        <a:spcAft>
+                          <a:spcPts val="0"/>
+                        </a:spcAft>
+                        <a:buFont typeface="Symbol"/>
+                        <a:buChar char=""/>
+                      </a:pPr>
+                      <a:r>
+                        <a:rPr lang="pt-BR" sz="1800" dirty="0">
+                          <a:effectLst/>
+                        </a:rPr>
+                        <a:t>Travamento</a:t>
+                      </a:r>
+                      <a:endParaRPr lang="pt-BR" sz="1400" dirty="0">
+                        <a:effectLst/>
+                      </a:endParaRPr>
+                    </a:p>
+                    <a:p>
+                      <a:pPr marL="342900" lvl="0" indent="-342900">
+                        <a:lnSpc>
+                          <a:spcPts val="1200"/>
+                        </a:lnSpc>
+                        <a:spcAft>
+                          <a:spcPts val="0"/>
+                        </a:spcAft>
+                        <a:buFont typeface="Symbol"/>
+                        <a:buChar char=""/>
+                      </a:pPr>
+                      <a:r>
+                        <a:rPr lang="pt-BR" sz="1800" dirty="0">
+                          <a:effectLst/>
+                        </a:rPr>
+                        <a:t>Obstáculo</a:t>
+                      </a:r>
+                      <a:endParaRPr lang="pt-BR" sz="1400" dirty="0">
+                        <a:effectLst/>
+                      </a:endParaRPr>
+                    </a:p>
+                    <a:p>
+                      <a:pPr>
+                        <a:lnSpc>
+                          <a:spcPts val="1200"/>
+                        </a:lnSpc>
+                        <a:spcAft>
+                          <a:spcPts val="0"/>
+                        </a:spcAft>
+                      </a:pPr>
+                      <a:r>
+                        <a:rPr lang="pt-BR" sz="1800" dirty="0">
+                          <a:effectLst/>
+                        </a:rPr>
+                        <a:t> </a:t>
+                      </a:r>
+                      <a:endParaRPr lang="pt-BR" sz="1400" dirty="0">
+                        <a:effectLst/>
+                        <a:latin typeface="Times New Roman"/>
+                        <a:ea typeface="Times New Roman"/>
+                      </a:endParaRPr>
+                    </a:p>
+                  </a:txBody>
+                  <a:tcPr marL="69205" marR="69205" marT="0" marB="0"/>
+                </a:tc>
+              </a:tr>
+              <a:tr h="1367100">
+                <a:tc>
+                  <a:txBody>
+                    <a:bodyPr/>
+                    <a:lstStyle/>
+                    <a:p>
+                      <a:pPr algn="l">
+                        <a:lnSpc>
+                          <a:spcPts val="1200"/>
+                        </a:lnSpc>
+                        <a:spcAft>
+                          <a:spcPts val="0"/>
+                        </a:spcAft>
+                      </a:pPr>
+                      <a:r>
+                        <a:rPr lang="pt-BR" sz="1100" dirty="0">
+                          <a:effectLst/>
+                        </a:rPr>
+                        <a:t>Prioridade</a:t>
+                      </a:r>
+                      <a:endParaRPr lang="pt-BR" sz="1000" dirty="0">
+                        <a:effectLst/>
+                        <a:latin typeface="Times New Roman"/>
+                        <a:ea typeface="Times New Roman"/>
+                      </a:endParaRPr>
+                    </a:p>
+                  </a:txBody>
+                  <a:tcPr marL="69205" marR="69205" marT="0" marB="0"/>
+                </a:tc>
+                <a:tc>
+                  <a:txBody>
+                    <a:bodyPr/>
+                    <a:lstStyle/>
+                    <a:p>
+                      <a:pPr>
+                        <a:lnSpc>
+                          <a:spcPts val="1200"/>
+                        </a:lnSpc>
+                        <a:spcAft>
+                          <a:spcPts val="0"/>
+                        </a:spcAft>
+                      </a:pPr>
+                      <a:r>
+                        <a:rPr lang="pt-BR" sz="1800" dirty="0">
+                          <a:effectLst/>
+                        </a:rPr>
+                        <a:t>É onde coloca-se a gravidade do relato</a:t>
+                      </a:r>
+                      <a:endParaRPr lang="pt-BR" sz="1400" dirty="0">
+                        <a:effectLst/>
+                      </a:endParaRPr>
+                    </a:p>
+                    <a:p>
+                      <a:pPr>
+                        <a:lnSpc>
+                          <a:spcPts val="1200"/>
+                        </a:lnSpc>
+                        <a:spcAft>
+                          <a:spcPts val="0"/>
+                        </a:spcAft>
+                      </a:pPr>
+                      <a:r>
+                        <a:rPr lang="pt-BR" sz="1800" dirty="0">
+                          <a:effectLst/>
+                        </a:rPr>
+                        <a:t> </a:t>
+                      </a:r>
+                      <a:endParaRPr lang="pt-BR" sz="1400" dirty="0">
+                        <a:effectLst/>
+                      </a:endParaRPr>
+                    </a:p>
+                    <a:p>
+                      <a:pPr marL="342900" lvl="0" indent="-342900">
+                        <a:lnSpc>
+                          <a:spcPts val="1200"/>
+                        </a:lnSpc>
+                        <a:spcAft>
+                          <a:spcPts val="0"/>
+                        </a:spcAft>
+                        <a:buFont typeface="Symbol"/>
+                        <a:buChar char=""/>
+                      </a:pPr>
+                      <a:r>
+                        <a:rPr lang="pt-BR" sz="1800" dirty="0">
+                          <a:effectLst/>
+                        </a:rPr>
+                        <a:t>Nehuma</a:t>
+                      </a:r>
+                      <a:endParaRPr lang="pt-BR" sz="1400" dirty="0">
+                        <a:effectLst/>
+                      </a:endParaRPr>
+                    </a:p>
+                    <a:p>
+                      <a:pPr marL="342900" lvl="0" indent="-342900">
+                        <a:lnSpc>
+                          <a:spcPts val="1200"/>
+                        </a:lnSpc>
+                        <a:spcAft>
+                          <a:spcPts val="0"/>
+                        </a:spcAft>
+                        <a:buFont typeface="Symbol"/>
+                        <a:buChar char=""/>
+                      </a:pPr>
+                      <a:r>
+                        <a:rPr lang="pt-BR" sz="1800" dirty="0">
+                          <a:effectLst/>
+                        </a:rPr>
+                        <a:t>Baixa</a:t>
+                      </a:r>
+                      <a:endParaRPr lang="pt-BR" sz="1400" dirty="0">
+                        <a:effectLst/>
+                      </a:endParaRPr>
+                    </a:p>
+                    <a:p>
+                      <a:pPr marL="342900" lvl="0" indent="-342900">
+                        <a:lnSpc>
+                          <a:spcPts val="1200"/>
+                        </a:lnSpc>
+                        <a:spcAft>
+                          <a:spcPts val="0"/>
+                        </a:spcAft>
+                        <a:buFont typeface="Symbol"/>
+                        <a:buChar char=""/>
+                      </a:pPr>
+                      <a:r>
+                        <a:rPr lang="pt-BR" sz="1800" dirty="0">
+                          <a:effectLst/>
+                        </a:rPr>
+                        <a:t>Normal</a:t>
+                      </a:r>
+                      <a:endParaRPr lang="pt-BR" sz="1400" dirty="0">
+                        <a:effectLst/>
+                      </a:endParaRPr>
+                    </a:p>
+                    <a:p>
+                      <a:pPr marL="342900" lvl="0" indent="-342900">
+                        <a:lnSpc>
+                          <a:spcPts val="1200"/>
+                        </a:lnSpc>
+                        <a:spcAft>
+                          <a:spcPts val="0"/>
+                        </a:spcAft>
+                        <a:buFont typeface="Symbol"/>
+                        <a:buChar char=""/>
+                      </a:pPr>
+                      <a:r>
+                        <a:rPr lang="pt-BR" sz="1800" dirty="0">
+                          <a:effectLst/>
+                        </a:rPr>
+                        <a:t>Alta</a:t>
+                      </a:r>
+                      <a:endParaRPr lang="pt-BR" sz="1400" dirty="0">
+                        <a:effectLst/>
+                      </a:endParaRPr>
+                    </a:p>
+                    <a:p>
+                      <a:pPr marL="342900" lvl="0" indent="-342900">
+                        <a:lnSpc>
+                          <a:spcPts val="1200"/>
+                        </a:lnSpc>
+                        <a:spcAft>
+                          <a:spcPts val="0"/>
+                        </a:spcAft>
+                        <a:buFont typeface="Symbol"/>
+                        <a:buChar char=""/>
+                      </a:pPr>
+                      <a:r>
+                        <a:rPr lang="pt-BR" sz="1800" dirty="0">
+                          <a:effectLst/>
+                        </a:rPr>
+                        <a:t>Urgente</a:t>
+                      </a:r>
+                      <a:endParaRPr lang="pt-BR" sz="1400" dirty="0">
+                        <a:effectLst/>
+                      </a:endParaRPr>
+                    </a:p>
+                    <a:p>
+                      <a:pPr marL="342900" lvl="0" indent="-342900">
+                        <a:lnSpc>
+                          <a:spcPts val="1200"/>
+                        </a:lnSpc>
+                        <a:spcAft>
+                          <a:spcPts val="0"/>
+                        </a:spcAft>
+                        <a:buFont typeface="Symbol"/>
+                        <a:buChar char=""/>
+                      </a:pPr>
+                      <a:r>
+                        <a:rPr lang="pt-BR" sz="1800" dirty="0">
+                          <a:effectLst/>
+                        </a:rPr>
+                        <a:t>Imediato</a:t>
+                      </a:r>
+                      <a:endParaRPr lang="pt-BR" sz="1400" dirty="0">
+                        <a:effectLst/>
+                        <a:latin typeface="Times New Roman"/>
+                        <a:ea typeface="Times New Roman"/>
+                      </a:endParaRPr>
+                    </a:p>
+                  </a:txBody>
+                  <a:tcPr marL="69205" marR="69205" marT="0" marB="0"/>
+                </a:tc>
+              </a:tr>
+            </a:tbl>
+          </a:graphicData>
+        </a:graphic>
+      </p:graphicFrame>
+    </p:spTree>
+    <p:extLst>
+      <p:ext uri="{BB962C8B-B14F-4D97-AF65-F5344CB8AC3E}">
+        <p14:creationId xmlns:p14="http://schemas.microsoft.com/office/powerpoint/2010/main" val="583676701"/>
+      </p:ext>
+    </p:extLst>
+  </p:cSld>
+  <p:clrMapOvr>
+    <a:masterClrMapping/>
+  </p:clrMapOvr>
+</p:sld>
+</file>
+
+<file path=ppt/slides/slide7.xml><?xml version="1.0" encoding="utf-8"?>
+<p:sld xmlns:a="http://schemas.openxmlformats.org/drawingml/2006/main" xmlns:r="http://schemas.openxmlformats.org/officeDocument/2006/relationships" xmlns:p="http://schemas.openxmlformats.org/presentationml/2006/main">
+  <p:cSld>
+    <p:spTree>
+      <p:nvGrpSpPr>
+        <p:cNvPr id="1" name=""/>
+        <p:cNvGrpSpPr/>
+        <p:nvPr/>
+      </p:nvGrpSpPr>
+      <p:grpSpPr>
+        <a:xfrm>
+          <a:off x="0" y="0"/>
+          <a:ext cx="0" cy="0"/>
+          <a:chOff x="0" y="0"/>
+          <a:chExt cx="0" cy="0"/>
+        </a:xfrm>
+      </p:grpSpPr>
+      <p:sp>
+        <p:nvSpPr>
+          <p:cNvPr id="2" name="Title 1"/>
+          <p:cNvSpPr>
+            <a:spLocks noGrp="1"/>
+          </p:cNvSpPr>
+          <p:nvPr>
+            <p:ph type="title"/>
+          </p:nvPr>
+        </p:nvSpPr>
+        <p:spPr/>
+        <p:txBody>
+          <a:bodyPr>
+            <a:normAutofit fontScale="90000"/>
+          </a:bodyPr>
+          <a:lstStyle/>
+          <a:p>
+            <a:pPr lvl="0"/>
+            <a:r>
+              <a:rPr lang="pt-BR" b="1" dirty="0"/>
+              <a:t>Gerenciamento de Controle de Mudanças</a:t>
+            </a:r>
+          </a:p>
+        </p:txBody>
+      </p:sp>
+      <p:graphicFrame>
+        <p:nvGraphicFramePr>
+          <p:cNvPr id="3" name="Table 2"/>
+          <p:cNvGraphicFramePr>
+            <a:graphicFrameLocks noGrp="1"/>
+          </p:cNvGraphicFramePr>
+          <p:nvPr>
+            <p:extLst>
+              <p:ext uri="{D42A27DB-BD31-4B8C-83A1-F6EECF244321}">
+                <p14:modId xmlns:p14="http://schemas.microsoft.com/office/powerpoint/2010/main" val="3165449809"/>
+              </p:ext>
+            </p:extLst>
+          </p:nvPr>
+        </p:nvGraphicFramePr>
+        <p:xfrm>
+          <a:off x="0" y="1484786"/>
+          <a:ext cx="9105663" cy="5355880"/>
+        </p:xfrm>
+        <a:graphic>
+          <a:graphicData uri="http://schemas.openxmlformats.org/drawingml/2006/table">
+            <a:tbl>
+              <a:tblPr firstRow="1" firstCol="1" bandRow="1">
+                <a:tableStyleId>{5C22544A-7EE6-4342-B048-85BDC9FD1C3A}</a:tableStyleId>
+              </a:tblPr>
+              <a:tblGrid>
+                <a:gridCol w="2915212"/>
+                <a:gridCol w="6190451"/>
+              </a:tblGrid>
+              <a:tr h="267794">
+                <a:tc gridSpan="2">
+                  <a:txBody>
+                    <a:bodyPr/>
+                    <a:lstStyle/>
+                    <a:p>
+                      <a:pPr algn="r">
+                        <a:lnSpc>
+                          <a:spcPts val="1200"/>
+                        </a:lnSpc>
+                        <a:spcAft>
+                          <a:spcPts val="0"/>
+                        </a:spcAft>
+                      </a:pPr>
+                      <a:r>
+                        <a:rPr lang="pt-BR" sz="1800" dirty="0">
+                          <a:effectLst/>
+                        </a:rPr>
+                        <a:t>Pode-se também responder as seguintes questões sobre SO</a:t>
+                      </a:r>
+                      <a:endParaRPr lang="pt-BR" sz="1600" dirty="0">
+                        <a:effectLst/>
+                        <a:latin typeface="Times New Roman"/>
+                        <a:ea typeface="Times New Roman"/>
+                      </a:endParaRPr>
+                    </a:p>
+                  </a:txBody>
+                  <a:tcPr marL="99445" marR="99445" marT="0" marB="0" anchor="b"/>
+                </a:tc>
+                <a:tc hMerge="1">
+                  <a:txBody>
+                    <a:bodyPr/>
+                    <a:lstStyle/>
+                    <a:p>
+                      <a:endParaRPr lang="pt-BR"/>
+                    </a:p>
+                  </a:txBody>
+                  <a:tcPr/>
+                </a:tc>
+              </a:tr>
+              <a:tr h="267794">
+                <a:tc>
+                  <a:txBody>
+                    <a:bodyPr/>
+                    <a:lstStyle/>
+                    <a:p>
+                      <a:pPr>
+                        <a:lnSpc>
+                          <a:spcPts val="1200"/>
+                        </a:lnSpc>
+                        <a:spcAft>
+                          <a:spcPts val="0"/>
+                        </a:spcAft>
+                      </a:pPr>
+                      <a:r>
+                        <a:rPr lang="pt-BR" sz="1800">
+                          <a:effectLst/>
+                        </a:rPr>
+                        <a:t>Plataforma</a:t>
+                      </a:r>
+                      <a:endParaRPr lang="pt-BR" sz="1600">
+                        <a:effectLst/>
+                        <a:latin typeface="Times New Roman"/>
+                        <a:ea typeface="Times New Roman"/>
+                      </a:endParaRPr>
+                    </a:p>
+                  </a:txBody>
+                  <a:tcPr marL="99445" marR="99445" marT="0" marB="0" anchor="b"/>
+                </a:tc>
+                <a:tc>
+                  <a:txBody>
+                    <a:bodyPr/>
+                    <a:lstStyle/>
+                    <a:p>
+                      <a:pPr>
+                        <a:lnSpc>
+                          <a:spcPts val="1200"/>
+                        </a:lnSpc>
+                        <a:spcAft>
+                          <a:spcPts val="0"/>
+                        </a:spcAft>
+                      </a:pPr>
+                      <a:r>
+                        <a:rPr lang="pt-BR" sz="1800" dirty="0">
+                          <a:effectLst/>
+                        </a:rPr>
+                        <a:t> </a:t>
+                      </a:r>
+                      <a:endParaRPr lang="pt-BR" sz="1600" dirty="0">
+                        <a:effectLst/>
+                        <a:latin typeface="Times New Roman"/>
+                        <a:ea typeface="Times New Roman"/>
+                      </a:endParaRPr>
+                    </a:p>
+                  </a:txBody>
+                  <a:tcPr marL="99445" marR="99445" marT="0" marB="0" anchor="b"/>
+                </a:tc>
+              </a:tr>
+              <a:tr h="267794">
+                <a:tc>
+                  <a:txBody>
+                    <a:bodyPr/>
+                    <a:lstStyle/>
+                    <a:p>
+                      <a:pPr>
+                        <a:lnSpc>
+                          <a:spcPts val="1200"/>
+                        </a:lnSpc>
+                        <a:spcAft>
+                          <a:spcPts val="0"/>
+                        </a:spcAft>
+                      </a:pPr>
+                      <a:r>
+                        <a:rPr lang="pt-BR" sz="1800">
+                          <a:effectLst/>
+                        </a:rPr>
+                        <a:t>SO</a:t>
+                      </a:r>
+                      <a:endParaRPr lang="pt-BR" sz="1600">
+                        <a:effectLst/>
+                        <a:latin typeface="Times New Roman"/>
+                        <a:ea typeface="Times New Roman"/>
+                      </a:endParaRPr>
+                    </a:p>
+                  </a:txBody>
+                  <a:tcPr marL="99445" marR="99445" marT="0" marB="0" anchor="b"/>
+                </a:tc>
+                <a:tc>
+                  <a:txBody>
+                    <a:bodyPr/>
+                    <a:lstStyle/>
+                    <a:p>
+                      <a:pPr>
+                        <a:lnSpc>
+                          <a:spcPts val="1200"/>
+                        </a:lnSpc>
+                        <a:spcAft>
+                          <a:spcPts val="0"/>
+                        </a:spcAft>
+                      </a:pPr>
+                      <a:r>
+                        <a:rPr lang="pt-BR" sz="1800" dirty="0">
+                          <a:effectLst/>
+                        </a:rPr>
+                        <a:t>Sistema operacional utilizado</a:t>
+                      </a:r>
+                      <a:endParaRPr lang="pt-BR" sz="1600" dirty="0">
+                        <a:effectLst/>
+                        <a:latin typeface="Times New Roman"/>
+                        <a:ea typeface="Times New Roman"/>
+                      </a:endParaRPr>
+                    </a:p>
+                  </a:txBody>
+                  <a:tcPr marL="99445" marR="99445" marT="0" marB="0" anchor="b"/>
+                </a:tc>
+              </a:tr>
+              <a:tr h="535588">
+                <a:tc>
+                  <a:txBody>
+                    <a:bodyPr/>
+                    <a:lstStyle/>
+                    <a:p>
+                      <a:pPr>
+                        <a:lnSpc>
+                          <a:spcPts val="1200"/>
+                        </a:lnSpc>
+                        <a:spcAft>
+                          <a:spcPts val="0"/>
+                        </a:spcAft>
+                      </a:pPr>
+                      <a:r>
+                        <a:rPr lang="pt-BR" sz="1800">
+                          <a:effectLst/>
+                        </a:rPr>
+                        <a:t>Versão SO</a:t>
+                      </a:r>
+                      <a:endParaRPr lang="pt-BR" sz="1600">
+                        <a:effectLst/>
+                        <a:latin typeface="Times New Roman"/>
+                        <a:ea typeface="Times New Roman"/>
+                      </a:endParaRPr>
+                    </a:p>
+                  </a:txBody>
+                  <a:tcPr marL="99445" marR="99445" marT="0" marB="0" anchor="b"/>
+                </a:tc>
+                <a:tc>
+                  <a:txBody>
+                    <a:bodyPr/>
+                    <a:lstStyle/>
+                    <a:p>
+                      <a:pPr>
+                        <a:lnSpc>
+                          <a:spcPts val="1200"/>
+                        </a:lnSpc>
+                        <a:spcAft>
+                          <a:spcPts val="0"/>
+                        </a:spcAft>
+                      </a:pPr>
+                      <a:r>
+                        <a:rPr lang="pt-BR" sz="1800" dirty="0">
+                          <a:effectLst/>
+                        </a:rPr>
+                        <a:t>Versão do sistema operacional utilizado</a:t>
+                      </a:r>
+                      <a:endParaRPr lang="pt-BR" sz="1600" dirty="0">
+                        <a:effectLst/>
+                      </a:endParaRPr>
+                    </a:p>
+                    <a:p>
+                      <a:pPr>
+                        <a:lnSpc>
+                          <a:spcPts val="1200"/>
+                        </a:lnSpc>
+                        <a:spcAft>
+                          <a:spcPts val="0"/>
+                        </a:spcAft>
+                      </a:pPr>
+                      <a:r>
+                        <a:rPr lang="pt-BR" sz="1800" dirty="0">
+                          <a:effectLst/>
+                        </a:rPr>
+                        <a:t> </a:t>
+                      </a:r>
+                      <a:endParaRPr lang="pt-BR" sz="1600" dirty="0">
+                        <a:effectLst/>
+                        <a:latin typeface="Times New Roman"/>
+                        <a:ea typeface="Times New Roman"/>
+                      </a:endParaRPr>
+                    </a:p>
+                  </a:txBody>
+                  <a:tcPr marL="99445" marR="99445" marT="0" marB="0" anchor="b"/>
+                </a:tc>
+              </a:tr>
+              <a:tr h="267794">
+                <a:tc gridSpan="2">
+                  <a:txBody>
+                    <a:bodyPr/>
+                    <a:lstStyle/>
+                    <a:p>
+                      <a:pPr algn="r">
+                        <a:lnSpc>
+                          <a:spcPts val="1200"/>
+                        </a:lnSpc>
+                        <a:spcAft>
+                          <a:spcPts val="0"/>
+                        </a:spcAft>
+                      </a:pPr>
+                      <a:r>
+                        <a:rPr lang="pt-BR" sz="1800" dirty="0">
+                          <a:effectLst/>
+                        </a:rPr>
+                        <a:t>Continua-se</a:t>
+                      </a:r>
+                      <a:endParaRPr lang="pt-BR" sz="1600" dirty="0">
+                        <a:effectLst/>
+                        <a:latin typeface="Times New Roman"/>
+                        <a:ea typeface="Times New Roman"/>
+                      </a:endParaRPr>
+                    </a:p>
+                  </a:txBody>
+                  <a:tcPr marL="99445" marR="99445" marT="0" marB="0" anchor="b"/>
+                </a:tc>
+                <a:tc hMerge="1">
+                  <a:txBody>
+                    <a:bodyPr/>
+                    <a:lstStyle/>
+                    <a:p>
+                      <a:endParaRPr lang="pt-BR"/>
+                    </a:p>
+                  </a:txBody>
+                  <a:tcPr/>
+                </a:tc>
+              </a:tr>
+              <a:tr h="267794">
+                <a:tc>
+                  <a:txBody>
+                    <a:bodyPr/>
+                    <a:lstStyle/>
+                    <a:p>
+                      <a:pPr>
+                        <a:lnSpc>
+                          <a:spcPts val="1200"/>
+                        </a:lnSpc>
+                        <a:spcAft>
+                          <a:spcPts val="0"/>
+                        </a:spcAft>
+                      </a:pPr>
+                      <a:r>
+                        <a:rPr lang="pt-BR" sz="1800">
+                          <a:effectLst/>
+                        </a:rPr>
+                        <a:t>Versão do produto</a:t>
+                      </a:r>
+                      <a:endParaRPr lang="pt-BR" sz="1600">
+                        <a:effectLst/>
+                        <a:latin typeface="Times New Roman"/>
+                        <a:ea typeface="Times New Roman"/>
+                      </a:endParaRPr>
+                    </a:p>
+                  </a:txBody>
+                  <a:tcPr marL="99445" marR="99445" marT="0" marB="0" anchor="b"/>
+                </a:tc>
+                <a:tc>
+                  <a:txBody>
+                    <a:bodyPr/>
+                    <a:lstStyle/>
+                    <a:p>
+                      <a:pPr>
+                        <a:lnSpc>
+                          <a:spcPts val="1200"/>
+                        </a:lnSpc>
+                        <a:spcAft>
+                          <a:spcPts val="0"/>
+                        </a:spcAft>
+                      </a:pPr>
+                      <a:r>
+                        <a:rPr lang="pt-BR" sz="1800" dirty="0">
+                          <a:effectLst/>
+                        </a:rPr>
+                        <a:t>Versão da build testada ow com pedido de mudança de escopo</a:t>
+                      </a:r>
+                      <a:endParaRPr lang="pt-BR" sz="1600" dirty="0">
+                        <a:effectLst/>
+                        <a:latin typeface="Times New Roman"/>
+                        <a:ea typeface="Times New Roman"/>
+                      </a:endParaRPr>
+                    </a:p>
+                  </a:txBody>
+                  <a:tcPr marL="99445" marR="99445" marT="0" marB="0" anchor="b"/>
+                </a:tc>
+              </a:tr>
+              <a:tr h="267794">
+                <a:tc>
+                  <a:txBody>
+                    <a:bodyPr/>
+                    <a:lstStyle/>
+                    <a:p>
+                      <a:pPr>
+                        <a:lnSpc>
+                          <a:spcPts val="1200"/>
+                        </a:lnSpc>
+                        <a:spcAft>
+                          <a:spcPts val="0"/>
+                        </a:spcAft>
+                      </a:pPr>
+                      <a:r>
+                        <a:rPr lang="pt-BR" sz="1800">
+                          <a:effectLst/>
+                        </a:rPr>
+                        <a:t>Atribuir</a:t>
+                      </a:r>
+                      <a:endParaRPr lang="pt-BR" sz="1600">
+                        <a:effectLst/>
+                        <a:latin typeface="Times New Roman"/>
+                        <a:ea typeface="Times New Roman"/>
+                      </a:endParaRPr>
+                    </a:p>
+                  </a:txBody>
+                  <a:tcPr marL="99445" marR="99445" marT="0" marB="0" anchor="b"/>
+                </a:tc>
+                <a:tc>
+                  <a:txBody>
+                    <a:bodyPr/>
+                    <a:lstStyle/>
+                    <a:p>
+                      <a:pPr>
+                        <a:lnSpc>
+                          <a:spcPts val="1200"/>
+                        </a:lnSpc>
+                        <a:spcAft>
+                          <a:spcPts val="0"/>
+                        </a:spcAft>
+                      </a:pPr>
+                      <a:r>
+                        <a:rPr lang="pt-BR" sz="1800" dirty="0">
+                          <a:effectLst/>
+                        </a:rPr>
+                        <a:t>A quem está atribuido o relato</a:t>
+                      </a:r>
+                      <a:endParaRPr lang="pt-BR" sz="1600" dirty="0">
+                        <a:effectLst/>
+                        <a:latin typeface="Times New Roman"/>
+                        <a:ea typeface="Times New Roman"/>
+                      </a:endParaRPr>
+                    </a:p>
+                  </a:txBody>
+                  <a:tcPr marL="99445" marR="99445" marT="0" marB="0" anchor="b"/>
+                </a:tc>
+              </a:tr>
+              <a:tr h="267794">
+                <a:tc>
+                  <a:txBody>
+                    <a:bodyPr/>
+                    <a:lstStyle/>
+                    <a:p>
+                      <a:pPr>
+                        <a:lnSpc>
+                          <a:spcPts val="1200"/>
+                        </a:lnSpc>
+                        <a:spcAft>
+                          <a:spcPts val="0"/>
+                        </a:spcAft>
+                      </a:pPr>
+                      <a:r>
+                        <a:rPr lang="pt-BR" sz="1800">
+                          <a:effectLst/>
+                        </a:rPr>
+                        <a:t>Previsto para versão</a:t>
+                      </a:r>
+                      <a:endParaRPr lang="pt-BR" sz="1600">
+                        <a:effectLst/>
+                        <a:latin typeface="Times New Roman"/>
+                        <a:ea typeface="Times New Roman"/>
+                      </a:endParaRPr>
+                    </a:p>
+                  </a:txBody>
+                  <a:tcPr marL="99445" marR="99445" marT="0" marB="0" anchor="b"/>
+                </a:tc>
+                <a:tc>
+                  <a:txBody>
+                    <a:bodyPr/>
+                    <a:lstStyle/>
+                    <a:p>
+                      <a:pPr>
+                        <a:lnSpc>
+                          <a:spcPts val="1200"/>
+                        </a:lnSpc>
+                        <a:spcAft>
+                          <a:spcPts val="0"/>
+                        </a:spcAft>
+                      </a:pPr>
+                      <a:r>
+                        <a:rPr lang="pt-BR" sz="1800" dirty="0">
+                          <a:effectLst/>
+                        </a:rPr>
+                        <a:t>Versão em que está previsto o ajuste do relato</a:t>
+                      </a:r>
+                      <a:endParaRPr lang="pt-BR" sz="1600" dirty="0">
+                        <a:effectLst/>
+                        <a:latin typeface="Times New Roman"/>
+                        <a:ea typeface="Times New Roman"/>
+                      </a:endParaRPr>
+                    </a:p>
+                  </a:txBody>
+                  <a:tcPr marL="99445" marR="99445" marT="0" marB="0" anchor="b"/>
+                </a:tc>
+              </a:tr>
+              <a:tr h="267794">
+                <a:tc>
+                  <a:txBody>
+                    <a:bodyPr/>
+                    <a:lstStyle/>
+                    <a:p>
+                      <a:pPr>
+                        <a:lnSpc>
+                          <a:spcPts val="1200"/>
+                        </a:lnSpc>
+                        <a:spcAft>
+                          <a:spcPts val="0"/>
+                        </a:spcAft>
+                      </a:pPr>
+                      <a:r>
+                        <a:rPr lang="pt-BR" sz="1800">
+                          <a:effectLst/>
+                        </a:rPr>
+                        <a:t>*Resumo</a:t>
+                      </a:r>
+                      <a:endParaRPr lang="pt-BR" sz="1600">
+                        <a:effectLst/>
+                        <a:latin typeface="Times New Roman"/>
+                        <a:ea typeface="Times New Roman"/>
+                      </a:endParaRPr>
+                    </a:p>
+                  </a:txBody>
+                  <a:tcPr marL="99445" marR="99445" marT="0" marB="0" anchor="b"/>
+                </a:tc>
+                <a:tc>
+                  <a:txBody>
+                    <a:bodyPr/>
+                    <a:lstStyle/>
+                    <a:p>
+                      <a:pPr>
+                        <a:lnSpc>
+                          <a:spcPts val="1200"/>
+                        </a:lnSpc>
+                        <a:spcAft>
+                          <a:spcPts val="0"/>
+                        </a:spcAft>
+                      </a:pPr>
+                      <a:r>
+                        <a:rPr lang="pt-BR" sz="1800" dirty="0">
+                          <a:effectLst/>
+                        </a:rPr>
+                        <a:t>Resumo do relato</a:t>
+                      </a:r>
+                      <a:endParaRPr lang="pt-BR" sz="1600" dirty="0">
+                        <a:effectLst/>
+                        <a:latin typeface="Times New Roman"/>
+                        <a:ea typeface="Times New Roman"/>
+                      </a:endParaRPr>
+                    </a:p>
+                  </a:txBody>
+                  <a:tcPr marL="99445" marR="99445" marT="0" marB="0" anchor="b"/>
+                </a:tc>
+              </a:tr>
+              <a:tr h="267794">
+                <a:tc>
+                  <a:txBody>
+                    <a:bodyPr/>
+                    <a:lstStyle/>
+                    <a:p>
+                      <a:pPr>
+                        <a:lnSpc>
+                          <a:spcPts val="1200"/>
+                        </a:lnSpc>
+                        <a:spcAft>
+                          <a:spcPts val="0"/>
+                        </a:spcAft>
+                      </a:pPr>
+                      <a:r>
+                        <a:rPr lang="pt-BR" sz="1800">
+                          <a:effectLst/>
+                        </a:rPr>
+                        <a:t>*Descrição</a:t>
+                      </a:r>
+                      <a:endParaRPr lang="pt-BR" sz="1600">
+                        <a:effectLst/>
+                        <a:latin typeface="Times New Roman"/>
+                        <a:ea typeface="Times New Roman"/>
+                      </a:endParaRPr>
+                    </a:p>
+                  </a:txBody>
+                  <a:tcPr marL="99445" marR="99445" marT="0" marB="0" anchor="b"/>
+                </a:tc>
+                <a:tc>
+                  <a:txBody>
+                    <a:bodyPr/>
+                    <a:lstStyle/>
+                    <a:p>
+                      <a:pPr>
+                        <a:lnSpc>
+                          <a:spcPts val="1200"/>
+                        </a:lnSpc>
+                        <a:spcAft>
+                          <a:spcPts val="0"/>
+                        </a:spcAft>
+                      </a:pPr>
+                      <a:r>
+                        <a:rPr lang="pt-BR" sz="1800" dirty="0">
+                          <a:effectLst/>
+                        </a:rPr>
+                        <a:t>Descrição detalhada do relato </a:t>
+                      </a:r>
+                      <a:endParaRPr lang="pt-BR" sz="1600" dirty="0">
+                        <a:effectLst/>
+                        <a:latin typeface="Times New Roman"/>
+                        <a:ea typeface="Times New Roman"/>
+                      </a:endParaRPr>
+                    </a:p>
+                  </a:txBody>
+                  <a:tcPr marL="99445" marR="99445" marT="0" marB="0" anchor="b"/>
+                </a:tc>
+              </a:tr>
+              <a:tr h="267794">
+                <a:tc>
+                  <a:txBody>
+                    <a:bodyPr/>
+                    <a:lstStyle/>
+                    <a:p>
+                      <a:pPr>
+                        <a:lnSpc>
+                          <a:spcPts val="1200"/>
+                        </a:lnSpc>
+                        <a:spcAft>
+                          <a:spcPts val="0"/>
+                        </a:spcAft>
+                      </a:pPr>
+                      <a:r>
+                        <a:rPr lang="pt-BR" sz="1800">
+                          <a:effectLst/>
+                        </a:rPr>
+                        <a:t>Passos para reproduzir</a:t>
+                      </a:r>
+                      <a:endParaRPr lang="pt-BR" sz="1600">
+                        <a:effectLst/>
+                        <a:latin typeface="Times New Roman"/>
+                        <a:ea typeface="Times New Roman"/>
+                      </a:endParaRPr>
+                    </a:p>
+                  </a:txBody>
+                  <a:tcPr marL="99445" marR="99445" marT="0" marB="0" anchor="b"/>
+                </a:tc>
+                <a:tc>
+                  <a:txBody>
+                    <a:bodyPr/>
+                    <a:lstStyle/>
+                    <a:p>
+                      <a:pPr>
+                        <a:lnSpc>
+                          <a:spcPts val="1200"/>
+                        </a:lnSpc>
+                        <a:spcAft>
+                          <a:spcPts val="0"/>
+                        </a:spcAft>
+                      </a:pPr>
+                      <a:r>
+                        <a:rPr lang="pt-BR" sz="1800" dirty="0">
+                          <a:effectLst/>
+                        </a:rPr>
+                        <a:t>Como reproduzir este relato para que ele aconteça novamente?</a:t>
+                      </a:r>
+                      <a:endParaRPr lang="pt-BR" sz="1600" dirty="0">
+                        <a:effectLst/>
+                        <a:latin typeface="Times New Roman"/>
+                        <a:ea typeface="Times New Roman"/>
+                      </a:endParaRPr>
+                    </a:p>
+                  </a:txBody>
+                  <a:tcPr marL="99445" marR="99445" marT="0" marB="0" anchor="b"/>
+                </a:tc>
+              </a:tr>
+              <a:tr h="535588">
+                <a:tc>
+                  <a:txBody>
+                    <a:bodyPr/>
+                    <a:lstStyle/>
+                    <a:p>
+                      <a:pPr>
+                        <a:lnSpc>
+                          <a:spcPts val="1200"/>
+                        </a:lnSpc>
+                        <a:spcAft>
+                          <a:spcPts val="0"/>
+                        </a:spcAft>
+                      </a:pPr>
+                      <a:r>
+                        <a:rPr lang="pt-BR" sz="1800">
+                          <a:effectLst/>
+                        </a:rPr>
+                        <a:t>Informações adicionais</a:t>
+                      </a:r>
+                      <a:endParaRPr lang="pt-BR" sz="1600">
+                        <a:effectLst/>
+                        <a:latin typeface="Times New Roman"/>
+                        <a:ea typeface="Times New Roman"/>
+                      </a:endParaRPr>
+                    </a:p>
+                  </a:txBody>
+                  <a:tcPr marL="99445" marR="99445" marT="0" marB="0" anchor="b"/>
+                </a:tc>
+                <a:tc>
+                  <a:txBody>
+                    <a:bodyPr/>
+                    <a:lstStyle/>
+                    <a:p>
+                      <a:pPr>
+                        <a:lnSpc>
+                          <a:spcPts val="1200"/>
+                        </a:lnSpc>
+                        <a:spcAft>
+                          <a:spcPts val="0"/>
+                        </a:spcAft>
+                      </a:pPr>
+                      <a:r>
+                        <a:rPr lang="pt-BR" sz="1800" dirty="0">
+                          <a:effectLst/>
+                        </a:rPr>
+                        <a:t>Pode-se adicionar mais alguma informação importante que não tenha-se dito anteriormente</a:t>
+                      </a:r>
+                      <a:endParaRPr lang="pt-BR" sz="1600" dirty="0">
+                        <a:effectLst/>
+                        <a:latin typeface="Times New Roman"/>
+                        <a:ea typeface="Times New Roman"/>
+                      </a:endParaRPr>
+                    </a:p>
+                  </a:txBody>
+                  <a:tcPr marL="99445" marR="99445" marT="0" marB="0" anchor="b"/>
+                </a:tc>
+              </a:tr>
+              <a:tr h="267794">
+                <a:tc>
+                  <a:txBody>
+                    <a:bodyPr/>
+                    <a:lstStyle/>
+                    <a:p>
+                      <a:pPr>
+                        <a:lnSpc>
+                          <a:spcPts val="1200"/>
+                        </a:lnSpc>
+                        <a:spcAft>
+                          <a:spcPts val="0"/>
+                        </a:spcAft>
+                      </a:pPr>
+                      <a:r>
+                        <a:rPr lang="pt-BR" sz="1800">
+                          <a:effectLst/>
+                        </a:rPr>
+                        <a:t>Carregar arquivo</a:t>
+                      </a:r>
+                      <a:endParaRPr lang="pt-BR" sz="1600">
+                        <a:effectLst/>
+                        <a:latin typeface="Times New Roman"/>
+                        <a:ea typeface="Times New Roman"/>
+                      </a:endParaRPr>
+                    </a:p>
+                  </a:txBody>
+                  <a:tcPr marL="99445" marR="99445" marT="0" marB="0" anchor="b"/>
+                </a:tc>
+                <a:tc>
+                  <a:txBody>
+                    <a:bodyPr/>
+                    <a:lstStyle/>
+                    <a:p>
+                      <a:pPr>
+                        <a:lnSpc>
+                          <a:spcPts val="1200"/>
+                        </a:lnSpc>
+                        <a:spcAft>
+                          <a:spcPts val="0"/>
+                        </a:spcAft>
+                      </a:pPr>
+                      <a:r>
+                        <a:rPr lang="pt-BR" sz="1800" dirty="0">
+                          <a:effectLst/>
+                        </a:rPr>
+                        <a:t>Pode-se adicionar algum arquivo importante</a:t>
+                      </a:r>
+                      <a:endParaRPr lang="pt-BR" sz="1600" dirty="0">
+                        <a:effectLst/>
+                        <a:latin typeface="Times New Roman"/>
+                        <a:ea typeface="Times New Roman"/>
+                      </a:endParaRPr>
+                    </a:p>
+                  </a:txBody>
+                  <a:tcPr marL="99445" marR="99445" marT="0" marB="0" anchor="b"/>
+                </a:tc>
+              </a:tr>
+              <a:tr h="1071176">
+                <a:tc>
+                  <a:txBody>
+                    <a:bodyPr/>
+                    <a:lstStyle/>
+                    <a:p>
+                      <a:pPr>
+                        <a:lnSpc>
+                          <a:spcPts val="1200"/>
+                        </a:lnSpc>
+                        <a:spcAft>
+                          <a:spcPts val="0"/>
+                        </a:spcAft>
+                      </a:pPr>
+                      <a:r>
+                        <a:rPr lang="pt-BR" sz="1800">
+                          <a:effectLst/>
+                        </a:rPr>
+                        <a:t>Visibilidade</a:t>
+                      </a:r>
+                      <a:endParaRPr lang="pt-BR" sz="1600">
+                        <a:effectLst/>
+                        <a:latin typeface="Times New Roman"/>
+                        <a:ea typeface="Times New Roman"/>
+                      </a:endParaRPr>
+                    </a:p>
+                  </a:txBody>
+                  <a:tcPr marL="99445" marR="99445" marT="0" marB="0" anchor="b"/>
+                </a:tc>
+                <a:tc>
+                  <a:txBody>
+                    <a:bodyPr/>
+                    <a:lstStyle/>
+                    <a:p>
+                      <a:pPr>
+                        <a:lnSpc>
+                          <a:spcPts val="1200"/>
+                        </a:lnSpc>
+                        <a:spcAft>
+                          <a:spcPts val="0"/>
+                        </a:spcAft>
+                      </a:pPr>
+                      <a:r>
+                        <a:rPr lang="pt-BR" sz="1800" dirty="0">
+                          <a:effectLst/>
+                        </a:rPr>
+                        <a:t>Escolher entre:</a:t>
+                      </a:r>
+                      <a:endParaRPr lang="pt-BR" sz="1600" dirty="0">
+                        <a:effectLst/>
+                      </a:endParaRPr>
+                    </a:p>
+                    <a:p>
+                      <a:pPr>
+                        <a:lnSpc>
+                          <a:spcPts val="1200"/>
+                        </a:lnSpc>
+                        <a:spcAft>
+                          <a:spcPts val="0"/>
+                        </a:spcAft>
+                      </a:pPr>
+                      <a:r>
+                        <a:rPr lang="pt-BR" sz="1800" dirty="0">
+                          <a:effectLst/>
+                        </a:rPr>
+                        <a:t>Público, todos cadastrados no projeto podem ver;</a:t>
+                      </a:r>
+                      <a:endParaRPr lang="pt-BR" sz="1600" dirty="0">
+                        <a:effectLst/>
+                      </a:endParaRPr>
+                    </a:p>
+                    <a:p>
+                      <a:pPr>
+                        <a:lnSpc>
+                          <a:spcPts val="1200"/>
+                        </a:lnSpc>
+                        <a:spcAft>
+                          <a:spcPts val="0"/>
+                        </a:spcAft>
+                      </a:pPr>
+                      <a:r>
+                        <a:rPr lang="pt-BR" sz="1800" dirty="0">
+                          <a:effectLst/>
+                        </a:rPr>
+                        <a:t> </a:t>
+                      </a:r>
+                      <a:endParaRPr lang="pt-BR" sz="1600" dirty="0">
+                        <a:effectLst/>
+                      </a:endParaRPr>
+                    </a:p>
+                    <a:p>
+                      <a:pPr>
+                        <a:lnSpc>
+                          <a:spcPts val="1200"/>
+                        </a:lnSpc>
+                        <a:spcAft>
+                          <a:spcPts val="0"/>
+                        </a:spcAft>
+                      </a:pPr>
+                      <a:r>
+                        <a:rPr lang="pt-BR" sz="1800" dirty="0">
+                          <a:effectLst/>
+                        </a:rPr>
+                        <a:t>Privado, somente a quem foi destinado o relato;</a:t>
+                      </a:r>
+                      <a:endParaRPr lang="pt-BR" sz="1600" dirty="0">
+                        <a:effectLst/>
+                        <a:latin typeface="Times New Roman"/>
+                        <a:ea typeface="Times New Roman"/>
+                      </a:endParaRPr>
+                    </a:p>
+                  </a:txBody>
+                  <a:tcPr marL="99445" marR="99445" marT="0" marB="0" anchor="b"/>
+                </a:tc>
+              </a:tr>
+              <a:tr h="267794">
+                <a:tc>
+                  <a:txBody>
+                    <a:bodyPr/>
+                    <a:lstStyle/>
+                    <a:p>
+                      <a:pPr>
+                        <a:lnSpc>
+                          <a:spcPts val="1200"/>
+                        </a:lnSpc>
+                        <a:spcAft>
+                          <a:spcPts val="0"/>
+                        </a:spcAft>
+                      </a:pPr>
+                      <a:r>
+                        <a:rPr lang="pt-BR" sz="1800">
+                          <a:effectLst/>
+                        </a:rPr>
+                        <a:t>Continuar relatando</a:t>
+                      </a:r>
+                      <a:endParaRPr lang="pt-BR" sz="1600">
+                        <a:effectLst/>
+                        <a:latin typeface="Times New Roman"/>
+                        <a:ea typeface="Times New Roman"/>
+                      </a:endParaRPr>
+                    </a:p>
+                  </a:txBody>
+                  <a:tcPr marL="99445" marR="99445" marT="0" marB="0" anchor="b"/>
+                </a:tc>
+                <a:tc>
+                  <a:txBody>
+                    <a:bodyPr/>
+                    <a:lstStyle/>
+                    <a:p>
+                      <a:pPr>
+                        <a:lnSpc>
+                          <a:spcPts val="1200"/>
+                        </a:lnSpc>
+                        <a:spcAft>
+                          <a:spcPts val="0"/>
+                        </a:spcAft>
+                      </a:pPr>
+                      <a:r>
+                        <a:rPr lang="pt-BR" sz="1800" dirty="0">
+                          <a:effectLst/>
+                        </a:rPr>
+                        <a:t>Caso queira relatar outro caso, deve-se selecionar esta opção</a:t>
+                      </a:r>
+                      <a:endParaRPr lang="pt-BR" sz="1600" dirty="0">
+                        <a:effectLst/>
+                        <a:latin typeface="Times New Roman"/>
+                        <a:ea typeface="Times New Roman"/>
+                      </a:endParaRPr>
+                    </a:p>
+                  </a:txBody>
+                  <a:tcPr marL="99445" marR="99445" marT="0" marB="0" anchor="b"/>
+                </a:tc>
+              </a:tr>
+            </a:tbl>
+          </a:graphicData>
+        </a:graphic>
+      </p:graphicFrame>
+    </p:spTree>
+    <p:extLst>
+      <p:ext uri="{BB962C8B-B14F-4D97-AF65-F5344CB8AC3E}">
+        <p14:creationId xmlns:p14="http://schemas.microsoft.com/office/powerpoint/2010/main" val="2112747441"/>
+      </p:ext>
+    </p:extLst>
+  </p:cSld>
+  <p:clrMapOvr>
+    <a:masterClrMapping/>
+  </p:clrMapOvr>
+</p:sld>
+</file>
+
+<file path=ppt/slides/slide8.xml><?xml version="1.0" encoding="utf-8"?>
+<p:sld xmlns:a="http://schemas.openxmlformats.org/drawingml/2006/main" xmlns:r="http://schemas.openxmlformats.org/officeDocument/2006/relationships" xmlns:p="http://schemas.openxmlformats.org/presentationml/2006/main">
+  <p:cSld>
+    <p:spTree>
+      <p:nvGrpSpPr>
+        <p:cNvPr id="1" name=""/>
+        <p:cNvGrpSpPr/>
+        <p:nvPr/>
+      </p:nvGrpSpPr>
+      <p:grpSpPr>
+        <a:xfrm>
+          <a:off x="0" y="0"/>
+          <a:ext cx="0" cy="0"/>
+          <a:chOff x="0" y="0"/>
+          <a:chExt cx="0" cy="0"/>
+        </a:xfrm>
+      </p:grpSpPr>
+      <p:sp>
+        <p:nvSpPr>
+          <p:cNvPr id="2" name="Title 1"/>
+          <p:cNvSpPr>
+            <a:spLocks noGrp="1"/>
+          </p:cNvSpPr>
+          <p:nvPr>
+            <p:ph type="title"/>
+          </p:nvPr>
+        </p:nvSpPr>
+        <p:spPr/>
+        <p:txBody>
+          <a:bodyPr/>
+          <a:lstStyle/>
+          <a:p>
+            <a:r>
+              <a:rPr lang="pt-BR" dirty="0" smtClean="0"/>
+              <a:t>Relatos</a:t>
+            </a:r>
+            <a:endParaRPr lang="pt-BR" dirty="0"/>
+          </a:p>
+        </p:txBody>
+      </p:sp>
+      <p:pic>
+        <p:nvPicPr>
+          <p:cNvPr id="4099" name="Picture 3"/>
+          <p:cNvPicPr>
+            <a:picLocks noChangeAspect="1" noChangeArrowheads="1"/>
+          </p:cNvPicPr>
+          <p:nvPr/>
+        </p:nvPicPr>
+        <p:blipFill>
+          <a:blip r:embed="rId2">
+            <a:extLst>
+              <a:ext uri="{28A0092B-C50C-407E-A947-70E740481C1C}">
+                <a14:useLocalDpi xmlns:a14="http://schemas.microsoft.com/office/drawing/2010/main" val="0"/>
+              </a:ext>
+            </a:extLst>
+          </a:blip>
+          <a:srcRect/>
+          <a:stretch>
+            <a:fillRect/>
+          </a:stretch>
+        </p:blipFill>
+        <p:spPr bwMode="auto">
+          <a:xfrm>
+            <a:off x="0" y="1340768"/>
+            <a:ext cx="8410714" cy="5517232"/>
+          </a:xfrm>
+          <a:prstGeom prst="rect">
+            <a:avLst/>
+          </a:prstGeom>
+          <a:noFill/>
+          <a:ln>
+            <a:noFill/>
+          </a:ln>
+          <a:effectLst/>
+          <a:extLst>
+            <a:ext uri="{909E8E84-426E-40DD-AFC4-6F175D3DCCD1}">
+              <a14:hiddenFill xmlns:a14="http://schemas.microsoft.com/office/drawing/2010/main">
+                <a:solidFill>
+                  <a:schemeClr val="accent1"/>
+                </a:solidFill>
+              </a14:hiddenFill>
+            </a:ext>
+            <a:ext uri="{91240B29-F687-4F45-9708-019B960494DF}">
+              <a14:hiddenLine xmlns:a14="http://schemas.microsoft.com/office/drawing/2010/main" w="9525">
+                <a:solidFill>
+                  <a:schemeClr val="tx1"/>
+                </a:solidFill>
+                <a:miter lim="800000"/>
+                <a:headEnd/>
+                <a:tailEnd/>
+              </a14:hiddenLine>
+            </a:ext>
+            <a:ext uri="{AF507438-7753-43E0-B8FC-AC1667EBCBE1}">
+              <a14:hiddenEffects xmlns:a14="http://schemas.microsoft.com/office/drawing/2010/main">
+                <a:effectLst>
+                  <a:outerShdw dist="35921" dir="2700000" algn="ctr" rotWithShape="0">
+                    <a:schemeClr val="bg2"/>
+                  </a:outerShdw>
+                </a:effectLst>
+              </a14:hiddenEffects>
+            </a:ext>
+          </a:extLst>
+        </p:spPr>
+      </p:pic>
+    </p:spTree>
+    <p:extLst>
+      <p:ext uri="{BB962C8B-B14F-4D97-AF65-F5344CB8AC3E}">
+        <p14:creationId xmlns:p14="http://schemas.microsoft.com/office/powerpoint/2010/main" val="3152759636"/>
+      </p:ext>
+    </p:extLst>
+  </p:cSld>
+  <p:clrMapOvr>
+    <a:masterClrMapping/>
+  </p:clrMapOvr>
+</p:sld>
+</file>
+
+<file path=ppt/slides/slide9.xml><?xml version="1.0" encoding="utf-8"?>
+<p:sld xmlns:a="http://schemas.openxmlformats.org/drawingml/2006/main" xmlns:r="http://schemas.openxmlformats.org/officeDocument/2006/relationships" xmlns:p="http://schemas.openxmlformats.org/presentationml/2006/main">
+  <p:cSld>
+    <p:spTree>
+      <p:nvGrpSpPr>
+        <p:cNvPr id="1" name=""/>
+        <p:cNvGrpSpPr/>
+        <p:nvPr/>
+      </p:nvGrpSpPr>
+      <p:grpSpPr>
+        <a:xfrm>
+          <a:off x="0" y="0"/>
+          <a:ext cx="0" cy="0"/>
+          <a:chOff x="0" y="0"/>
+          <a:chExt cx="0" cy="0"/>
+        </a:xfrm>
+      </p:grpSpPr>
+      <p:sp>
+        <p:nvSpPr>
+          <p:cNvPr id="2" name="Title 1"/>
+          <p:cNvSpPr>
+            <a:spLocks noGrp="1"/>
+          </p:cNvSpPr>
+          <p:nvPr>
+            <p:ph type="title"/>
+          </p:nvPr>
+        </p:nvSpPr>
+        <p:spPr/>
+        <p:txBody>
+          <a:bodyPr/>
+          <a:lstStyle/>
+          <a:p>
+            <a:r>
+              <a:rPr lang="pt-BR" dirty="0" smtClean="0"/>
+              <a:t>Fluxo</a:t>
+            </a:r>
+            <a:endParaRPr lang="pt-BR" dirty="0"/>
+          </a:p>
+        </p:txBody>
+      </p:sp>
+      <p:pic>
+        <p:nvPicPr>
+          <p:cNvPr id="5122" name="Picture 2"/>
+          <p:cNvPicPr>
+            <a:picLocks noChangeAspect="1" noChangeArrowheads="1"/>
+          </p:cNvPicPr>
+          <p:nvPr/>
+        </p:nvPicPr>
+        <p:blipFill>
+          <a:blip r:embed="rId2">
+            <a:extLst>
+              <a:ext uri="{28A0092B-C50C-407E-A947-70E740481C1C}">
+                <a14:useLocalDpi xmlns:a14="http://schemas.microsoft.com/office/drawing/2010/main" val="0"/>
+              </a:ext>
+            </a:extLst>
+          </a:blip>
+          <a:srcRect/>
+          <a:stretch>
+            <a:fillRect/>
+          </a:stretch>
+        </p:blipFill>
+        <p:spPr bwMode="auto">
+          <a:xfrm>
+            <a:off x="0" y="2124074"/>
+            <a:ext cx="9144000" cy="3969221"/>
+          </a:xfrm>
+          <a:prstGeom prst="rect">
+            <a:avLst/>
+          </a:prstGeom>
+          <a:noFill/>
+          <a:ln>
+            <a:noFill/>
+          </a:ln>
+          <a:effectLst/>
+          <a:extLst>
+            <a:ext uri="{909E8E84-426E-40DD-AFC4-6F175D3DCCD1}">
+              <a14:hiddenFill xmlns:a14="http://schemas.microsoft.com/office/drawing/2010/main">
+                <a:solidFill>
+                  <a:schemeClr val="accent1"/>
+                </a:solidFill>
+              </a14:hiddenFill>
+            </a:ext>
+            <a:ext uri="{91240B29-F687-4F45-9708-019B960494DF}">
+              <a14:hiddenLine xmlns:a14="http://schemas.microsoft.com/office/drawing/2010/main" w="9525">
+                <a:solidFill>
+                  <a:schemeClr val="tx1"/>
+                </a:solidFill>
+                <a:miter lim="800000"/>
+                <a:headEnd/>
+                <a:tailEnd/>
+              </a14:hiddenLine>
+            </a:ext>
+            <a:ext uri="{AF507438-7753-43E0-B8FC-AC1667EBCBE1}">
+              <a14:hiddenEffects xmlns:a14="http://schemas.microsoft.com/office/drawing/2010/main">
+                <a:effectLst>
+                  <a:outerShdw dist="35921" dir="2700000" algn="ctr" rotWithShape="0">
+                    <a:schemeClr val="bg2"/>
+                  </a:outerShdw>
+                </a:effectLst>
+              </a14:hiddenEffects>
+            </a:ext>
+          </a:extLst>
+        </p:spPr>
+      </p:pic>
+    </p:spTree>
+    <p:extLst>
+      <p:ext uri="{BB962C8B-B14F-4D97-AF65-F5344CB8AC3E}">
+        <p14:creationId xmlns:p14="http://schemas.microsoft.com/office/powerpoint/2010/main" val="4116820841"/>
+      </p:ext>
+    </p:extLst>
+  </p:cSld>
+  <p:clrMapOvr>
+    <a:masterClrMapping/>
+  </p:clrMapOvr>
+</p:sld>
+</file>
+
 <file path=ppt/theme/theme1.xml><?xml version="1.0" encoding="utf-8"?>
-<a:theme xmlns:a="http://schemas.openxmlformats.org/drawingml/2006/main" name="Office Theme">
+<a:theme xmlns:a="http://schemas.openxmlformats.org/drawingml/2006/main" name="Adjacency">
   <a:themeElements>
-    <a:clrScheme name="Office">
+    <a:clrScheme name="Adjacency">
       <a:dk1>
-        <a:sysClr val="windowText" lastClr="000000"/>
+        <a:srgbClr val="2F2B20"/>
       </a:dk1>
       <a:lt1>
-        <a:sysClr val="window" lastClr="FFFFFF"/>
+        <a:srgbClr val="FFFFFF"/>
       </a:lt1>
       <a:dk2>
-        <a:srgbClr val="1F497D"/>
+        <a:srgbClr val="675E47"/>
       </a:dk2>
       <a:lt2>
-        <a:srgbClr val="EEECE1"/>
+        <a:srgbClr val="DFDCB7"/>
       </a:lt2>
       <a:accent1>
-        <a:srgbClr val="4F81BD"/>
+        <a:srgbClr val="A9A57C"/>
       </a:accent1>
       <a:accent2>
-        <a:srgbClr val="C0504D"/>
+        <a:srgbClr val="9CBEBD"/>
       </a:accent2>
       <a:accent3>
-        <a:srgbClr val="9BBB59"/>
+        <a:srgbClr val="D2CB6C"/>
       </a:accent3>
       <a:accent4>
-        <a:srgbClr val="8064A2"/>
+        <a:srgbClr val="95A39D"/>
       </a:accent4>
       <a:accent5>
-        <a:srgbClr val="4BACC6"/>
+        <a:srgbClr val="C89F5D"/>
       </a:accent5>
       <a:accent6>
-        <a:srgbClr val="F79646"/>
+        <a:srgbClr val="B1A089"/>
       </a:accent6>
       <a:hlink>
-        <a:srgbClr val="0000FF"/>
+        <a:srgbClr val="D25814"/>
       </a:hlink>
       <a:folHlink>
-        <a:srgbClr val="800080"/>
+        <a:srgbClr val="849A0A"/>
       </a:folHlink>
     </a:clrScheme>
     <a:fontScheme name="Office">
       <a:majorFont>
-        <a:latin typeface="Calibri"/>
+        <a:latin typeface="Cambria"/>
         <a:ea typeface=""/>
         <a:cs typeface=""/>
-        <a:font script="Jpan" typeface="ＭＳ Ｐゴシック"/>
+        <a:font script="Jpan" typeface="ＭＳ ゴシック"/>
         <a:font script="Hang" typeface="맑은 고딕"/>
         <a:font script="Hans" typeface="宋体"/>
         <a:font script="Hant" typeface="新細明體"/>
@@ -3519,7 +5968,7 @@
         <a:latin typeface="Calibri"/>
         <a:ea typeface=""/>
         <a:cs typeface=""/>
-        <a:font script="Jpan" typeface="ＭＳ Ｐゴシック"/>
+        <a:font script="Jpan" typeface="ＭＳ 明朝"/>
         <a:font script="Hang" typeface="맑은 고딕"/>
         <a:font script="Hans" typeface="宋体"/>
         <a:font script="Hant" typeface="新細明體"/>
@@ -3551,60 +6000,22 @@
         <a:font script="Geor" typeface="Sylfaen"/>
       </a:minorFont>
     </a:fontScheme>
-    <a:fmtScheme name="Office">
+    <a:fmtScheme name="Adjacency">
       <a:fillStyleLst>
         <a:solidFill>
           <a:schemeClr val="phClr"/>
         </a:solidFill>
-        <a:gradFill rotWithShape="1">
-          <a:gsLst>
-            <a:gs pos="0">
-              <a:schemeClr val="phClr">
-                <a:tint val="50000"/>
-                <a:satMod val="300000"/>
-              </a:schemeClr>
-            </a:gs>
-            <a:gs pos="35000">
-              <a:schemeClr val="phClr">
-                <a:tint val="37000"/>
-                <a:satMod val="300000"/>
-              </a:schemeClr>
-            </a:gs>
-            <a:gs pos="100000">
-              <a:schemeClr val="phClr">
-                <a:tint val="15000"/>
-                <a:satMod val="350000"/>
-              </a:schemeClr>
-            </a:gs>
-          </a:gsLst>
-          <a:lin ang="16200000" scaled="1"/>
-        </a:gradFill>
-        <a:gradFill rotWithShape="1">
-          <a:gsLst>
-            <a:gs pos="0">
-              <a:schemeClr val="phClr">
-                <a:shade val="51000"/>
-                <a:satMod val="130000"/>
-              </a:schemeClr>
-            </a:gs>
-            <a:gs pos="80000">
-              <a:schemeClr val="phClr">
-                <a:shade val="93000"/>
-                <a:satMod val="130000"/>
-              </a:schemeClr>
-            </a:gs>
-            <a:gs pos="100000">
-              <a:schemeClr val="phClr">
-                <a:shade val="94000"/>
-                <a:satMod val="135000"/>
-              </a:schemeClr>
-            </a:gs>
-          </a:gsLst>
-          <a:lin ang="16200000" scaled="0"/>
-        </a:gradFill>
+        <a:solidFill>
+          <a:schemeClr val="phClr">
+            <a:tint val="55000"/>
+          </a:schemeClr>
+        </a:solidFill>
+        <a:solidFill>
+          <a:schemeClr val="phClr"/>
+        </a:solidFill>
       </a:fillStyleLst>
       <a:lnStyleLst>
-        <a:ln w="9525" cap="flat" cmpd="sng" algn="ctr">
+        <a:ln w="12700" cap="flat" cmpd="sng" algn="ctr">
           <a:solidFill>
             <a:schemeClr val="phClr">
               <a:shade val="95000"/>
@@ -3628,41 +6039,35 @@
       </a:lnStyleLst>
       <a:effectStyleLst>
         <a:effectStyle>
+          <a:effectLst/>
+        </a:effectStyle>
+        <a:effectStyle>
           <a:effectLst>
-            <a:outerShdw blurRad="40000" dist="20000" dir="5400000" rotWithShape="0">
+            <a:outerShdw blurRad="50800" dist="25400" algn="bl" rotWithShape="0">
               <a:srgbClr val="000000">
-                <a:alpha val="38000"/>
+                <a:alpha val="60000"/>
               </a:srgbClr>
             </a:outerShdw>
           </a:effectLst>
         </a:effectStyle>
         <a:effectStyle>
-          <a:effectLst>
-            <a:outerShdw blurRad="40000" dist="23000" dir="5400000" rotWithShape="0">
-              <a:srgbClr val="000000">
-                <a:alpha val="35000"/>
-              </a:srgbClr>
-            </a:outerShdw>
-          </a:effectLst>
-        </a:effectStyle>
-        <a:effectStyle>
-          <a:effectLst>
-            <a:outerShdw blurRad="40000" dist="23000" dir="5400000" rotWithShape="0">
-              <a:srgbClr val="000000">
-                <a:alpha val="35000"/>
-              </a:srgbClr>
-            </a:outerShdw>
-          </a:effectLst>
+          <a:effectLst/>
           <a:scene3d>
             <a:camera prst="orthographicFront">
               <a:rot lat="0" lon="0" rev="0"/>
             </a:camera>
-            <a:lightRig rig="threePt" dir="t">
-              <a:rot lat="0" lon="0" rev="1200000"/>
+            <a:lightRig rig="brightRoom" dir="tl">
+              <a:rot lat="0" lon="0" rev="1800000"/>
             </a:lightRig>
           </a:scene3d>
-          <a:sp3d>
-            <a:bevelT w="63500" h="25400"/>
+          <a:sp3d contourW="10160" prstMaterial="dkEdge">
+            <a:bevelT w="38100" h="50800" prst="angle"/>
+            <a:contourClr>
+              <a:schemeClr val="phClr">
+                <a:shade val="40000"/>
+                <a:satMod val="150000"/>
+              </a:schemeClr>
+            </a:contourClr>
           </a:sp3d>
         </a:effectStyle>
       </a:effectStyleLst>
@@ -3674,47 +6079,39 @@
           <a:gsLst>
             <a:gs pos="0">
               <a:schemeClr val="phClr">
-                <a:tint val="40000"/>
-                <a:satMod val="350000"/>
+                <a:tint val="90000"/>
               </a:schemeClr>
             </a:gs>
-            <a:gs pos="40000">
+            <a:gs pos="75000">
               <a:schemeClr val="phClr">
-                <a:tint val="45000"/>
-                <a:shade val="99000"/>
-                <a:satMod val="350000"/>
+                <a:shade val="100000"/>
+                <a:satMod val="115000"/>
               </a:schemeClr>
             </a:gs>
             <a:gs pos="100000">
               <a:schemeClr val="phClr">
-                <a:shade val="20000"/>
-                <a:satMod val="255000"/>
+                <a:shade val="70000"/>
+                <a:satMod val="130000"/>
               </a:schemeClr>
             </a:gs>
           </a:gsLst>
           <a:path path="circle">
-            <a:fillToRect l="50000" t="-80000" r="50000" b="180000"/>
+            <a:fillToRect l="20000" t="50000" r="100000" b="50000"/>
           </a:path>
         </a:gradFill>
-        <a:gradFill rotWithShape="1">
-          <a:gsLst>
-            <a:gs pos="0">
+        <a:blipFill rotWithShape="1">
+          <a:blip xmlns:r="http://schemas.openxmlformats.org/officeDocument/2006/relationships" r:embed="rId1">
+            <a:duotone>
               <a:schemeClr val="phClr">
-                <a:tint val="80000"/>
-                <a:satMod val="300000"/>
+                <a:tint val="97000"/>
               </a:schemeClr>
-            </a:gs>
-            <a:gs pos="100000">
               <a:schemeClr val="phClr">
-                <a:shade val="30000"/>
-                <a:satMod val="200000"/>
+                <a:shade val="96000"/>
               </a:schemeClr>
-            </a:gs>
-          </a:gsLst>
-          <a:path path="circle">
-            <a:fillToRect l="50000" t="50000" r="50000" b="50000"/>
-          </a:path>
-        </a:gradFill>
+            </a:duotone>
+          </a:blip>
+          <a:tile tx="0" ty="0" sx="32000" sy="32000" flip="none" algn="tl"/>
+        </a:blipFill>
       </a:bgFillStyleLst>
     </a:fmtScheme>
   </a:themeElements>

</xml_diff>

<commit_message>
Atualização do documento Gerencia de configuração e mudança de software.pptx
</commit_message>
<xml_diff>
--- a/Dot Project EAP/4. System Management/Gerência de configuração/Gerencia de configuração e mudança de software.pptx
+++ b/Dot Project EAP/4. System Management/Gerência de configuração/Gerencia de configuração e mudança de software.pptx
@@ -15,8 +15,10 @@
     <p:sldId id="260" r:id="rId9"/>
     <p:sldId id="266" r:id="rId10"/>
     <p:sldId id="258" r:id="rId11"/>
-    <p:sldId id="259" r:id="rId12"/>
-    <p:sldId id="267" r:id="rId13"/>
+    <p:sldId id="268" r:id="rId12"/>
+    <p:sldId id="269" r:id="rId13"/>
+    <p:sldId id="259" r:id="rId14"/>
+    <p:sldId id="267" r:id="rId15"/>
   </p:sldIdLst>
   <p:sldSz cx="9144000" cy="6858000" type="screen4x3"/>
   <p:notesSz cx="6858000" cy="9144000"/>
@@ -299,7 +301,7 @@
           <a:p>
             <a:fld id="{4FC376CB-86F5-4064-9184-2A6AD5BFEF40}" type="datetimeFigureOut">
               <a:rPr lang="pt-BR" smtClean="0"/>
-              <a:t>03/12/2011</a:t>
+              <a:t>04/12/2011</a:t>
             </a:fld>
             <a:endParaRPr lang="pt-BR"/>
           </a:p>
@@ -469,7 +471,7 @@
           <a:p>
             <a:fld id="{4FC376CB-86F5-4064-9184-2A6AD5BFEF40}" type="datetimeFigureOut">
               <a:rPr lang="pt-BR" smtClean="0"/>
-              <a:t>03/12/2011</a:t>
+              <a:t>04/12/2011</a:t>
             </a:fld>
             <a:endParaRPr lang="pt-BR"/>
           </a:p>
@@ -649,7 +651,7 @@
           <a:p>
             <a:fld id="{4FC376CB-86F5-4064-9184-2A6AD5BFEF40}" type="datetimeFigureOut">
               <a:rPr lang="pt-BR" smtClean="0"/>
-              <a:t>03/12/2011</a:t>
+              <a:t>04/12/2011</a:t>
             </a:fld>
             <a:endParaRPr lang="pt-BR"/>
           </a:p>
@@ -819,7 +821,7 @@
           <a:p>
             <a:fld id="{4FC376CB-86F5-4064-9184-2A6AD5BFEF40}" type="datetimeFigureOut">
               <a:rPr lang="pt-BR" smtClean="0"/>
-              <a:t>03/12/2011</a:t>
+              <a:t>04/12/2011</a:t>
             </a:fld>
             <a:endParaRPr lang="pt-BR"/>
           </a:p>
@@ -1065,7 +1067,7 @@
           <a:p>
             <a:fld id="{4FC376CB-86F5-4064-9184-2A6AD5BFEF40}" type="datetimeFigureOut">
               <a:rPr lang="pt-BR" smtClean="0"/>
-              <a:t>03/12/2011</a:t>
+              <a:t>04/12/2011</a:t>
             </a:fld>
             <a:endParaRPr lang="pt-BR"/>
           </a:p>
@@ -1353,7 +1355,7 @@
           <a:p>
             <a:fld id="{4FC376CB-86F5-4064-9184-2A6AD5BFEF40}" type="datetimeFigureOut">
               <a:rPr lang="pt-BR" smtClean="0"/>
-              <a:t>03/12/2011</a:t>
+              <a:t>04/12/2011</a:t>
             </a:fld>
             <a:endParaRPr lang="pt-BR"/>
           </a:p>
@@ -1775,7 +1777,7 @@
           <a:p>
             <a:fld id="{4FC376CB-86F5-4064-9184-2A6AD5BFEF40}" type="datetimeFigureOut">
               <a:rPr lang="pt-BR" smtClean="0"/>
-              <a:t>03/12/2011</a:t>
+              <a:t>04/12/2011</a:t>
             </a:fld>
             <a:endParaRPr lang="pt-BR"/>
           </a:p>
@@ -1893,7 +1895,7 @@
           <a:p>
             <a:fld id="{4FC376CB-86F5-4064-9184-2A6AD5BFEF40}" type="datetimeFigureOut">
               <a:rPr lang="pt-BR" smtClean="0"/>
-              <a:t>03/12/2011</a:t>
+              <a:t>04/12/2011</a:t>
             </a:fld>
             <a:endParaRPr lang="pt-BR"/>
           </a:p>
@@ -1988,7 +1990,7 @@
           <a:p>
             <a:fld id="{4FC376CB-86F5-4064-9184-2A6AD5BFEF40}" type="datetimeFigureOut">
               <a:rPr lang="pt-BR" smtClean="0"/>
-              <a:t>03/12/2011</a:t>
+              <a:t>04/12/2011</a:t>
             </a:fld>
             <a:endParaRPr lang="pt-BR"/>
           </a:p>
@@ -2265,7 +2267,7 @@
           <a:p>
             <a:fld id="{4FC376CB-86F5-4064-9184-2A6AD5BFEF40}" type="datetimeFigureOut">
               <a:rPr lang="pt-BR" smtClean="0"/>
-              <a:t>03/12/2011</a:t>
+              <a:t>04/12/2011</a:t>
             </a:fld>
             <a:endParaRPr lang="pt-BR"/>
           </a:p>
@@ -2518,7 +2520,7 @@
           <a:p>
             <a:fld id="{4FC376CB-86F5-4064-9184-2A6AD5BFEF40}" type="datetimeFigureOut">
               <a:rPr lang="pt-BR" smtClean="0"/>
-              <a:t>03/12/2011</a:t>
+              <a:t>04/12/2011</a:t>
             </a:fld>
             <a:endParaRPr lang="pt-BR"/>
           </a:p>
@@ -2731,7 +2733,7 @@
           <a:p>
             <a:fld id="{4FC376CB-86F5-4064-9184-2A6AD5BFEF40}" type="datetimeFigureOut">
               <a:rPr lang="pt-BR" smtClean="0"/>
-              <a:t>03/12/2011</a:t>
+              <a:t>04/12/2011</a:t>
             </a:fld>
             <a:endParaRPr lang="pt-BR"/>
           </a:p>
@@ -3246,46 +3248,14 @@
           <a:p>
             <a:r>
               <a:rPr lang="pt-BR" dirty="0" smtClean="0"/>
-              <a:t>Máquina </a:t>
-            </a:r>
+              <a:t>Máquina de estados</a:t>
+            </a:r>
+          </a:p>
+          <a:p>
+            <a:pPr lvl="1"/>
             <a:r>
               <a:rPr lang="pt-BR" dirty="0" smtClean="0"/>
-              <a:t>de estados</a:t>
-            </a:r>
-          </a:p>
-          <a:p>
-            <a:pPr lvl="1"/>
-            <a:r>
-              <a:rPr lang="pt-BR" dirty="0" smtClean="0"/>
-              <a:t>Para que o vai e vem da codificação e testes seja mais </a:t>
-            </a:r>
-            <a:r>
-              <a:rPr lang="pt-BR" dirty="0" smtClean="0"/>
-              <a:t>efetivo </a:t>
-            </a:r>
-            <a:r>
-              <a:rPr lang="pt-BR" dirty="0" smtClean="0"/>
-              <a:t>nós devemos criar uma </a:t>
-            </a:r>
-            <a:r>
-              <a:rPr lang="pt-BR" dirty="0" smtClean="0"/>
-              <a:t>máquina </a:t>
-            </a:r>
-            <a:r>
-              <a:rPr lang="pt-BR" dirty="0" smtClean="0"/>
-              <a:t>de estados. Esta </a:t>
-            </a:r>
-            <a:r>
-              <a:rPr lang="pt-BR" dirty="0" smtClean="0"/>
-              <a:t>máquina </a:t>
-            </a:r>
-            <a:r>
-              <a:rPr lang="pt-BR" dirty="0" smtClean="0"/>
-              <a:t>serve para criarmos um fluxo inteligente em que essas solicitações devem passar</a:t>
-            </a:r>
-            <a:r>
-              <a:rPr lang="pt-BR" dirty="0" smtClean="0"/>
-              <a:t>.</a:t>
+              <a:t>Para que o vai e vem da codificação e testes seja mais efetivo nós devemos criar uma máquina de estados. Esta máquina serve para criarmos um fluxo inteligente em que essas solicitações devem passar.</a:t>
             </a:r>
           </a:p>
           <a:p>
@@ -3310,23 +3280,13 @@
               <a:rPr lang="pt-BR" dirty="0" smtClean="0"/>
               <a:t>autorização </a:t>
             </a:r>
-            <a:endParaRPr lang="pt-BR" dirty="0" smtClean="0"/>
           </a:p>
           <a:p>
             <a:pPr lvl="1"/>
             <a:r>
               <a:rPr lang="pt-BR" dirty="0" smtClean="0"/>
-              <a:t>Se for configurada, </a:t>
-            </a:r>
-            <a:r>
-              <a:rPr lang="pt-BR" dirty="0" smtClean="0"/>
-              <a:t>seu </a:t>
-            </a:r>
-            <a:r>
-              <a:rPr lang="pt-BR" dirty="0" smtClean="0"/>
-              <a:t>uso passa a ser obrigatório</a:t>
-            </a:r>
-            <a:endParaRPr lang="pt-BR" dirty="0" smtClean="0"/>
+              <a:t>Se for configurada, seu uso passa a ser obrigatório</a:t>
+            </a:r>
           </a:p>
         </p:txBody>
       </p:sp>
@@ -3370,7 +3330,12 @@
             <p:ph type="title"/>
           </p:nvPr>
         </p:nvSpPr>
-        <p:spPr/>
+        <p:spPr>
+          <a:xfrm>
+            <a:off x="432634" y="53752"/>
+            <a:ext cx="8229600" cy="1143000"/>
+          </a:xfrm>
+        </p:spPr>
         <p:txBody>
           <a:bodyPr>
             <a:normAutofit fontScale="90000"/>
@@ -3380,6 +3345,303 @@
             <a:pPr lvl="0"/>
             <a:r>
               <a:rPr lang="pt-BR" b="1" dirty="0"/>
+              <a:t>Gerenciamento de Controle de </a:t>
+            </a:r>
+            <a:r>
+              <a:rPr lang="pt-BR" b="1" dirty="0" smtClean="0"/>
+              <a:t>Mudanças - Relatos</a:t>
+            </a:r>
+            <a:endParaRPr lang="pt-BR" b="1" dirty="0"/>
+          </a:p>
+        </p:txBody>
+      </p:sp>
+      <p:sp>
+        <p:nvSpPr>
+          <p:cNvPr id="3" name="Content Placeholder 2"/>
+          <p:cNvSpPr>
+            <a:spLocks noGrp="1"/>
+          </p:cNvSpPr>
+          <p:nvPr>
+            <p:ph idx="1"/>
+          </p:nvPr>
+        </p:nvSpPr>
+        <p:spPr/>
+        <p:txBody>
+          <a:bodyPr/>
+          <a:lstStyle/>
+          <a:p>
+            <a:pPr marL="0" indent="0">
+              <a:buNone/>
+            </a:pPr>
+            <a:endParaRPr lang="pt-BR" dirty="0" smtClean="0"/>
+          </a:p>
+        </p:txBody>
+      </p:sp>
+      <p:pic>
+        <p:nvPicPr>
+          <p:cNvPr id="4" name="Picture 3"/>
+          <p:cNvPicPr>
+            <a:picLocks noChangeAspect="1" noChangeArrowheads="1"/>
+          </p:cNvPicPr>
+          <p:nvPr/>
+        </p:nvPicPr>
+        <p:blipFill>
+          <a:blip r:embed="rId2">
+            <a:extLst>
+              <a:ext uri="{28A0092B-C50C-407E-A947-70E740481C1C}">
+                <a14:useLocalDpi xmlns:a14="http://schemas.microsoft.com/office/drawing/2010/main" val="0"/>
+              </a:ext>
+            </a:extLst>
+          </a:blip>
+          <a:srcRect/>
+          <a:stretch>
+            <a:fillRect/>
+          </a:stretch>
+        </p:blipFill>
+        <p:spPr bwMode="auto">
+          <a:xfrm>
+            <a:off x="241648" y="1340768"/>
+            <a:ext cx="8410714" cy="5517232"/>
+          </a:xfrm>
+          <a:prstGeom prst="rect">
+            <a:avLst/>
+          </a:prstGeom>
+          <a:noFill/>
+          <a:ln>
+            <a:noFill/>
+          </a:ln>
+          <a:effectLst/>
+          <a:extLst>
+            <a:ext uri="{909E8E84-426E-40DD-AFC4-6F175D3DCCD1}">
+              <a14:hiddenFill xmlns:a14="http://schemas.microsoft.com/office/drawing/2010/main">
+                <a:solidFill>
+                  <a:schemeClr val="accent1"/>
+                </a:solidFill>
+              </a14:hiddenFill>
+            </a:ext>
+            <a:ext uri="{91240B29-F687-4F45-9708-019B960494DF}">
+              <a14:hiddenLine xmlns:a14="http://schemas.microsoft.com/office/drawing/2010/main" w="9525">
+                <a:solidFill>
+                  <a:schemeClr val="tx1"/>
+                </a:solidFill>
+                <a:miter lim="800000"/>
+                <a:headEnd/>
+                <a:tailEnd/>
+              </a14:hiddenLine>
+            </a:ext>
+            <a:ext uri="{AF507438-7753-43E0-B8FC-AC1667EBCBE1}">
+              <a14:hiddenEffects xmlns:a14="http://schemas.microsoft.com/office/drawing/2010/main">
+                <a:effectLst>
+                  <a:outerShdw dist="35921" dir="2700000" algn="ctr" rotWithShape="0">
+                    <a:schemeClr val="bg2"/>
+                  </a:outerShdw>
+                </a:effectLst>
+              </a14:hiddenEffects>
+            </a:ext>
+          </a:extLst>
+        </p:spPr>
+      </p:pic>
+    </p:spTree>
+    <p:extLst>
+      <p:ext uri="{BB962C8B-B14F-4D97-AF65-F5344CB8AC3E}">
+        <p14:creationId xmlns:p14="http://schemas.microsoft.com/office/powerpoint/2010/main" val="907991402"/>
+      </p:ext>
+    </p:extLst>
+  </p:cSld>
+  <p:clrMapOvr>
+    <a:masterClrMapping/>
+  </p:clrMapOvr>
+</p:sld>
+</file>
+
+<file path=ppt/slides/slide12.xml><?xml version="1.0" encoding="utf-8"?>
+<p:sld xmlns:a="http://schemas.openxmlformats.org/drawingml/2006/main" xmlns:r="http://schemas.openxmlformats.org/officeDocument/2006/relationships" xmlns:p="http://schemas.openxmlformats.org/presentationml/2006/main">
+  <p:cSld>
+    <p:spTree>
+      <p:nvGrpSpPr>
+        <p:cNvPr id="1" name=""/>
+        <p:cNvGrpSpPr/>
+        <p:nvPr/>
+      </p:nvGrpSpPr>
+      <p:grpSpPr>
+        <a:xfrm>
+          <a:off x="0" y="0"/>
+          <a:ext cx="0" cy="0"/>
+          <a:chOff x="0" y="0"/>
+          <a:chExt cx="0" cy="0"/>
+        </a:xfrm>
+      </p:grpSpPr>
+      <p:sp>
+        <p:nvSpPr>
+          <p:cNvPr id="2" name="Title 1"/>
+          <p:cNvSpPr>
+            <a:spLocks noGrp="1"/>
+          </p:cNvSpPr>
+          <p:nvPr>
+            <p:ph type="title"/>
+          </p:nvPr>
+        </p:nvSpPr>
+        <p:spPr>
+          <a:xfrm>
+            <a:off x="432634" y="53752"/>
+            <a:ext cx="8229600" cy="1143000"/>
+          </a:xfrm>
+        </p:spPr>
+        <p:txBody>
+          <a:bodyPr>
+            <a:normAutofit fontScale="90000"/>
+          </a:bodyPr>
+          <a:lstStyle/>
+          <a:p>
+            <a:pPr lvl="0"/>
+            <a:r>
+              <a:rPr lang="pt-BR" b="1" dirty="0"/>
+              <a:t>Gerenciamento de Controle de </a:t>
+            </a:r>
+            <a:r>
+              <a:rPr lang="pt-BR" b="1" dirty="0" smtClean="0"/>
+              <a:t>Mudanças - Fluxos</a:t>
+            </a:r>
+            <a:endParaRPr lang="pt-BR" b="1" dirty="0"/>
+          </a:p>
+        </p:txBody>
+      </p:sp>
+      <p:sp>
+        <p:nvSpPr>
+          <p:cNvPr id="3" name="Content Placeholder 2"/>
+          <p:cNvSpPr>
+            <a:spLocks noGrp="1"/>
+          </p:cNvSpPr>
+          <p:nvPr>
+            <p:ph idx="1"/>
+          </p:nvPr>
+        </p:nvSpPr>
+        <p:spPr/>
+        <p:txBody>
+          <a:bodyPr/>
+          <a:lstStyle/>
+          <a:p>
+            <a:pPr marL="0" indent="0">
+              <a:buNone/>
+            </a:pPr>
+            <a:endParaRPr lang="pt-BR" dirty="0" smtClean="0"/>
+          </a:p>
+        </p:txBody>
+      </p:sp>
+      <p:pic>
+        <p:nvPicPr>
+          <p:cNvPr id="5" name="Picture 2"/>
+          <p:cNvPicPr>
+            <a:picLocks noChangeAspect="1" noChangeArrowheads="1"/>
+          </p:cNvPicPr>
+          <p:nvPr/>
+        </p:nvPicPr>
+        <p:blipFill>
+          <a:blip r:embed="rId2">
+            <a:extLst>
+              <a:ext uri="{28A0092B-C50C-407E-A947-70E740481C1C}">
+                <a14:useLocalDpi xmlns:a14="http://schemas.microsoft.com/office/drawing/2010/main" val="0"/>
+              </a:ext>
+            </a:extLst>
+          </a:blip>
+          <a:srcRect/>
+          <a:stretch>
+            <a:fillRect/>
+          </a:stretch>
+        </p:blipFill>
+        <p:spPr bwMode="auto">
+          <a:xfrm>
+            <a:off x="0" y="2124074"/>
+            <a:ext cx="9144000" cy="3969221"/>
+          </a:xfrm>
+          <a:prstGeom prst="rect">
+            <a:avLst/>
+          </a:prstGeom>
+          <a:noFill/>
+          <a:ln>
+            <a:noFill/>
+          </a:ln>
+          <a:effectLst/>
+          <a:extLst>
+            <a:ext uri="{909E8E84-426E-40DD-AFC4-6F175D3DCCD1}">
+              <a14:hiddenFill xmlns:a14="http://schemas.microsoft.com/office/drawing/2010/main">
+                <a:solidFill>
+                  <a:schemeClr val="accent1"/>
+                </a:solidFill>
+              </a14:hiddenFill>
+            </a:ext>
+            <a:ext uri="{91240B29-F687-4F45-9708-019B960494DF}">
+              <a14:hiddenLine xmlns:a14="http://schemas.microsoft.com/office/drawing/2010/main" w="9525">
+                <a:solidFill>
+                  <a:schemeClr val="tx1"/>
+                </a:solidFill>
+                <a:miter lim="800000"/>
+                <a:headEnd/>
+                <a:tailEnd/>
+              </a14:hiddenLine>
+            </a:ext>
+            <a:ext uri="{AF507438-7753-43E0-B8FC-AC1667EBCBE1}">
+              <a14:hiddenEffects xmlns:a14="http://schemas.microsoft.com/office/drawing/2010/main">
+                <a:effectLst>
+                  <a:outerShdw dist="35921" dir="2700000" algn="ctr" rotWithShape="0">
+                    <a:schemeClr val="bg2"/>
+                  </a:outerShdw>
+                </a:effectLst>
+              </a14:hiddenEffects>
+            </a:ext>
+          </a:extLst>
+        </p:spPr>
+      </p:pic>
+    </p:spTree>
+    <p:extLst>
+      <p:ext uri="{BB962C8B-B14F-4D97-AF65-F5344CB8AC3E}">
+        <p14:creationId xmlns:p14="http://schemas.microsoft.com/office/powerpoint/2010/main" val="4245069425"/>
+      </p:ext>
+    </p:extLst>
+  </p:cSld>
+  <p:clrMapOvr>
+    <a:masterClrMapping/>
+  </p:clrMapOvr>
+</p:sld>
+</file>
+
+<file path=ppt/slides/slide13.xml><?xml version="1.0" encoding="utf-8"?>
+<p:sld xmlns:a="http://schemas.openxmlformats.org/drawingml/2006/main" xmlns:r="http://schemas.openxmlformats.org/officeDocument/2006/relationships" xmlns:p="http://schemas.openxmlformats.org/presentationml/2006/main">
+  <p:cSld>
+    <p:spTree>
+      <p:nvGrpSpPr>
+        <p:cNvPr id="1" name=""/>
+        <p:cNvGrpSpPr/>
+        <p:nvPr/>
+      </p:nvGrpSpPr>
+      <p:grpSpPr>
+        <a:xfrm>
+          <a:off x="0" y="0"/>
+          <a:ext cx="0" cy="0"/>
+          <a:chOff x="0" y="0"/>
+          <a:chExt cx="0" cy="0"/>
+        </a:xfrm>
+      </p:grpSpPr>
+      <p:sp>
+        <p:nvSpPr>
+          <p:cNvPr id="2" name="Title 1"/>
+          <p:cNvSpPr>
+            <a:spLocks noGrp="1"/>
+          </p:cNvSpPr>
+          <p:nvPr>
+            <p:ph type="title"/>
+          </p:nvPr>
+        </p:nvSpPr>
+        <p:spPr/>
+        <p:txBody>
+          <a:bodyPr>
+            <a:normAutofit fontScale="90000"/>
+          </a:bodyPr>
+          <a:lstStyle/>
+          <a:p>
+            <a:pPr lvl="0"/>
+            <a:r>
+              <a:rPr lang="pt-BR" b="1" dirty="0"/>
               <a:t>Gerenciamento de Controle de Mudanças</a:t>
             </a:r>
           </a:p>
@@ -3402,13 +3664,8 @@
           <a:p>
             <a:r>
               <a:rPr lang="pt-BR" dirty="0" smtClean="0"/>
-              <a:t>Maquina de </a:t>
-            </a:r>
-            <a:r>
-              <a:rPr lang="pt-BR" dirty="0" smtClean="0"/>
-              <a:t>estados</a:t>
-            </a:r>
-            <a:endParaRPr lang="pt-BR" dirty="0" smtClean="0"/>
+              <a:t>Maquina de estados</a:t>
+            </a:r>
           </a:p>
         </p:txBody>
       </p:sp>
@@ -3466,7 +3723,7 @@
 </p:sld>
 </file>
 
-<file path=ppt/slides/slide12.xml><?xml version="1.0" encoding="utf-8"?>
+<file path=ppt/slides/slide14.xml><?xml version="1.0" encoding="utf-8"?>
 <p:sld xmlns:a="http://schemas.openxmlformats.org/drawingml/2006/main" xmlns:r="http://schemas.openxmlformats.org/officeDocument/2006/relationships" xmlns:p="http://schemas.openxmlformats.org/presentationml/2006/main">
   <p:cSld>
     <p:spTree>
@@ -3525,17 +3782,12 @@
           <a:p>
             <a:r>
               <a:rPr lang="pt-BR" dirty="0" smtClean="0"/>
-              <a:t>Maquina de </a:t>
-            </a:r>
-            <a:r>
-              <a:rPr lang="pt-BR" dirty="0" smtClean="0"/>
-              <a:t>estados no </a:t>
+              <a:t>Maquina de estados no </a:t>
             </a:r>
             <a:r>
               <a:rPr lang="pt-BR" i="1" dirty="0" smtClean="0"/>
               <a:t>MANTIS</a:t>
             </a:r>
-            <a:endParaRPr lang="pt-BR" i="1" dirty="0" smtClean="0"/>
           </a:p>
         </p:txBody>
       </p:sp>
@@ -3665,11 +3917,7 @@
           <a:p>
             <a:r>
               <a:rPr lang="pt-BR" dirty="0" smtClean="0"/>
-              <a:t>Comunica</a:t>
-            </a:r>
-            <a:r>
-              <a:rPr lang="pt-BR" dirty="0" smtClean="0"/>
-              <a:t>ção mais efetiva</a:t>
+              <a:t>Comunicação mais efetiva</a:t>
             </a:r>
           </a:p>
           <a:p>
@@ -3756,11 +4004,7 @@
             <a:pPr lvl="0"/>
             <a:r>
               <a:rPr lang="pt-BR" b="1" dirty="0" smtClean="0"/>
-              <a:t>Estrutura de diret</a:t>
-            </a:r>
-            <a:r>
-              <a:rPr lang="pt-BR" b="1" dirty="0" smtClean="0"/>
-              <a:t>órios</a:t>
+              <a:t>Estrutura de diretórios</a:t>
             </a:r>
             <a:endParaRPr lang="pt-BR" b="1" i="1" dirty="0"/>
           </a:p>
@@ -3857,11 +4101,7 @@
             <a:pPr lvl="0"/>
             <a:r>
               <a:rPr lang="pt-BR" b="1" dirty="0" smtClean="0"/>
-              <a:t>Estrutura de diret</a:t>
-            </a:r>
-            <a:r>
-              <a:rPr lang="pt-BR" b="1" dirty="0" smtClean="0"/>
-              <a:t>órios</a:t>
+              <a:t>Estrutura de diretórios</a:t>
             </a:r>
             <a:endParaRPr lang="pt-BR" b="1" i="1" dirty="0"/>
           </a:p>
@@ -4601,33 +4841,13 @@
           <a:p>
             <a:r>
               <a:rPr lang="pt-BR" dirty="0" smtClean="0"/>
-              <a:t>Para que o processo de codificação e testes seja mais efetivo em uma equipe é nescessario que haja uma ferramenta para </a:t>
-            </a:r>
+              <a:t>Para que o processo de codificação e testes seja mais efetivo em uma equipe é nescessario que haja uma ferramenta para que automatize a comunicação dos relatos dos testes já realizados, de forma a torna essa comunicação o mais efetiva possível. O mesme acontesse para solicitações de mudança.</a:t>
+            </a:r>
+          </a:p>
+          <a:p>
             <a:r>
               <a:rPr lang="pt-BR" dirty="0" smtClean="0"/>
-              <a:t>que automatize </a:t>
-            </a:r>
-            <a:r>
-              <a:rPr lang="pt-BR" dirty="0" smtClean="0"/>
-              <a:t>a comunicação dos relatos dos </a:t>
-            </a:r>
-            <a:r>
-              <a:rPr lang="pt-BR" dirty="0" smtClean="0"/>
-              <a:t>testes já realizados, de forma a torna essa comunicação o mais efetiva possível. </a:t>
-            </a:r>
-            <a:r>
-              <a:rPr lang="pt-BR" dirty="0" smtClean="0"/>
-              <a:t>O mesme acontesse para solicitações de mudança.</a:t>
-            </a:r>
-          </a:p>
-          <a:p>
-            <a:r>
-              <a:rPr lang="pt-BR" dirty="0" smtClean="0"/>
-              <a:t>Pensando nisso nossa </a:t>
-            </a:r>
-            <a:r>
-              <a:rPr lang="pt-BR" dirty="0" smtClean="0"/>
-              <a:t>equipe utilizou o </a:t>
+              <a:t>Pensando nisso nossa equipe utilizou o </a:t>
             </a:r>
             <a:r>
               <a:rPr lang="pt-BR" i="1" dirty="0" smtClean="0"/>
@@ -4635,11 +4855,7 @@
             </a:r>
             <a:r>
               <a:rPr lang="pt-BR" dirty="0" smtClean="0"/>
-              <a:t>, </a:t>
-            </a:r>
-            <a:r>
-              <a:rPr lang="pt-BR" dirty="0" smtClean="0"/>
-              <a:t>um software de </a:t>
+              <a:t>, um software de </a:t>
             </a:r>
             <a:r>
               <a:rPr lang="en-US" i="1" dirty="0" err="1" smtClean="0"/>

</xml_diff>

<commit_message>
Atualização Gerencia de configuração e mudança de software.pptx
</commit_message>
<xml_diff>
--- a/Dot Project EAP/4. System Management/Gerência de configuração/Gerencia de configuração e mudança de software.pptx
+++ b/Dot Project EAP/4. System Management/Gerência de configuração/Gerencia de configuração e mudança de software.pptx
@@ -4740,24 +4740,107 @@
             <p:ph idx="1"/>
           </p:nvPr>
         </p:nvSpPr>
-        <p:spPr/>
+        <p:spPr>
+          <a:xfrm>
+            <a:off x="457200" y="1600201"/>
+            <a:ext cx="8229600" cy="1104776"/>
+          </a:xfrm>
+        </p:spPr>
         <p:txBody>
           <a:bodyPr/>
           <a:lstStyle/>
           <a:p>
             <a:r>
               <a:rPr lang="pt-BR" dirty="0" smtClean="0"/>
-              <a:t>Informações Úteis</a:t>
-            </a:r>
-          </a:p>
-          <a:p>
-            <a:endParaRPr lang="pt-BR"/>
-          </a:p>
-          <a:p>
+              <a:t>Estatisticas</a:t>
+            </a:r>
+          </a:p>
+          <a:p>
+            <a:r>
+              <a:rPr lang="pt-BR" sz="2400" dirty="0"/>
+              <a:t>14.862 Arquivos, 1.647 Pastas - 1,68 </a:t>
+            </a:r>
+            <a:r>
+              <a:rPr lang="pt-BR" sz="2400" dirty="0" smtClean="0"/>
+              <a:t>GB, 139 Commits</a:t>
+            </a:r>
             <a:endParaRPr lang="pt-BR" dirty="0" smtClean="0"/>
           </a:p>
-        </p:txBody>
-      </p:sp>
+          <a:p>
+            <a:endParaRPr lang="pt-BR" dirty="0" smtClean="0"/>
+          </a:p>
+          <a:p>
+            <a:endParaRPr lang="pt-BR" dirty="0"/>
+          </a:p>
+          <a:p>
+            <a:endParaRPr lang="pt-BR" dirty="0" smtClean="0"/>
+          </a:p>
+        </p:txBody>
+      </p:sp>
+      <p:pic>
+        <p:nvPicPr>
+          <p:cNvPr id="1027" name="Picture 3"/>
+          <p:cNvPicPr>
+            <a:picLocks noChangeAspect="1" noChangeArrowheads="1"/>
+          </p:cNvPicPr>
+          <p:nvPr/>
+        </p:nvPicPr>
+        <p:blipFill>
+          <a:blip r:embed="rId2">
+            <a:extLst>
+              <a:ext uri="{28A0092B-C50C-407E-A947-70E740481C1C}">
+                <a14:useLocalDpi xmlns:a14="http://schemas.microsoft.com/office/drawing/2010/main" val="0"/>
+              </a:ext>
+            </a:extLst>
+          </a:blip>
+          <a:srcRect/>
+          <a:stretch>
+            <a:fillRect/>
+          </a:stretch>
+        </p:blipFill>
+        <p:spPr bwMode="auto">
+          <a:xfrm>
+            <a:off x="1906339" y="2564904"/>
+            <a:ext cx="5381625" cy="4152900"/>
+          </a:xfrm>
+          <a:prstGeom prst="rect">
+            <a:avLst/>
+          </a:prstGeom>
+          <a:noFill/>
+          <a:ln>
+            <a:noFill/>
+          </a:ln>
+          <a:effectLst/>
+          <a:extLst>
+            <a:ext uri="{909E8E84-426E-40DD-AFC4-6F175D3DCCD1}">
+              <a14:hiddenFill xmlns:a14="http://schemas.microsoft.com/office/drawing/2010/main">
+                <a:solidFill>
+                  <a:schemeClr val="accent1"/>
+                </a:solidFill>
+              </a14:hiddenFill>
+            </a:ext>
+            <a:ext uri="{91240B29-F687-4F45-9708-019B960494DF}">
+              <a14:hiddenLine xmlns:a14="http://schemas.microsoft.com/office/drawing/2010/main" w="9525">
+                <a:solidFill>
+                  <a:schemeClr val="tx1"/>
+                </a:solidFill>
+                <a:miter lim="800000"/>
+                <a:headEnd/>
+                <a:tailEnd/>
+              </a14:hiddenLine>
+            </a:ext>
+            <a:ext uri="{AF507438-7753-43E0-B8FC-AC1667EBCBE1}">
+              <a14:hiddenEffects xmlns:a14="http://schemas.microsoft.com/office/drawing/2010/main">
+                <a:effectLst>
+                  <a:outerShdw dist="35921" dir="2700000" algn="ctr" rotWithShape="0">
+                    <a:schemeClr val="bg2"/>
+                  </a:outerShdw>
+                </a:effectLst>
+              </a14:hiddenEffects>
+            </a:ext>
+          </a:extLst>
+        </p:spPr>
+      </p:pic>
     </p:spTree>
     <p:extLst>
       <p:ext uri="{BB962C8B-B14F-4D97-AF65-F5344CB8AC3E}">

</xml_diff>

<commit_message>
atualizado documento Gerencia de configuração e mudança de software.pptx
</commit_message>
<xml_diff>
--- a/Dot Project EAP/4. System Management/Gerência de configuração/Gerencia de configuração e mudança de software.pptx
+++ b/Dot Project EAP/4. System Management/Gerência de configuração/Gerencia de configuração e mudança de software.pptx
@@ -16,10 +16,10 @@
     <p:sldId id="260" r:id="rId10"/>
     <p:sldId id="266" r:id="rId11"/>
     <p:sldId id="258" r:id="rId12"/>
-    <p:sldId id="268" r:id="rId13"/>
-    <p:sldId id="269" r:id="rId14"/>
-    <p:sldId id="259" r:id="rId15"/>
-    <p:sldId id="267" r:id="rId16"/>
+    <p:sldId id="259" r:id="rId13"/>
+    <p:sldId id="267" r:id="rId14"/>
+    <p:sldId id="268" r:id="rId15"/>
+    <p:sldId id="269" r:id="rId16"/>
   </p:sldIdLst>
   <p:sldSz cx="9144000" cy="6858000" type="screen4x3"/>
   <p:notesSz cx="6858000" cy="9144000"/>
@@ -302,7 +302,7 @@
           <a:p>
             <a:fld id="{4FC376CB-86F5-4064-9184-2A6AD5BFEF40}" type="datetimeFigureOut">
               <a:rPr lang="pt-BR" smtClean="0"/>
-              <a:t>04/12/2011</a:t>
+              <a:t>05/12/2011</a:t>
             </a:fld>
             <a:endParaRPr lang="pt-BR"/>
           </a:p>
@@ -472,7 +472,7 @@
           <a:p>
             <a:fld id="{4FC376CB-86F5-4064-9184-2A6AD5BFEF40}" type="datetimeFigureOut">
               <a:rPr lang="pt-BR" smtClean="0"/>
-              <a:t>04/12/2011</a:t>
+              <a:t>05/12/2011</a:t>
             </a:fld>
             <a:endParaRPr lang="pt-BR"/>
           </a:p>
@@ -652,7 +652,7 @@
           <a:p>
             <a:fld id="{4FC376CB-86F5-4064-9184-2A6AD5BFEF40}" type="datetimeFigureOut">
               <a:rPr lang="pt-BR" smtClean="0"/>
-              <a:t>04/12/2011</a:t>
+              <a:t>05/12/2011</a:t>
             </a:fld>
             <a:endParaRPr lang="pt-BR"/>
           </a:p>
@@ -822,7 +822,7 @@
           <a:p>
             <a:fld id="{4FC376CB-86F5-4064-9184-2A6AD5BFEF40}" type="datetimeFigureOut">
               <a:rPr lang="pt-BR" smtClean="0"/>
-              <a:t>04/12/2011</a:t>
+              <a:t>05/12/2011</a:t>
             </a:fld>
             <a:endParaRPr lang="pt-BR"/>
           </a:p>
@@ -1068,7 +1068,7 @@
           <a:p>
             <a:fld id="{4FC376CB-86F5-4064-9184-2A6AD5BFEF40}" type="datetimeFigureOut">
               <a:rPr lang="pt-BR" smtClean="0"/>
-              <a:t>04/12/2011</a:t>
+              <a:t>05/12/2011</a:t>
             </a:fld>
             <a:endParaRPr lang="pt-BR"/>
           </a:p>
@@ -1356,7 +1356,7 @@
           <a:p>
             <a:fld id="{4FC376CB-86F5-4064-9184-2A6AD5BFEF40}" type="datetimeFigureOut">
               <a:rPr lang="pt-BR" smtClean="0"/>
-              <a:t>04/12/2011</a:t>
+              <a:t>05/12/2011</a:t>
             </a:fld>
             <a:endParaRPr lang="pt-BR"/>
           </a:p>
@@ -1778,7 +1778,7 @@
           <a:p>
             <a:fld id="{4FC376CB-86F5-4064-9184-2A6AD5BFEF40}" type="datetimeFigureOut">
               <a:rPr lang="pt-BR" smtClean="0"/>
-              <a:t>04/12/2011</a:t>
+              <a:t>05/12/2011</a:t>
             </a:fld>
             <a:endParaRPr lang="pt-BR"/>
           </a:p>
@@ -1896,7 +1896,7 @@
           <a:p>
             <a:fld id="{4FC376CB-86F5-4064-9184-2A6AD5BFEF40}" type="datetimeFigureOut">
               <a:rPr lang="pt-BR" smtClean="0"/>
-              <a:t>04/12/2011</a:t>
+              <a:t>05/12/2011</a:t>
             </a:fld>
             <a:endParaRPr lang="pt-BR"/>
           </a:p>
@@ -1991,7 +1991,7 @@
           <a:p>
             <a:fld id="{4FC376CB-86F5-4064-9184-2A6AD5BFEF40}" type="datetimeFigureOut">
               <a:rPr lang="pt-BR" smtClean="0"/>
-              <a:t>04/12/2011</a:t>
+              <a:t>05/12/2011</a:t>
             </a:fld>
             <a:endParaRPr lang="pt-BR"/>
           </a:p>
@@ -2268,7 +2268,7 @@
           <a:p>
             <a:fld id="{4FC376CB-86F5-4064-9184-2A6AD5BFEF40}" type="datetimeFigureOut">
               <a:rPr lang="pt-BR" smtClean="0"/>
-              <a:t>04/12/2011</a:t>
+              <a:t>05/12/2011</a:t>
             </a:fld>
             <a:endParaRPr lang="pt-BR"/>
           </a:p>
@@ -2521,7 +2521,7 @@
           <a:p>
             <a:fld id="{4FC376CB-86F5-4064-9184-2A6AD5BFEF40}" type="datetimeFigureOut">
               <a:rPr lang="pt-BR" smtClean="0"/>
-              <a:t>04/12/2011</a:t>
+              <a:t>05/12/2011</a:t>
             </a:fld>
             <a:endParaRPr lang="pt-BR"/>
           </a:p>
@@ -2586,9 +2586,19 @@
 <p:sldMaster xmlns:a="http://schemas.openxmlformats.org/drawingml/2006/main" xmlns:r="http://schemas.openxmlformats.org/officeDocument/2006/relationships" xmlns:p="http://schemas.openxmlformats.org/presentationml/2006/main">
   <p:cSld>
     <p:bg>
-      <p:bgRef idx="1001">
-        <a:schemeClr val="bg1"/>
-      </p:bgRef>
+      <p:bgPr>
+        <a:blipFill dpi="0" rotWithShape="1">
+          <a:blip r:embed="rId13">
+            <a:alphaModFix amt="60000"/>
+            <a:lum/>
+          </a:blip>
+          <a:srcRect/>
+          <a:stretch>
+            <a:fillRect l="62000" t="86000" b="3000"/>
+          </a:stretch>
+        </a:blipFill>
+        <a:effectLst/>
+      </p:bgPr>
     </p:bg>
     <p:spTree>
       <p:nvGrpSpPr>
@@ -2734,7 +2744,7 @@
           <a:p>
             <a:fld id="{4FC376CB-86F5-4064-9184-2A6AD5BFEF40}" type="datetimeFigureOut">
               <a:rPr lang="pt-BR" smtClean="0"/>
-              <a:t>04/12/2011</a:t>
+              <a:t>05/12/2011</a:t>
             </a:fld>
             <a:endParaRPr lang="pt-BR"/>
           </a:p>
@@ -3095,6 +3105,21 @@
 <file path=ppt/slides/slide1.xml><?xml version="1.0" encoding="utf-8"?>
 <p:sld xmlns:a="http://schemas.openxmlformats.org/drawingml/2006/main" xmlns:r="http://schemas.openxmlformats.org/officeDocument/2006/relationships" xmlns:p="http://schemas.openxmlformats.org/presentationml/2006/main">
   <p:cSld>
+    <p:bg>
+      <p:bgPr>
+        <a:blipFill dpi="0" rotWithShape="1">
+          <a:blip r:embed="rId2">
+            <a:alphaModFix amt="60000"/>
+            <a:lum/>
+          </a:blip>
+          <a:srcRect/>
+          <a:stretch>
+            <a:fillRect t="-5000" r="-2000" b="86000"/>
+          </a:stretch>
+        </a:blipFill>
+        <a:effectLst/>
+      </p:bgPr>
+    </p:bg>
     <p:spTree>
       <p:nvGrpSpPr>
         <p:cNvPr id="1" name=""/>
@@ -3251,7 +3276,31 @@
           <a:p>
             <a:r>
               <a:rPr lang="pt-BR" dirty="0" smtClean="0"/>
-              <a:t>Para que o processo de codificação e testes seja mais efetivo em uma equipe é nescessario que haja uma ferramenta para que automatize a comunicação dos relatos dos testes já realizados, de forma a torna essa comunicação o mais efetiva possível. O mesme acontesse para solicitações de mudança.</a:t>
+              <a:t>Para que o processo de codificação e testes seja mais efetivo em uma equipe é nescessario que haja uma ferramenta para que automatize a comunicação dos relatos dos testes já realizados, de forma a </a:t>
+            </a:r>
+            <a:r>
+              <a:rPr lang="pt-BR" dirty="0" smtClean="0"/>
+              <a:t>tornar </a:t>
+            </a:r>
+            <a:r>
+              <a:rPr lang="pt-BR" dirty="0" smtClean="0"/>
+              <a:t>essa comunicação </a:t>
+            </a:r>
+            <a:r>
+              <a:rPr lang="pt-BR" dirty="0" smtClean="0"/>
+              <a:t>a </a:t>
+            </a:r>
+            <a:r>
+              <a:rPr lang="pt-BR" dirty="0" smtClean="0"/>
+              <a:t>mais efetiva possível. O </a:t>
+            </a:r>
+            <a:r>
+              <a:rPr lang="pt-BR" dirty="0" smtClean="0"/>
+              <a:t>mesmo </a:t>
+            </a:r>
+            <a:r>
+              <a:rPr lang="pt-BR" dirty="0" smtClean="0"/>
+              <a:t>acontesse para solicitações de mudança.</a:t>
             </a:r>
           </a:p>
           <a:p>
@@ -3403,308 +3452,6 @@
 </file>
 
 <file path=ppt/slides/slide12.xml><?xml version="1.0" encoding="utf-8"?>
-<p:sld xmlns:a="http://schemas.openxmlformats.org/drawingml/2006/main" xmlns:r="http://schemas.openxmlformats.org/officeDocument/2006/relationships" xmlns:p="http://schemas.openxmlformats.org/presentationml/2006/main">
-  <p:cSld>
-    <p:spTree>
-      <p:nvGrpSpPr>
-        <p:cNvPr id="1" name=""/>
-        <p:cNvGrpSpPr/>
-        <p:nvPr/>
-      </p:nvGrpSpPr>
-      <p:grpSpPr>
-        <a:xfrm>
-          <a:off x="0" y="0"/>
-          <a:ext cx="0" cy="0"/>
-          <a:chOff x="0" y="0"/>
-          <a:chExt cx="0" cy="0"/>
-        </a:xfrm>
-      </p:grpSpPr>
-      <p:sp>
-        <p:nvSpPr>
-          <p:cNvPr id="2" name="Title 1"/>
-          <p:cNvSpPr>
-            <a:spLocks noGrp="1"/>
-          </p:cNvSpPr>
-          <p:nvPr>
-            <p:ph type="title"/>
-          </p:nvPr>
-        </p:nvSpPr>
-        <p:spPr>
-          <a:xfrm>
-            <a:off x="432634" y="53752"/>
-            <a:ext cx="8229600" cy="1143000"/>
-          </a:xfrm>
-        </p:spPr>
-        <p:txBody>
-          <a:bodyPr>
-            <a:normAutofit fontScale="90000"/>
-          </a:bodyPr>
-          <a:lstStyle/>
-          <a:p>
-            <a:pPr lvl="0"/>
-            <a:r>
-              <a:rPr lang="pt-BR" b="1" dirty="0"/>
-              <a:t>Gerenciamento de Controle de </a:t>
-            </a:r>
-            <a:r>
-              <a:rPr lang="pt-BR" b="1" dirty="0" smtClean="0"/>
-              <a:t>Mudanças - Relatos</a:t>
-            </a:r>
-            <a:endParaRPr lang="pt-BR" b="1" dirty="0"/>
-          </a:p>
-        </p:txBody>
-      </p:sp>
-      <p:sp>
-        <p:nvSpPr>
-          <p:cNvPr id="3" name="Content Placeholder 2"/>
-          <p:cNvSpPr>
-            <a:spLocks noGrp="1"/>
-          </p:cNvSpPr>
-          <p:nvPr>
-            <p:ph idx="1"/>
-          </p:nvPr>
-        </p:nvSpPr>
-        <p:spPr/>
-        <p:txBody>
-          <a:bodyPr/>
-          <a:lstStyle/>
-          <a:p>
-            <a:pPr marL="0" indent="0">
-              <a:buNone/>
-            </a:pPr>
-            <a:endParaRPr lang="pt-BR" dirty="0" smtClean="0"/>
-          </a:p>
-        </p:txBody>
-      </p:sp>
-      <p:pic>
-        <p:nvPicPr>
-          <p:cNvPr id="4" name="Picture 3"/>
-          <p:cNvPicPr>
-            <a:picLocks noChangeAspect="1" noChangeArrowheads="1"/>
-          </p:cNvPicPr>
-          <p:nvPr/>
-        </p:nvPicPr>
-        <p:blipFill>
-          <a:blip r:embed="rId2">
-            <a:extLst>
-              <a:ext uri="{28A0092B-C50C-407E-A947-70E740481C1C}">
-                <a14:useLocalDpi xmlns:a14="http://schemas.microsoft.com/office/drawing/2010/main" val="0"/>
-              </a:ext>
-            </a:extLst>
-          </a:blip>
-          <a:srcRect/>
-          <a:stretch>
-            <a:fillRect/>
-          </a:stretch>
-        </p:blipFill>
-        <p:spPr bwMode="auto">
-          <a:xfrm>
-            <a:off x="241648" y="1340768"/>
-            <a:ext cx="8410714" cy="5517232"/>
-          </a:xfrm>
-          <a:prstGeom prst="rect">
-            <a:avLst/>
-          </a:prstGeom>
-          <a:noFill/>
-          <a:ln>
-            <a:noFill/>
-          </a:ln>
-          <a:effectLst/>
-          <a:extLst>
-            <a:ext uri="{909E8E84-426E-40DD-AFC4-6F175D3DCCD1}">
-              <a14:hiddenFill xmlns:a14="http://schemas.microsoft.com/office/drawing/2010/main">
-                <a:solidFill>
-                  <a:schemeClr val="accent1"/>
-                </a:solidFill>
-              </a14:hiddenFill>
-            </a:ext>
-            <a:ext uri="{91240B29-F687-4F45-9708-019B960494DF}">
-              <a14:hiddenLine xmlns:a14="http://schemas.microsoft.com/office/drawing/2010/main" w="9525">
-                <a:solidFill>
-                  <a:schemeClr val="tx1"/>
-                </a:solidFill>
-                <a:miter lim="800000"/>
-                <a:headEnd/>
-                <a:tailEnd/>
-              </a14:hiddenLine>
-            </a:ext>
-            <a:ext uri="{AF507438-7753-43E0-B8FC-AC1667EBCBE1}">
-              <a14:hiddenEffects xmlns:a14="http://schemas.microsoft.com/office/drawing/2010/main">
-                <a:effectLst>
-                  <a:outerShdw dist="35921" dir="2700000" algn="ctr" rotWithShape="0">
-                    <a:schemeClr val="bg2"/>
-                  </a:outerShdw>
-                </a:effectLst>
-              </a14:hiddenEffects>
-            </a:ext>
-          </a:extLst>
-        </p:spPr>
-      </p:pic>
-    </p:spTree>
-    <p:extLst>
-      <p:ext uri="{BB962C8B-B14F-4D97-AF65-F5344CB8AC3E}">
-        <p14:creationId xmlns:p14="http://schemas.microsoft.com/office/powerpoint/2010/main" val="907991402"/>
-      </p:ext>
-    </p:extLst>
-  </p:cSld>
-  <p:clrMapOvr>
-    <a:masterClrMapping/>
-  </p:clrMapOvr>
-</p:sld>
-</file>
-
-<file path=ppt/slides/slide13.xml><?xml version="1.0" encoding="utf-8"?>
-<p:sld xmlns:a="http://schemas.openxmlformats.org/drawingml/2006/main" xmlns:r="http://schemas.openxmlformats.org/officeDocument/2006/relationships" xmlns:p="http://schemas.openxmlformats.org/presentationml/2006/main">
-  <p:cSld>
-    <p:spTree>
-      <p:nvGrpSpPr>
-        <p:cNvPr id="1" name=""/>
-        <p:cNvGrpSpPr/>
-        <p:nvPr/>
-      </p:nvGrpSpPr>
-      <p:grpSpPr>
-        <a:xfrm>
-          <a:off x="0" y="0"/>
-          <a:ext cx="0" cy="0"/>
-          <a:chOff x="0" y="0"/>
-          <a:chExt cx="0" cy="0"/>
-        </a:xfrm>
-      </p:grpSpPr>
-      <p:sp>
-        <p:nvSpPr>
-          <p:cNvPr id="2" name="Title 1"/>
-          <p:cNvSpPr>
-            <a:spLocks noGrp="1"/>
-          </p:cNvSpPr>
-          <p:nvPr>
-            <p:ph type="title"/>
-          </p:nvPr>
-        </p:nvSpPr>
-        <p:spPr>
-          <a:xfrm>
-            <a:off x="432634" y="53752"/>
-            <a:ext cx="8229600" cy="1143000"/>
-          </a:xfrm>
-        </p:spPr>
-        <p:txBody>
-          <a:bodyPr>
-            <a:normAutofit fontScale="90000"/>
-          </a:bodyPr>
-          <a:lstStyle/>
-          <a:p>
-            <a:pPr lvl="0"/>
-            <a:r>
-              <a:rPr lang="pt-BR" b="1" dirty="0"/>
-              <a:t>Gerenciamento de Controle de </a:t>
-            </a:r>
-            <a:r>
-              <a:rPr lang="pt-BR" b="1" dirty="0" smtClean="0"/>
-              <a:t>Mudanças - Fluxos</a:t>
-            </a:r>
-            <a:endParaRPr lang="pt-BR" b="1" dirty="0"/>
-          </a:p>
-        </p:txBody>
-      </p:sp>
-      <p:sp>
-        <p:nvSpPr>
-          <p:cNvPr id="3" name="Content Placeholder 2"/>
-          <p:cNvSpPr>
-            <a:spLocks noGrp="1"/>
-          </p:cNvSpPr>
-          <p:nvPr>
-            <p:ph idx="1"/>
-          </p:nvPr>
-        </p:nvSpPr>
-        <p:spPr/>
-        <p:txBody>
-          <a:bodyPr/>
-          <a:lstStyle/>
-          <a:p>
-            <a:pPr marL="0" indent="0">
-              <a:buNone/>
-            </a:pPr>
-            <a:endParaRPr lang="pt-BR" dirty="0" smtClean="0"/>
-          </a:p>
-        </p:txBody>
-      </p:sp>
-      <p:pic>
-        <p:nvPicPr>
-          <p:cNvPr id="5" name="Picture 2"/>
-          <p:cNvPicPr>
-            <a:picLocks noChangeAspect="1" noChangeArrowheads="1"/>
-          </p:cNvPicPr>
-          <p:nvPr/>
-        </p:nvPicPr>
-        <p:blipFill>
-          <a:blip r:embed="rId2">
-            <a:extLst>
-              <a:ext uri="{28A0092B-C50C-407E-A947-70E740481C1C}">
-                <a14:useLocalDpi xmlns:a14="http://schemas.microsoft.com/office/drawing/2010/main" val="0"/>
-              </a:ext>
-            </a:extLst>
-          </a:blip>
-          <a:srcRect/>
-          <a:stretch>
-            <a:fillRect/>
-          </a:stretch>
-        </p:blipFill>
-        <p:spPr bwMode="auto">
-          <a:xfrm>
-            <a:off x="0" y="2124074"/>
-            <a:ext cx="9144000" cy="3969221"/>
-          </a:xfrm>
-          <a:prstGeom prst="rect">
-            <a:avLst/>
-          </a:prstGeom>
-          <a:noFill/>
-          <a:ln>
-            <a:noFill/>
-          </a:ln>
-          <a:effectLst/>
-          <a:extLst>
-            <a:ext uri="{909E8E84-426E-40DD-AFC4-6F175D3DCCD1}">
-              <a14:hiddenFill xmlns:a14="http://schemas.microsoft.com/office/drawing/2010/main">
-                <a:solidFill>
-                  <a:schemeClr val="accent1"/>
-                </a:solidFill>
-              </a14:hiddenFill>
-            </a:ext>
-            <a:ext uri="{91240B29-F687-4F45-9708-019B960494DF}">
-              <a14:hiddenLine xmlns:a14="http://schemas.microsoft.com/office/drawing/2010/main" w="9525">
-                <a:solidFill>
-                  <a:schemeClr val="tx1"/>
-                </a:solidFill>
-                <a:miter lim="800000"/>
-                <a:headEnd/>
-                <a:tailEnd/>
-              </a14:hiddenLine>
-            </a:ext>
-            <a:ext uri="{AF507438-7753-43E0-B8FC-AC1667EBCBE1}">
-              <a14:hiddenEffects xmlns:a14="http://schemas.microsoft.com/office/drawing/2010/main">
-                <a:effectLst>
-                  <a:outerShdw dist="35921" dir="2700000" algn="ctr" rotWithShape="0">
-                    <a:schemeClr val="bg2"/>
-                  </a:outerShdw>
-                </a:effectLst>
-              </a14:hiddenEffects>
-            </a:ext>
-          </a:extLst>
-        </p:spPr>
-      </p:pic>
-    </p:spTree>
-    <p:extLst>
-      <p:ext uri="{BB962C8B-B14F-4D97-AF65-F5344CB8AC3E}">
-        <p14:creationId xmlns:p14="http://schemas.microsoft.com/office/powerpoint/2010/main" val="4245069425"/>
-      </p:ext>
-    </p:extLst>
-  </p:cSld>
-  <p:clrMapOvr>
-    <a:masterClrMapping/>
-  </p:clrMapOvr>
-</p:sld>
-</file>
-
-<file path=ppt/slides/slide14.xml><?xml version="1.0" encoding="utf-8"?>
 <p:sld xmlns:a="http://schemas.openxmlformats.org/drawingml/2006/main" xmlns:r="http://schemas.openxmlformats.org/officeDocument/2006/relationships" xmlns:p="http://schemas.openxmlformats.org/presentationml/2006/main">
   <p:cSld>
     <p:spTree>
@@ -3822,7 +3569,7 @@
 </p:sld>
 </file>
 
-<file path=ppt/slides/slide15.xml><?xml version="1.0" encoding="utf-8"?>
+<file path=ppt/slides/slide13.xml><?xml version="1.0" encoding="utf-8"?>
 <p:sld xmlns:a="http://schemas.openxmlformats.org/drawingml/2006/main" xmlns:r="http://schemas.openxmlformats.org/officeDocument/2006/relationships" xmlns:p="http://schemas.openxmlformats.org/presentationml/2006/main">
   <p:cSld>
     <p:spTree>
@@ -3913,8 +3660,8 @@
         </p:blipFill>
         <p:spPr bwMode="auto">
           <a:xfrm>
-            <a:off x="107503" y="2924944"/>
-            <a:ext cx="9036497" cy="2473479"/>
+            <a:off x="1" y="2420888"/>
+            <a:ext cx="9144000" cy="2977535"/>
           </a:xfrm>
           <a:prstGeom prst="rect">
             <a:avLst/>
@@ -3935,6 +3682,264 @@
     <p:extLst>
       <p:ext uri="{BB962C8B-B14F-4D97-AF65-F5344CB8AC3E}">
         <p14:creationId xmlns:p14="http://schemas.microsoft.com/office/powerpoint/2010/main" val="4164255099"/>
+      </p:ext>
+    </p:extLst>
+  </p:cSld>
+  <p:clrMapOvr>
+    <a:masterClrMapping/>
+  </p:clrMapOvr>
+</p:sld>
+</file>
+
+<file path=ppt/slides/slide14.xml><?xml version="1.0" encoding="utf-8"?>
+<p:sld xmlns:a="http://schemas.openxmlformats.org/drawingml/2006/main" xmlns:r="http://schemas.openxmlformats.org/officeDocument/2006/relationships" xmlns:p="http://schemas.openxmlformats.org/presentationml/2006/main">
+  <p:cSld>
+    <p:spTree>
+      <p:nvGrpSpPr>
+        <p:cNvPr id="1" name=""/>
+        <p:cNvGrpSpPr/>
+        <p:nvPr/>
+      </p:nvGrpSpPr>
+      <p:grpSpPr>
+        <a:xfrm>
+          <a:off x="0" y="0"/>
+          <a:ext cx="0" cy="0"/>
+          <a:chOff x="0" y="0"/>
+          <a:chExt cx="0" cy="0"/>
+        </a:xfrm>
+      </p:grpSpPr>
+      <p:sp>
+        <p:nvSpPr>
+          <p:cNvPr id="2" name="Title 1"/>
+          <p:cNvSpPr>
+            <a:spLocks noGrp="1"/>
+          </p:cNvSpPr>
+          <p:nvPr>
+            <p:ph type="title"/>
+          </p:nvPr>
+        </p:nvSpPr>
+        <p:spPr>
+          <a:xfrm>
+            <a:off x="432634" y="53752"/>
+            <a:ext cx="8229600" cy="1143000"/>
+          </a:xfrm>
+        </p:spPr>
+        <p:txBody>
+          <a:bodyPr>
+            <a:normAutofit fontScale="90000"/>
+          </a:bodyPr>
+          <a:lstStyle/>
+          <a:p>
+            <a:pPr lvl="0"/>
+            <a:r>
+              <a:rPr lang="pt-BR" b="1" dirty="0"/>
+              <a:t>Gerenciamento de Controle de </a:t>
+            </a:r>
+            <a:r>
+              <a:rPr lang="pt-BR" b="1" dirty="0" smtClean="0"/>
+              <a:t>Mudanças - Relatos</a:t>
+            </a:r>
+            <a:endParaRPr lang="pt-BR" b="1" dirty="0"/>
+          </a:p>
+        </p:txBody>
+      </p:sp>
+      <p:pic>
+        <p:nvPicPr>
+          <p:cNvPr id="4" name="Picture 3"/>
+          <p:cNvPicPr>
+            <a:picLocks noChangeAspect="1" noChangeArrowheads="1"/>
+          </p:cNvPicPr>
+          <p:nvPr/>
+        </p:nvPicPr>
+        <p:blipFill>
+          <a:blip r:embed="rId2">
+            <a:extLst>
+              <a:ext uri="{28A0092B-C50C-407E-A947-70E740481C1C}">
+                <a14:useLocalDpi xmlns:a14="http://schemas.microsoft.com/office/drawing/2010/main" val="0"/>
+              </a:ext>
+            </a:extLst>
+          </a:blip>
+          <a:srcRect/>
+          <a:stretch>
+            <a:fillRect/>
+          </a:stretch>
+        </p:blipFill>
+        <p:spPr bwMode="auto">
+          <a:xfrm>
+            <a:off x="241648" y="1340768"/>
+            <a:ext cx="8650832" cy="5517232"/>
+          </a:xfrm>
+          <a:prstGeom prst="rect">
+            <a:avLst/>
+          </a:prstGeom>
+          <a:noFill/>
+          <a:ln>
+            <a:noFill/>
+          </a:ln>
+          <a:effectLst/>
+          <a:extLst>
+            <a:ext uri="{909E8E84-426E-40DD-AFC4-6F175D3DCCD1}">
+              <a14:hiddenFill xmlns:a14="http://schemas.microsoft.com/office/drawing/2010/main">
+                <a:solidFill>
+                  <a:schemeClr val="accent1"/>
+                </a:solidFill>
+              </a14:hiddenFill>
+            </a:ext>
+            <a:ext uri="{91240B29-F687-4F45-9708-019B960494DF}">
+              <a14:hiddenLine xmlns:a14="http://schemas.microsoft.com/office/drawing/2010/main" w="9525">
+                <a:solidFill>
+                  <a:schemeClr val="tx1"/>
+                </a:solidFill>
+                <a:miter lim="800000"/>
+                <a:headEnd/>
+                <a:tailEnd/>
+              </a14:hiddenLine>
+            </a:ext>
+            <a:ext uri="{AF507438-7753-43E0-B8FC-AC1667EBCBE1}">
+              <a14:hiddenEffects xmlns:a14="http://schemas.microsoft.com/office/drawing/2010/main">
+                <a:effectLst>
+                  <a:outerShdw dist="35921" dir="2700000" algn="ctr" rotWithShape="0">
+                    <a:schemeClr val="bg2"/>
+                  </a:outerShdw>
+                </a:effectLst>
+              </a14:hiddenEffects>
+            </a:ext>
+          </a:extLst>
+        </p:spPr>
+      </p:pic>
+    </p:spTree>
+    <p:extLst>
+      <p:ext uri="{BB962C8B-B14F-4D97-AF65-F5344CB8AC3E}">
+        <p14:creationId xmlns:p14="http://schemas.microsoft.com/office/powerpoint/2010/main" val="907991402"/>
+      </p:ext>
+    </p:extLst>
+  </p:cSld>
+  <p:clrMapOvr>
+    <a:masterClrMapping/>
+  </p:clrMapOvr>
+</p:sld>
+</file>
+
+<file path=ppt/slides/slide15.xml><?xml version="1.0" encoding="utf-8"?>
+<p:sld xmlns:a="http://schemas.openxmlformats.org/drawingml/2006/main" xmlns:r="http://schemas.openxmlformats.org/officeDocument/2006/relationships" xmlns:p="http://schemas.openxmlformats.org/presentationml/2006/main">
+  <p:cSld>
+    <p:spTree>
+      <p:nvGrpSpPr>
+        <p:cNvPr id="1" name=""/>
+        <p:cNvGrpSpPr/>
+        <p:nvPr/>
+      </p:nvGrpSpPr>
+      <p:grpSpPr>
+        <a:xfrm>
+          <a:off x="0" y="0"/>
+          <a:ext cx="0" cy="0"/>
+          <a:chOff x="0" y="0"/>
+          <a:chExt cx="0" cy="0"/>
+        </a:xfrm>
+      </p:grpSpPr>
+      <p:sp>
+        <p:nvSpPr>
+          <p:cNvPr id="2" name="Title 1"/>
+          <p:cNvSpPr>
+            <a:spLocks noGrp="1"/>
+          </p:cNvSpPr>
+          <p:nvPr>
+            <p:ph type="title"/>
+          </p:nvPr>
+        </p:nvSpPr>
+        <p:spPr>
+          <a:xfrm>
+            <a:off x="432634" y="53752"/>
+            <a:ext cx="8229600" cy="1143000"/>
+          </a:xfrm>
+        </p:spPr>
+        <p:txBody>
+          <a:bodyPr>
+            <a:normAutofit fontScale="90000"/>
+          </a:bodyPr>
+          <a:lstStyle/>
+          <a:p>
+            <a:pPr lvl="0"/>
+            <a:r>
+              <a:rPr lang="pt-BR" b="1" dirty="0"/>
+              <a:t>Gerenciamento de Controle de </a:t>
+            </a:r>
+            <a:r>
+              <a:rPr lang="pt-BR" b="1" dirty="0" smtClean="0"/>
+              <a:t>Mudanças - Fluxos</a:t>
+            </a:r>
+            <a:endParaRPr lang="pt-BR" b="1" dirty="0"/>
+          </a:p>
+        </p:txBody>
+      </p:sp>
+      <p:pic>
+        <p:nvPicPr>
+          <p:cNvPr id="5" name="Picture 2"/>
+          <p:cNvPicPr>
+            <a:picLocks noChangeAspect="1" noChangeArrowheads="1"/>
+          </p:cNvPicPr>
+          <p:nvPr/>
+        </p:nvPicPr>
+        <p:blipFill>
+          <a:blip r:embed="rId2">
+            <a:extLst>
+              <a:ext uri="{28A0092B-C50C-407E-A947-70E740481C1C}">
+                <a14:useLocalDpi xmlns:a14="http://schemas.microsoft.com/office/drawing/2010/main" val="0"/>
+              </a:ext>
+            </a:extLst>
+          </a:blip>
+          <a:srcRect/>
+          <a:stretch>
+            <a:fillRect/>
+          </a:stretch>
+        </p:blipFill>
+        <p:spPr bwMode="auto">
+          <a:xfrm>
+            <a:off x="539551" y="1412776"/>
+            <a:ext cx="7840703" cy="4514891"/>
+          </a:xfrm>
+          <a:prstGeom prst="rect">
+            <a:avLst/>
+          </a:prstGeom>
+          <a:noFill/>
+          <a:ln>
+            <a:noFill/>
+          </a:ln>
+          <a:effectLst/>
+          <a:extLst>
+            <a:ext uri="{909E8E84-426E-40DD-AFC4-6F175D3DCCD1}">
+              <a14:hiddenFill xmlns:a14="http://schemas.microsoft.com/office/drawing/2010/main">
+                <a:solidFill>
+                  <a:schemeClr val="accent1"/>
+                </a:solidFill>
+              </a14:hiddenFill>
+            </a:ext>
+            <a:ext uri="{91240B29-F687-4F45-9708-019B960494DF}">
+              <a14:hiddenLine xmlns:a14="http://schemas.microsoft.com/office/drawing/2010/main" w="9525">
+                <a:solidFill>
+                  <a:schemeClr val="tx1"/>
+                </a:solidFill>
+                <a:miter lim="800000"/>
+                <a:headEnd/>
+                <a:tailEnd/>
+              </a14:hiddenLine>
+            </a:ext>
+            <a:ext uri="{AF507438-7753-43E0-B8FC-AC1667EBCBE1}">
+              <a14:hiddenEffects xmlns:a14="http://schemas.microsoft.com/office/drawing/2010/main">
+                <a:effectLst>
+                  <a:outerShdw dist="35921" dir="2700000" algn="ctr" rotWithShape="0">
+                    <a:schemeClr val="bg2"/>
+                  </a:outerShdw>
+                </a:effectLst>
+              </a14:hiddenEffects>
+            </a:ext>
+          </a:extLst>
+        </p:spPr>
+      </p:pic>
+    </p:spTree>
+    <p:extLst>
+      <p:ext uri="{BB962C8B-B14F-4D97-AF65-F5344CB8AC3E}">
+        <p14:creationId xmlns:p14="http://schemas.microsoft.com/office/powerpoint/2010/main" val="4245069425"/>
       </p:ext>
     </p:extLst>
   </p:cSld>
@@ -4111,7 +4116,7 @@
       </p:sp>
       <p:pic>
         <p:nvPicPr>
-          <p:cNvPr id="2050" name="Picture 2" descr="G:\Arquivos de Programa\Dropbox\Fay_Zeh\GCS\repositorio.jpg"/>
+          <p:cNvPr id="3" name="Picture 2"/>
           <p:cNvPicPr>
             <a:picLocks noChangeAspect="1" noChangeArrowheads="1"/>
           </p:cNvPicPr>
@@ -4132,20 +4137,43 @@
         </p:blipFill>
         <p:spPr bwMode="auto">
           <a:xfrm>
-            <a:off x="2212380" y="1587014"/>
-            <a:ext cx="5400600" cy="5270986"/>
+            <a:off x="2209800" y="1752600"/>
+            <a:ext cx="4724400" cy="3352800"/>
           </a:xfrm>
           <a:prstGeom prst="rect">
             <a:avLst/>
           </a:prstGeom>
           <a:noFill/>
+          <a:ln>
+            <a:noFill/>
+          </a:ln>
+          <a:effectLst/>
           <a:extLst>
             <a:ext uri="{909E8E84-426E-40DD-AFC4-6F175D3DCCD1}">
               <a14:hiddenFill xmlns:a14="http://schemas.microsoft.com/office/drawing/2010/main">
                 <a:solidFill>
-                  <a:srgbClr val="FFFFFF"/>
+                  <a:schemeClr val="accent1"/>
                 </a:solidFill>
               </a14:hiddenFill>
+            </a:ext>
+            <a:ext uri="{91240B29-F687-4F45-9708-019B960494DF}">
+              <a14:hiddenLine xmlns:a14="http://schemas.microsoft.com/office/drawing/2010/main" w="9525">
+                <a:solidFill>
+                  <a:schemeClr val="tx1"/>
+                </a:solidFill>
+                <a:miter lim="800000"/>
+                <a:headEnd/>
+                <a:tailEnd/>
+              </a14:hiddenLine>
+            </a:ext>
+            <a:ext uri="{AF507438-7753-43E0-B8FC-AC1667EBCBE1}">
+              <a14:hiddenEffects xmlns:a14="http://schemas.microsoft.com/office/drawing/2010/main">
+                <a:effectLst>
+                  <a:outerShdw dist="35921" dir="2700000" algn="ctr" rotWithShape="0">
+                    <a:schemeClr val="bg2"/>
+                  </a:outerShdw>
+                </a:effectLst>
+              </a14:hiddenEffects>
             </a:ext>
           </a:extLst>
         </p:spPr>

</xml_diff>